<commit_message>
Updated unlink slides to use prev, cur and next
</commit_message>
<xml_diff>
--- a/modules/unlink/Unlink.pptx
+++ b/modules/unlink/Unlink.pptx
@@ -24624,7 +24624,7 @@
           <a:p>
             <a:fld id="{2DA23E8D-1792-1541-9147-970A8DD8A355}" type="datetimeFigureOut">
               <a:rPr lang="en-US" smtClean="0"/>
-              <a:t>6/22/21</a:t>
+              <a:t>7/5/21</a:t>
             </a:fld>
             <a:endParaRPr lang="en-US" dirty="0"/>
           </a:p>
@@ -24889,6 +24889,90 @@
     </a:lvl9pPr>
   </p:notesStyle>
 </p:notesMaster>
+</file>
+
+<file path=ppt/notesSlides/notesSlide1.xml><?xml version="1.0" encoding="utf-8"?>
+<p:notes xmlns:a="http://schemas.openxmlformats.org/drawingml/2006/main" xmlns:r="http://schemas.openxmlformats.org/officeDocument/2006/relationships" xmlns:p="http://schemas.openxmlformats.org/presentationml/2006/main">
+  <p:cSld>
+    <p:spTree>
+      <p:nvGrpSpPr>
+        <p:cNvPr id="1" name=""/>
+        <p:cNvGrpSpPr/>
+        <p:nvPr/>
+      </p:nvGrpSpPr>
+      <p:grpSpPr>
+        <a:xfrm>
+          <a:off x="0" y="0"/>
+          <a:ext cx="0" cy="0"/>
+          <a:chOff x="0" y="0"/>
+          <a:chExt cx="0" cy="0"/>
+        </a:xfrm>
+      </p:grpSpPr>
+      <p:sp>
+        <p:nvSpPr>
+          <p:cNvPr id="2" name="Slide Image Placeholder 1"/>
+          <p:cNvSpPr>
+            <a:spLocks noGrp="1" noRot="1" noChangeAspect="1"/>
+          </p:cNvSpPr>
+          <p:nvPr>
+            <p:ph type="sldImg"/>
+          </p:nvPr>
+        </p:nvSpPr>
+        <p:spPr/>
+      </p:sp>
+      <p:sp>
+        <p:nvSpPr>
+          <p:cNvPr id="3" name="Notes Placeholder 2"/>
+          <p:cNvSpPr>
+            <a:spLocks noGrp="1"/>
+          </p:cNvSpPr>
+          <p:nvPr>
+            <p:ph type="body" idx="1"/>
+          </p:nvPr>
+        </p:nvSpPr>
+        <p:spPr/>
+        <p:txBody>
+          <a:bodyPr/>
+          <a:lstStyle/>
+          <a:p>
+            <a:endParaRPr lang="en-US" dirty="0"/>
+          </a:p>
+        </p:txBody>
+      </p:sp>
+      <p:sp>
+        <p:nvSpPr>
+          <p:cNvPr id="4" name="Slide Number Placeholder 3"/>
+          <p:cNvSpPr>
+            <a:spLocks noGrp="1"/>
+          </p:cNvSpPr>
+          <p:nvPr>
+            <p:ph type="sldNum" sz="quarter" idx="5"/>
+          </p:nvPr>
+        </p:nvSpPr>
+        <p:spPr/>
+        <p:txBody>
+          <a:bodyPr/>
+          <a:lstStyle/>
+          <a:p>
+            <a:fld id="{AC55928C-CD14-454C-B617-1AFCF9A58596}" type="slidenum">
+              <a:rPr lang="en-US" smtClean="0"/>
+              <a:t>15</a:t>
+            </a:fld>
+            <a:endParaRPr lang="en-US" dirty="0"/>
+          </a:p>
+        </p:txBody>
+      </p:sp>
+    </p:spTree>
+    <p:extLst>
+      <p:ext uri="{BB962C8B-B14F-4D97-AF65-F5344CB8AC3E}">
+        <p14:creationId xmlns:p14="http://schemas.microsoft.com/office/powerpoint/2010/main" val="3571229800"/>
+      </p:ext>
+    </p:extLst>
+  </p:cSld>
+  <p:clrMapOvr>
+    <a:masterClrMapping/>
+  </p:clrMapOvr>
+</p:notes>
 </file>
 
 <file path=ppt/slideLayouts/slideLayout1.xml><?xml version="1.0" encoding="utf-8"?>
@@ -25094,7 +25178,7 @@
                 <a:latin typeface="Calibri"/>
               </a:rPr>
               <a:pPr/>
-              <a:t>6/22/21</a:t>
+              <a:t>7/5/21</a:t>
             </a:fld>
             <a:endParaRPr lang="en-US" dirty="0">
               <a:solidFill>
@@ -25347,7 +25431,7 @@
                 <a:latin typeface="Calibri"/>
               </a:rPr>
               <a:pPr/>
-              <a:t>6/22/21</a:t>
+              <a:t>7/5/21</a:t>
             </a:fld>
             <a:endParaRPr lang="en-US" dirty="0">
               <a:solidFill>
@@ -25562,7 +25646,7 @@
                 <a:latin typeface="Calibri"/>
               </a:rPr>
               <a:pPr/>
-              <a:t>6/22/21</a:t>
+              <a:t>7/5/21</a:t>
             </a:fld>
             <a:endParaRPr lang="en-US" dirty="0">
               <a:solidFill>
@@ -25960,7 +26044,7 @@
                 <a:latin typeface="Calibri"/>
               </a:rPr>
               <a:pPr/>
-              <a:t>6/22/21</a:t>
+              <a:t>7/5/21</a:t>
             </a:fld>
             <a:endParaRPr lang="en-US" dirty="0">
               <a:solidFill>
@@ -26302,7 +26386,7 @@
                 <a:latin typeface="Calibri"/>
               </a:rPr>
               <a:pPr/>
-              <a:t>6/22/21</a:t>
+              <a:t>7/5/21</a:t>
             </a:fld>
             <a:endParaRPr lang="en-US" dirty="0">
               <a:solidFill>
@@ -26630,7 +26714,7 @@
                 <a:latin typeface="Calibri"/>
               </a:rPr>
               <a:pPr/>
-              <a:t>6/22/21</a:t>
+              <a:t>7/5/21</a:t>
             </a:fld>
             <a:endParaRPr lang="en-US" dirty="0">
               <a:solidFill>
@@ -27119,7 +27203,7 @@
                 <a:latin typeface="Calibri"/>
               </a:rPr>
               <a:pPr/>
-              <a:t>6/22/21</a:t>
+              <a:t>7/5/21</a:t>
             </a:fld>
             <a:endParaRPr lang="en-US" dirty="0">
               <a:solidFill>
@@ -27302,7 +27386,7 @@
                 <a:latin typeface="Calibri"/>
               </a:rPr>
               <a:pPr/>
-              <a:t>6/22/21</a:t>
+              <a:t>7/5/21</a:t>
             </a:fld>
             <a:endParaRPr lang="en-US" dirty="0">
               <a:solidFill>
@@ -27548,7 +27632,7 @@
                 <a:latin typeface="Calibri"/>
               </a:rPr>
               <a:pPr/>
-              <a:t>6/22/21</a:t>
+              <a:t>7/5/21</a:t>
             </a:fld>
             <a:endParaRPr lang="en-US" dirty="0">
               <a:solidFill>
@@ -27890,7 +27974,7 @@
                 <a:latin typeface="Calibri"/>
               </a:rPr>
               <a:pPr/>
-              <a:t>6/22/21</a:t>
+              <a:t>7/5/21</a:t>
             </a:fld>
             <a:endParaRPr lang="en-US" dirty="0">
               <a:solidFill>
@@ -28182,7 +28266,7 @@
                 <a:latin typeface="Calibri"/>
               </a:rPr>
               <a:pPr/>
-              <a:t>6/22/21</a:t>
+              <a:t>7/5/21</a:t>
             </a:fld>
             <a:endParaRPr lang="en-US" dirty="0">
               <a:solidFill>
@@ -28432,7 +28516,7 @@
                 <a:latin typeface="Calibri"/>
               </a:rPr>
               <a:pPr defTabSz="914400"/>
-              <a:t>6/22/21</a:t>
+              <a:t>7/5/21</a:t>
             </a:fld>
             <a:endParaRPr lang="en-US" dirty="0">
               <a:solidFill>
@@ -30004,36 +30088,6 @@
       </p:grpSpPr>
       <p:pic>
         <p:nvPicPr>
-          <p:cNvPr id="12" name="Picture 11" descr="Unlink macro easier to read">
-            <a:extLst>
-              <a:ext uri="{FF2B5EF4-FFF2-40B4-BE49-F238E27FC236}">
-                <a16:creationId xmlns:a16="http://schemas.microsoft.com/office/drawing/2014/main" id="{C0C6CB2D-13F1-0842-8177-79F61B9BD2EA}"/>
-              </a:ext>
-            </a:extLst>
-          </p:cNvPr>
-          <p:cNvPicPr>
-            <a:picLocks noChangeAspect="1"/>
-          </p:cNvPicPr>
-          <p:nvPr/>
-        </p:nvPicPr>
-        <p:blipFill>
-          <a:blip r:embed="rId2"/>
-          <a:stretch>
-            <a:fillRect/>
-          </a:stretch>
-        </p:blipFill>
-        <p:spPr>
-          <a:xfrm>
-            <a:off x="110214" y="1256770"/>
-            <a:ext cx="3101270" cy="1527141"/>
-          </a:xfrm>
-          <a:prstGeom prst="rect">
-            <a:avLst/>
-          </a:prstGeom>
-        </p:spPr>
-      </p:pic>
-      <p:pic>
-        <p:nvPicPr>
           <p:cNvPr id="17" name="Content Placeholder 4" descr="A screenshot of a cell phone&#10;&#10;Description automatically generated">
             <a:extLst>
               <a:ext uri="{FF2B5EF4-FFF2-40B4-BE49-F238E27FC236}">
@@ -30062,36 +30116,6 @@
           </a:prstGeom>
         </p:spPr>
       </p:pic>
-      <p:pic>
-        <p:nvPicPr>
-          <p:cNvPr id="4" name="Picture 3" descr="Unlink remove FD &amp; BK for A, B and C">
-            <a:extLst>
-              <a:ext uri="{FF2B5EF4-FFF2-40B4-BE49-F238E27FC236}">
-                <a16:creationId xmlns:a16="http://schemas.microsoft.com/office/drawing/2014/main" id="{2CD79E6A-B276-1F46-8F87-171DF15F5A23}"/>
-              </a:ext>
-            </a:extLst>
-          </p:cNvPr>
-          <p:cNvPicPr>
-            <a:picLocks noChangeAspect="1"/>
-          </p:cNvPicPr>
-          <p:nvPr/>
-        </p:nvPicPr>
-        <p:blipFill>
-          <a:blip r:embed="rId4"/>
-          <a:stretch>
-            <a:fillRect/>
-          </a:stretch>
-        </p:blipFill>
-        <p:spPr>
-          <a:xfrm>
-            <a:off x="3519689" y="2676682"/>
-            <a:ext cx="5274024" cy="1883580"/>
-          </a:xfrm>
-          <a:prstGeom prst="rect">
-            <a:avLst/>
-          </a:prstGeom>
-        </p:spPr>
-      </p:pic>
       <p:sp>
         <p:nvSpPr>
           <p:cNvPr id="2" name="Title 1">
@@ -30134,7 +30158,7 @@
         </p:nvSpPr>
         <p:spPr>
           <a:xfrm>
-            <a:off x="3786889" y="897850"/>
+            <a:off x="4296920" y="897850"/>
             <a:ext cx="5006824" cy="1200329"/>
           </a:xfrm>
           <a:prstGeom prst="rect">
@@ -30164,7 +30188,7 @@
             </a:pPr>
             <a:r>
               <a:rPr lang="en-US" dirty="0"/>
-              <a:t>A=FD</a:t>
+              <a:t>Next=FD</a:t>
             </a:r>
           </a:p>
           <a:p>
@@ -30174,7 +30198,7 @@
             </a:pPr>
             <a:r>
               <a:rPr lang="en-US" dirty="0"/>
-              <a:t>B=P</a:t>
+              <a:t>Cur=P</a:t>
             </a:r>
           </a:p>
           <a:p>
@@ -30184,7 +30208,7 @@
             </a:pPr>
             <a:r>
               <a:rPr lang="en-US" dirty="0"/>
-              <a:t>C=BK</a:t>
+              <a:t>Prev=BK</a:t>
             </a:r>
           </a:p>
         </p:txBody>
@@ -30250,49 +30274,6 @@
           <a:xfrm>
             <a:off x="538259" y="1936799"/>
             <a:ext cx="1122590" cy="0"/>
-          </a:xfrm>
-          <a:prstGeom prst="line">
-            <a:avLst/>
-          </a:prstGeom>
-          <a:ln w="25400">
-            <a:solidFill>
-              <a:srgbClr val="FF0000"/>
-            </a:solidFill>
-          </a:ln>
-        </p:spPr>
-        <p:style>
-          <a:lnRef idx="1">
-            <a:schemeClr val="accent1"/>
-          </a:lnRef>
-          <a:fillRef idx="0">
-            <a:schemeClr val="accent1"/>
-          </a:fillRef>
-          <a:effectRef idx="0">
-            <a:schemeClr val="accent1"/>
-          </a:effectRef>
-          <a:fontRef idx="minor">
-            <a:schemeClr val="tx1"/>
-          </a:fontRef>
-        </p:style>
-      </p:cxnSp>
-      <p:cxnSp>
-        <p:nvCxnSpPr>
-          <p:cNvPr id="11" name="Straight Connector 10">
-            <a:extLst>
-              <a:ext uri="{FF2B5EF4-FFF2-40B4-BE49-F238E27FC236}">
-                <a16:creationId xmlns:a16="http://schemas.microsoft.com/office/drawing/2014/main" id="{652E7F6F-BC5B-CD49-82DC-92938E9A6E42}"/>
-              </a:ext>
-            </a:extLst>
-          </p:cNvPr>
-          <p:cNvCxnSpPr>
-            <a:cxnSpLocks/>
-          </p:cNvCxnSpPr>
-          <p:nvPr/>
-        </p:nvCxnSpPr>
-        <p:spPr>
-          <a:xfrm>
-            <a:off x="6013341" y="2899939"/>
-            <a:ext cx="286719" cy="0"/>
           </a:xfrm>
           <a:prstGeom prst="line">
             <a:avLst/>
@@ -30490,6 +30471,243 @@
           </a:fontRef>
         </p:style>
       </p:cxnSp>
+      <p:pic>
+        <p:nvPicPr>
+          <p:cNvPr id="5" name="Picture 4" descr="Unlink Macro with name update">
+            <a:extLst>
+              <a:ext uri="{FF2B5EF4-FFF2-40B4-BE49-F238E27FC236}">
+                <a16:creationId xmlns:a16="http://schemas.microsoft.com/office/drawing/2014/main" id="{9A73BBAC-D173-AD40-861A-57111B4AA73E}"/>
+              </a:ext>
+            </a:extLst>
+          </p:cNvPr>
+          <p:cNvPicPr>
+            <a:picLocks noChangeAspect="1"/>
+          </p:cNvPicPr>
+          <p:nvPr/>
+        </p:nvPicPr>
+        <p:blipFill>
+          <a:blip r:embed="rId4"/>
+          <a:stretch>
+            <a:fillRect/>
+          </a:stretch>
+        </p:blipFill>
+        <p:spPr>
+          <a:xfrm>
+            <a:off x="29621" y="1042803"/>
+            <a:ext cx="4178300" cy="1638300"/>
+          </a:xfrm>
+          <a:prstGeom prst="rect">
+            <a:avLst/>
+          </a:prstGeom>
+        </p:spPr>
+      </p:pic>
+      <p:cxnSp>
+        <p:nvCxnSpPr>
+          <p:cNvPr id="16" name="Straight Connector 15">
+            <a:extLst>
+              <a:ext uri="{FF2B5EF4-FFF2-40B4-BE49-F238E27FC236}">
+                <a16:creationId xmlns:a16="http://schemas.microsoft.com/office/drawing/2014/main" id="{402B3B28-AE00-7249-9DCF-545D4909DAEF}"/>
+              </a:ext>
+            </a:extLst>
+          </p:cNvPr>
+          <p:cNvCxnSpPr>
+            <a:cxnSpLocks/>
+          </p:cNvCxnSpPr>
+          <p:nvPr/>
+        </p:nvCxnSpPr>
+        <p:spPr>
+          <a:xfrm>
+            <a:off x="508518" y="1546293"/>
+            <a:ext cx="1716792" cy="0"/>
+          </a:xfrm>
+          <a:prstGeom prst="line">
+            <a:avLst/>
+          </a:prstGeom>
+          <a:ln w="25400">
+            <a:solidFill>
+              <a:srgbClr val="FF0000"/>
+            </a:solidFill>
+          </a:ln>
+        </p:spPr>
+        <p:style>
+          <a:lnRef idx="1">
+            <a:schemeClr val="accent1"/>
+          </a:lnRef>
+          <a:fillRef idx="0">
+            <a:schemeClr val="accent1"/>
+          </a:fillRef>
+          <a:effectRef idx="0">
+            <a:schemeClr val="accent1"/>
+          </a:effectRef>
+          <a:fontRef idx="minor">
+            <a:schemeClr val="tx1"/>
+          </a:fontRef>
+        </p:style>
+      </p:cxnSp>
+      <p:cxnSp>
+        <p:nvCxnSpPr>
+          <p:cNvPr id="20" name="Straight Connector 19">
+            <a:extLst>
+              <a:ext uri="{FF2B5EF4-FFF2-40B4-BE49-F238E27FC236}">
+                <a16:creationId xmlns:a16="http://schemas.microsoft.com/office/drawing/2014/main" id="{790AFA6C-B7FB-7947-87C2-82D10DA3FAB0}"/>
+              </a:ext>
+            </a:extLst>
+          </p:cNvPr>
+          <p:cNvCxnSpPr>
+            <a:cxnSpLocks/>
+          </p:cNvCxnSpPr>
+          <p:nvPr/>
+        </p:nvCxnSpPr>
+        <p:spPr>
+          <a:xfrm>
+            <a:off x="508518" y="1861953"/>
+            <a:ext cx="1716792" cy="0"/>
+          </a:xfrm>
+          <a:prstGeom prst="line">
+            <a:avLst/>
+          </a:prstGeom>
+          <a:ln w="25400">
+            <a:solidFill>
+              <a:srgbClr val="FF0000"/>
+            </a:solidFill>
+          </a:ln>
+        </p:spPr>
+        <p:style>
+          <a:lnRef idx="1">
+            <a:schemeClr val="accent1"/>
+          </a:lnRef>
+          <a:fillRef idx="0">
+            <a:schemeClr val="accent1"/>
+          </a:fillRef>
+          <a:effectRef idx="0">
+            <a:schemeClr val="accent1"/>
+          </a:effectRef>
+          <a:fontRef idx="minor">
+            <a:schemeClr val="tx1"/>
+          </a:fontRef>
+        </p:style>
+      </p:cxnSp>
+      <p:pic>
+        <p:nvPicPr>
+          <p:cNvPr id="6" name="Graphic 5" descr="Unlink initial setup">
+            <a:extLst>
+              <a:ext uri="{FF2B5EF4-FFF2-40B4-BE49-F238E27FC236}">
+                <a16:creationId xmlns:a16="http://schemas.microsoft.com/office/drawing/2014/main" id="{74537FB8-51F4-8C42-AEF3-7807BBA86003}"/>
+              </a:ext>
+            </a:extLst>
+          </p:cNvPr>
+          <p:cNvPicPr>
+            <a:picLocks noChangeAspect="1"/>
+          </p:cNvPicPr>
+          <p:nvPr/>
+        </p:nvPicPr>
+        <p:blipFill rotWithShape="1">
+          <a:blip r:embed="rId5">
+            <a:extLst>
+              <a:ext uri="{96DAC541-7B7A-43D3-8B79-37D633B846F1}">
+                <asvg:svgBlip xmlns:asvg="http://schemas.microsoft.com/office/drawing/2016/SVG/main" r:embed="rId6"/>
+              </a:ext>
+            </a:extLst>
+          </a:blip>
+          <a:srcRect l="12630" t="18608" r="30118" b="64218"/>
+          <a:stretch/>
+        </p:blipFill>
+        <p:spPr>
+          <a:xfrm>
+            <a:off x="3565320" y="2867135"/>
+            <a:ext cx="5552084" cy="2155227"/>
+          </a:xfrm>
+          <a:prstGeom prst="rect">
+            <a:avLst/>
+          </a:prstGeom>
+        </p:spPr>
+      </p:pic>
+      <p:cxnSp>
+        <p:nvCxnSpPr>
+          <p:cNvPr id="11" name="Straight Connector 10">
+            <a:extLst>
+              <a:ext uri="{FF2B5EF4-FFF2-40B4-BE49-F238E27FC236}">
+                <a16:creationId xmlns:a16="http://schemas.microsoft.com/office/drawing/2014/main" id="{652E7F6F-BC5B-CD49-82DC-92938E9A6E42}"/>
+              </a:ext>
+            </a:extLst>
+          </p:cNvPr>
+          <p:cNvCxnSpPr>
+            <a:cxnSpLocks/>
+          </p:cNvCxnSpPr>
+          <p:nvPr/>
+        </p:nvCxnSpPr>
+        <p:spPr>
+          <a:xfrm>
+            <a:off x="7806631" y="3130758"/>
+            <a:ext cx="511746" cy="0"/>
+          </a:xfrm>
+          <a:prstGeom prst="line">
+            <a:avLst/>
+          </a:prstGeom>
+          <a:ln w="25400">
+            <a:solidFill>
+              <a:srgbClr val="FF0000"/>
+            </a:solidFill>
+          </a:ln>
+        </p:spPr>
+        <p:style>
+          <a:lnRef idx="1">
+            <a:schemeClr val="accent1"/>
+          </a:lnRef>
+          <a:fillRef idx="0">
+            <a:schemeClr val="accent1"/>
+          </a:fillRef>
+          <a:effectRef idx="0">
+            <a:schemeClr val="accent1"/>
+          </a:effectRef>
+          <a:fontRef idx="minor">
+            <a:schemeClr val="tx1"/>
+          </a:fontRef>
+        </p:style>
+      </p:cxnSp>
+      <p:cxnSp>
+        <p:nvCxnSpPr>
+          <p:cNvPr id="21" name="Straight Connector 20">
+            <a:extLst>
+              <a:ext uri="{FF2B5EF4-FFF2-40B4-BE49-F238E27FC236}">
+                <a16:creationId xmlns:a16="http://schemas.microsoft.com/office/drawing/2014/main" id="{756369C9-44DD-BB44-8237-8C1918D5B4BD}"/>
+              </a:ext>
+            </a:extLst>
+          </p:cNvPr>
+          <p:cNvCxnSpPr>
+            <a:cxnSpLocks/>
+          </p:cNvCxnSpPr>
+          <p:nvPr/>
+        </p:nvCxnSpPr>
+        <p:spPr>
+          <a:xfrm>
+            <a:off x="4032049" y="3130758"/>
+            <a:ext cx="511746" cy="0"/>
+          </a:xfrm>
+          <a:prstGeom prst="line">
+            <a:avLst/>
+          </a:prstGeom>
+          <a:ln w="25400">
+            <a:solidFill>
+              <a:srgbClr val="FF0000"/>
+            </a:solidFill>
+          </a:ln>
+        </p:spPr>
+        <p:style>
+          <a:lnRef idx="1">
+            <a:schemeClr val="accent1"/>
+          </a:lnRef>
+          <a:fillRef idx="0">
+            <a:schemeClr val="accent1"/>
+          </a:fillRef>
+          <a:effectRef idx="0">
+            <a:schemeClr val="accent1"/>
+          </a:effectRef>
+          <a:fontRef idx="minor">
+            <a:schemeClr val="tx1"/>
+          </a:fontRef>
+        </p:style>
+      </p:cxnSp>
     </p:spTree>
     <p:extLst>
       <p:ext uri="{BB962C8B-B14F-4D97-AF65-F5344CB8AC3E}">
@@ -30582,7 +30800,7 @@
             </a:pPr>
             <a:r>
               <a:rPr lang="en-US" dirty="0"/>
-              <a:t>C is the forward pointer (in doubly linked list)  </a:t>
+              <a:t>Next is the forward pointer (in doubly linked list)  </a:t>
             </a:r>
           </a:p>
           <a:p>
@@ -30592,7 +30810,7 @@
             </a:pPr>
             <a:r>
               <a:rPr lang="en-US" dirty="0"/>
-              <a:t>A is the backward pointer (in doubly linked list) </a:t>
+              <a:t>Prev is the backward pointer (in doubly linked list) </a:t>
             </a:r>
           </a:p>
           <a:p>
@@ -30602,10 +30820,10 @@
       </p:sp>
       <p:pic>
         <p:nvPicPr>
-          <p:cNvPr id="6" name="Picture 5" descr="Unlink remove FD &amp; BK for A, B and C">
+          <p:cNvPr id="7" name="Graphic 6" descr="Unlink initial setup">
             <a:extLst>
               <a:ext uri="{FF2B5EF4-FFF2-40B4-BE49-F238E27FC236}">
-                <a16:creationId xmlns:a16="http://schemas.microsoft.com/office/drawing/2014/main" id="{291A52A2-407C-1744-86D6-D3A52565BA8B}"/>
+                <a16:creationId xmlns:a16="http://schemas.microsoft.com/office/drawing/2014/main" id="{877D6274-DC80-F144-9D42-BF2E99AEE389}"/>
               </a:ext>
             </a:extLst>
           </p:cNvPr>
@@ -30614,16 +30832,21 @@
           </p:cNvPicPr>
           <p:nvPr/>
         </p:nvPicPr>
-        <p:blipFill>
-          <a:blip r:embed="rId2"/>
-          <a:stretch>
-            <a:fillRect/>
-          </a:stretch>
+        <p:blipFill rotWithShape="1">
+          <a:blip r:embed="rId2">
+            <a:extLst>
+              <a:ext uri="{96DAC541-7B7A-43D3-8B79-37D633B846F1}">
+                <asvg:svgBlip xmlns:asvg="http://schemas.microsoft.com/office/drawing/2016/SVG/main" r:embed="rId3"/>
+              </a:ext>
+            </a:extLst>
+          </a:blip>
+          <a:srcRect l="12630" t="18608" r="30118" b="64218"/>
+          <a:stretch/>
         </p:blipFill>
         <p:spPr>
           <a:xfrm>
-            <a:off x="3626815" y="1086550"/>
-            <a:ext cx="5274024" cy="1883580"/>
+            <a:off x="3591916" y="1105010"/>
+            <a:ext cx="5552084" cy="2155227"/>
           </a:xfrm>
           <a:prstGeom prst="rect">
             <a:avLst/>
@@ -30632,10 +30855,10 @@
       </p:pic>
       <p:pic>
         <p:nvPicPr>
-          <p:cNvPr id="14" name="Picture 13" descr="Bottom of unlink macro">
+          <p:cNvPr id="9" name="Picture 8" descr="Unlink Macro with name update">
             <a:extLst>
               <a:ext uri="{FF2B5EF4-FFF2-40B4-BE49-F238E27FC236}">
-                <a16:creationId xmlns:a16="http://schemas.microsoft.com/office/drawing/2014/main" id="{D17F9249-B902-BB4F-ADBC-F3D4D09ED357}"/>
+                <a16:creationId xmlns:a16="http://schemas.microsoft.com/office/drawing/2014/main" id="{6F3CA53A-6051-D246-8DBA-8845CC25EF68}"/>
               </a:ext>
             </a:extLst>
           </p:cNvPr>
@@ -30644,16 +30867,15 @@
           </p:cNvPicPr>
           <p:nvPr/>
         </p:nvPicPr>
-        <p:blipFill>
-          <a:blip r:embed="rId3"/>
-          <a:stretch>
-            <a:fillRect/>
-          </a:stretch>
+        <p:blipFill rotWithShape="1">
+          <a:blip r:embed="rId4"/>
+          <a:srcRect l="9064" t="13747" r="45468" b="49856"/>
+          <a:stretch/>
         </p:blipFill>
         <p:spPr>
           <a:xfrm>
-            <a:off x="628650" y="1356470"/>
-            <a:ext cx="2605908" cy="1124117"/>
+            <a:off x="424426" y="1531254"/>
+            <a:ext cx="3167490" cy="994172"/>
           </a:xfrm>
           <a:prstGeom prst="rect">
             <a:avLst/>
@@ -30692,10 +30914,10 @@
       </p:grpSpPr>
       <p:pic>
         <p:nvPicPr>
-          <p:cNvPr id="13" name="Picture 12">
+          <p:cNvPr id="9" name="Picture 8" descr="Unlink Macro with name update">
             <a:extLst>
               <a:ext uri="{FF2B5EF4-FFF2-40B4-BE49-F238E27FC236}">
-                <a16:creationId xmlns:a16="http://schemas.microsoft.com/office/drawing/2014/main" id="{26EAAD52-98CC-5A45-8212-D119CEFDCF59}"/>
+                <a16:creationId xmlns:a16="http://schemas.microsoft.com/office/drawing/2014/main" id="{7E0D8065-1290-9649-9EB1-486C9F3FB036}"/>
               </a:ext>
             </a:extLst>
           </p:cNvPr>
@@ -30704,16 +30926,15 @@
           </p:cNvPicPr>
           <p:nvPr/>
         </p:nvPicPr>
-        <p:blipFill>
+        <p:blipFill rotWithShape="1">
           <a:blip r:embed="rId2"/>
-          <a:stretch>
-            <a:fillRect/>
-          </a:stretch>
+          <a:srcRect l="9064" t="13747" r="45468" b="49856"/>
+          <a:stretch/>
         </p:blipFill>
         <p:spPr>
           <a:xfrm>
-            <a:off x="304995" y="1067472"/>
-            <a:ext cx="2605908" cy="1124117"/>
+            <a:off x="165365" y="1437663"/>
+            <a:ext cx="3167490" cy="994172"/>
           </a:xfrm>
           <a:prstGeom prst="rect">
             <a:avLst/>
@@ -30782,7 +31003,7 @@
             </a:pPr>
             <a:r>
               <a:rPr lang="en-US" dirty="0"/>
-              <a:t>C is the forward pointer (in doubly linked list)  </a:t>
+              <a:t>Next is the forward pointer (in doubly linked list)  </a:t>
             </a:r>
           </a:p>
           <a:p>
@@ -30792,7 +31013,7 @@
             </a:pPr>
             <a:r>
               <a:rPr lang="en-US" dirty="0"/>
-              <a:t>A is the backward pointer (in doubly linked list) </a:t>
+              <a:t>Prev is the backward pointer (in doubly linked list) </a:t>
             </a:r>
           </a:p>
           <a:p>
@@ -30806,7 +31027,7 @@
                   <a:srgbClr val="FF0000"/>
                 </a:solidFill>
               </a:rPr>
-              <a:t>C-&gt;bk = A;</a:t>
+              <a:t>Next-&gt;bk = Prev;</a:t>
             </a:r>
           </a:p>
           <a:p>
@@ -30857,8 +31078,8 @@
         </p:nvCxnSpPr>
         <p:spPr>
           <a:xfrm>
-            <a:off x="516038" y="1510681"/>
-            <a:ext cx="2217831" cy="0"/>
+            <a:off x="311851" y="1921288"/>
+            <a:ext cx="2810095" cy="0"/>
           </a:xfrm>
           <a:prstGeom prst="line">
             <a:avLst/>
@@ -30886,10 +31107,10 @@
       </p:cxnSp>
       <p:pic>
         <p:nvPicPr>
-          <p:cNvPr id="5" name="Picture 4" descr="Unlink fix C-&gt;bk">
+          <p:cNvPr id="4" name="Graphic 3" descr="Edit Nexts (FD)'s bk to be Prev (BK) ">
             <a:extLst>
               <a:ext uri="{FF2B5EF4-FFF2-40B4-BE49-F238E27FC236}">
-                <a16:creationId xmlns:a16="http://schemas.microsoft.com/office/drawing/2014/main" id="{DECAF598-0D77-E744-9CB4-9A2C7788DC29}"/>
+                <a16:creationId xmlns:a16="http://schemas.microsoft.com/office/drawing/2014/main" id="{B23EE62B-95F5-984B-8AEA-25C2B0DE5BA0}"/>
               </a:ext>
             </a:extLst>
           </p:cNvPr>
@@ -30898,16 +31119,21 @@
           </p:cNvPicPr>
           <p:nvPr/>
         </p:nvPicPr>
-        <p:blipFill>
-          <a:blip r:embed="rId3"/>
-          <a:stretch>
-            <a:fillRect/>
-          </a:stretch>
+        <p:blipFill rotWithShape="1">
+          <a:blip r:embed="rId3">
+            <a:extLst>
+              <a:ext uri="{96DAC541-7B7A-43D3-8B79-37D633B846F1}">
+                <asvg:svgBlip xmlns:asvg="http://schemas.microsoft.com/office/drawing/2016/SVG/main" r:embed="rId4"/>
+              </a:ext>
+            </a:extLst>
+          </a:blip>
+          <a:srcRect l="10241" t="17896" r="31684" b="65431"/>
+          <a:stretch/>
         </p:blipFill>
         <p:spPr>
           <a:xfrm>
-            <a:off x="3212851" y="1028114"/>
-            <a:ext cx="5210478" cy="2000451"/>
+            <a:off x="3121946" y="940577"/>
+            <a:ext cx="5837220" cy="2175526"/>
           </a:xfrm>
           <a:prstGeom prst="rect">
             <a:avLst/>
@@ -30944,6 +31170,35 @@
           <a:chExt cx="0" cy="0"/>
         </a:xfrm>
       </p:grpSpPr>
+      <p:pic>
+        <p:nvPicPr>
+          <p:cNvPr id="7" name="Picture 6" descr="Unlink Macro with name update">
+            <a:extLst>
+              <a:ext uri="{FF2B5EF4-FFF2-40B4-BE49-F238E27FC236}">
+                <a16:creationId xmlns:a16="http://schemas.microsoft.com/office/drawing/2014/main" id="{C3A58D42-388C-9A4E-9225-6BBD907235EC}"/>
+              </a:ext>
+            </a:extLst>
+          </p:cNvPr>
+          <p:cNvPicPr>
+            <a:picLocks noChangeAspect="1"/>
+          </p:cNvPicPr>
+          <p:nvPr/>
+        </p:nvPicPr>
+        <p:blipFill rotWithShape="1">
+          <a:blip r:embed="rId2"/>
+          <a:srcRect l="9064" t="13747" r="45468" b="49856"/>
+          <a:stretch/>
+        </p:blipFill>
+        <p:spPr>
+          <a:xfrm>
+            <a:off x="125567" y="1531254"/>
+            <a:ext cx="3167490" cy="994172"/>
+          </a:xfrm>
+          <a:prstGeom prst="rect">
+            <a:avLst/>
+          </a:prstGeom>
+        </p:spPr>
+      </p:pic>
       <p:sp>
         <p:nvSpPr>
           <p:cNvPr id="2" name="Title 1">
@@ -31006,7 +31261,7 @@
             </a:pPr>
             <a:r>
               <a:rPr lang="en-US" dirty="0"/>
-              <a:t>C is the forward pointer (in doubly linked list)  </a:t>
+              <a:t>Next is the forward pointer (in doubly linked list)  </a:t>
             </a:r>
           </a:p>
           <a:p>
@@ -31016,7 +31271,7 @@
             </a:pPr>
             <a:r>
               <a:rPr lang="en-US" dirty="0"/>
-              <a:t>A is the backward pointer (in doubly linked list) </a:t>
+              <a:t>Prev is the backward pointer (in doubly linked list) </a:t>
             </a:r>
           </a:p>
           <a:p>
@@ -31026,7 +31281,7 @@
             </a:pPr>
             <a:r>
               <a:rPr lang="en-US" dirty="0"/>
-              <a:t>C-&gt;bk = A</a:t>
+              <a:t>Next-&gt;bk = Prev</a:t>
             </a:r>
           </a:p>
           <a:p>
@@ -31054,7 +31309,7 @@
                   <a:srgbClr val="FF0000"/>
                 </a:solidFill>
               </a:rPr>
-              <a:t>A-&gt;fd = C</a:t>
+              <a:t>Prev-&gt;fd = Next</a:t>
             </a:r>
           </a:p>
           <a:p>
@@ -31089,36 +31344,6 @@
           </a:p>
         </p:txBody>
       </p:sp>
-      <p:pic>
-        <p:nvPicPr>
-          <p:cNvPr id="10" name="Picture 9">
-            <a:extLst>
-              <a:ext uri="{FF2B5EF4-FFF2-40B4-BE49-F238E27FC236}">
-                <a16:creationId xmlns:a16="http://schemas.microsoft.com/office/drawing/2014/main" id="{638B9040-355F-8544-8F16-56BC8DB81F43}"/>
-              </a:ext>
-            </a:extLst>
-          </p:cNvPr>
-          <p:cNvPicPr>
-            <a:picLocks noChangeAspect="1"/>
-          </p:cNvPicPr>
-          <p:nvPr/>
-        </p:nvPicPr>
-        <p:blipFill>
-          <a:blip r:embed="rId2"/>
-          <a:stretch>
-            <a:fillRect/>
-          </a:stretch>
-        </p:blipFill>
-        <p:spPr>
-          <a:xfrm>
-            <a:off x="417607" y="1186322"/>
-            <a:ext cx="2605908" cy="1124117"/>
-          </a:xfrm>
-          <a:prstGeom prst="rect">
-            <a:avLst/>
-          </a:prstGeom>
-        </p:spPr>
-      </p:pic>
       <p:cxnSp>
         <p:nvCxnSpPr>
           <p:cNvPr id="11" name="Straight Connector 10">
@@ -31135,7 +31360,7 @@
         </p:nvCxnSpPr>
         <p:spPr>
           <a:xfrm>
-            <a:off x="516038" y="2161376"/>
+            <a:off x="285219" y="1966067"/>
             <a:ext cx="2217831" cy="0"/>
           </a:xfrm>
           <a:prstGeom prst="line">
@@ -31164,10 +31389,10 @@
       </p:cxnSp>
       <p:pic>
         <p:nvPicPr>
-          <p:cNvPr id="13" name="Picture 12" descr="Fix A-&gt;fd to be C">
+          <p:cNvPr id="4" name="Graphic 3" descr="Edit Prevs fd (BK) to be the same as Next (FD) ">
             <a:extLst>
               <a:ext uri="{FF2B5EF4-FFF2-40B4-BE49-F238E27FC236}">
-                <a16:creationId xmlns:a16="http://schemas.microsoft.com/office/drawing/2014/main" id="{2FA93D8C-2E03-184F-8B1B-C09D391B1478}"/>
+                <a16:creationId xmlns:a16="http://schemas.microsoft.com/office/drawing/2014/main" id="{8E038AEC-93E7-7448-903F-A36A1B6523C3}"/>
               </a:ext>
             </a:extLst>
           </p:cNvPr>
@@ -31176,16 +31401,21 @@
           </p:cNvPicPr>
           <p:nvPr/>
         </p:nvPicPr>
-        <p:blipFill>
-          <a:blip r:embed="rId3"/>
-          <a:stretch>
-            <a:fillRect/>
-          </a:stretch>
+        <p:blipFill rotWithShape="1">
+          <a:blip r:embed="rId3">
+            <a:extLst>
+              <a:ext uri="{96DAC541-7B7A-43D3-8B79-37D633B846F1}">
+                <asvg:svgBlip xmlns:asvg="http://schemas.microsoft.com/office/drawing/2016/SVG/main" r:embed="rId4"/>
+              </a:ext>
+            </a:extLst>
+          </a:blip>
+          <a:srcRect l="12921" t="17087" r="31908" b="65998"/>
+          <a:stretch/>
         </p:blipFill>
         <p:spPr>
           <a:xfrm>
-            <a:off x="3401526" y="1218238"/>
-            <a:ext cx="5005355" cy="1921699"/>
+            <a:off x="3452709" y="1012678"/>
+            <a:ext cx="5119754" cy="2031323"/>
           </a:xfrm>
           <a:prstGeom prst="rect">
             <a:avLst/>
@@ -31224,10 +31454,10 @@
       </p:grpSpPr>
       <p:pic>
         <p:nvPicPr>
-          <p:cNvPr id="8" name="Picture 7" descr="Unlink macro easier to read">
+          <p:cNvPr id="6" name="Picture 5" descr="Unlink Macro with name update">
             <a:extLst>
               <a:ext uri="{FF2B5EF4-FFF2-40B4-BE49-F238E27FC236}">
-                <a16:creationId xmlns:a16="http://schemas.microsoft.com/office/drawing/2014/main" id="{B042087F-EE79-6B4E-A070-DB96BBD79732}"/>
+                <a16:creationId xmlns:a16="http://schemas.microsoft.com/office/drawing/2014/main" id="{820F483D-C4FA-2246-A891-3499DF38DED7}"/>
               </a:ext>
             </a:extLst>
           </p:cNvPr>
@@ -31244,8 +31474,8 @@
         </p:blipFill>
         <p:spPr>
           <a:xfrm>
-            <a:off x="403225" y="1037887"/>
-            <a:ext cx="8337550" cy="4105613"/>
+            <a:off x="97898" y="1268019"/>
+            <a:ext cx="9046102" cy="3546952"/>
           </a:xfrm>
           <a:prstGeom prst="rect">
             <a:avLst/>
@@ -31270,12 +31500,14 @@
         </p:nvSpPr>
         <p:spPr/>
         <p:txBody>
-          <a:bodyPr/>
+          <a:bodyPr>
+            <a:normAutofit fontScale="90000"/>
+          </a:bodyPr>
           <a:lstStyle/>
           <a:p>
             <a:r>
               <a:rPr lang="en-US" dirty="0"/>
-              <a:t>What If We Control A and C?</a:t>
+              <a:t>What If We Control Next and Prev?</a:t>
             </a:r>
           </a:p>
         </p:txBody>
@@ -31296,8 +31528,8 @@
         </p:nvCxnSpPr>
         <p:spPr>
           <a:xfrm>
-            <a:off x="1726040" y="2251033"/>
-            <a:ext cx="2429738" cy="0"/>
+            <a:off x="1166747" y="2330933"/>
+            <a:ext cx="3529540" cy="0"/>
           </a:xfrm>
           <a:prstGeom prst="line">
             <a:avLst/>
@@ -31339,8 +31571,8 @@
         </p:nvCxnSpPr>
         <p:spPr>
           <a:xfrm>
-            <a:off x="1726040" y="2876499"/>
-            <a:ext cx="2429738" cy="0"/>
+            <a:off x="1166747" y="2894254"/>
+            <a:ext cx="3529540" cy="0"/>
           </a:xfrm>
           <a:prstGeom prst="line">
             <a:avLst/>
@@ -31607,19 +31839,17 @@
       </p:grpSpPr>
       <p:pic>
         <p:nvPicPr>
-          <p:cNvPr id="7" name="Content Placeholder 6" descr="Corrupted FD (C) and BK (B) chunks">
+          <p:cNvPr id="18" name="Picture 17" descr="Unlink source code with the 'where' and 'what' added">
             <a:extLst>
               <a:ext uri="{FF2B5EF4-FFF2-40B4-BE49-F238E27FC236}">
-                <a16:creationId xmlns:a16="http://schemas.microsoft.com/office/drawing/2014/main" id="{271C8763-4272-0A47-8EEE-38A18D6D5FD5}"/>
+                <a16:creationId xmlns:a16="http://schemas.microsoft.com/office/drawing/2014/main" id="{E2F221EB-A958-914F-8D11-E0B99BA38699}"/>
               </a:ext>
             </a:extLst>
           </p:cNvPr>
           <p:cNvPicPr>
-            <a:picLocks noGrp="1" noChangeAspect="1"/>
+            <a:picLocks noChangeAspect="1"/>
           </p:cNvPicPr>
-          <p:nvPr>
-            <p:ph sz="half" idx="1"/>
-          </p:nvPr>
+          <p:nvPr/>
         </p:nvPicPr>
         <p:blipFill>
           <a:blip r:embed="rId2"/>
@@ -31629,35 +31859,8 @@
         </p:blipFill>
         <p:spPr>
           <a:xfrm>
-            <a:off x="386830" y="1268019"/>
-            <a:ext cx="5873761" cy="2408242"/>
-          </a:xfrm>
-        </p:spPr>
-      </p:pic>
-      <p:pic>
-        <p:nvPicPr>
-          <p:cNvPr id="13" name="Picture 12" descr="Unlink macro easier to read">
-            <a:extLst>
-              <a:ext uri="{FF2B5EF4-FFF2-40B4-BE49-F238E27FC236}">
-                <a16:creationId xmlns:a16="http://schemas.microsoft.com/office/drawing/2014/main" id="{A939A754-248F-0E48-B625-240A7AFF959F}"/>
-              </a:ext>
-            </a:extLst>
-          </p:cNvPr>
-          <p:cNvPicPr>
-            <a:picLocks noChangeAspect="1"/>
-          </p:cNvPicPr>
-          <p:nvPr/>
-        </p:nvPicPr>
-        <p:blipFill>
-          <a:blip r:embed="rId3"/>
-          <a:stretch>
-            <a:fillRect/>
-          </a:stretch>
-        </p:blipFill>
-        <p:spPr>
-          <a:xfrm>
-            <a:off x="2108541" y="3342512"/>
-            <a:ext cx="3101270" cy="1527141"/>
+            <a:off x="2459561" y="3406188"/>
+            <a:ext cx="3852462" cy="1495662"/>
           </a:xfrm>
           <a:prstGeom prst="rect">
             <a:avLst/>
@@ -31731,7 +31934,7 @@
             </a:r>
             <a:r>
               <a:rPr lang="en-US" b="1" i="1" dirty="0"/>
-              <a:t>A</a:t>
+              <a:t>Next</a:t>
             </a:r>
             <a:r>
               <a:rPr lang="en-US" dirty="0"/>
@@ -31739,7 +31942,7 @@
             </a:r>
             <a:r>
               <a:rPr lang="en-US" b="1" i="1" dirty="0"/>
-              <a:t>C</a:t>
+              <a:t>Prev</a:t>
             </a:r>
             <a:r>
               <a:rPr lang="en-US" dirty="0"/>
@@ -31760,11 +31963,11 @@
             </a:r>
             <a:r>
               <a:rPr lang="en-US" dirty="0"/>
-              <a:t> (C) of write and </a:t>
+              <a:t> (Next) of write and </a:t>
             </a:r>
             <a:r>
               <a:rPr lang="en-US" i="1" dirty="0"/>
-              <a:t>value (A) </a:t>
+              <a:t>value (Prev) </a:t>
             </a:r>
             <a:r>
               <a:rPr lang="en-US" dirty="0"/>
@@ -31792,8 +31995,8 @@
         </p:nvCxnSpPr>
         <p:spPr>
           <a:xfrm>
-            <a:off x="2477317" y="4325822"/>
-            <a:ext cx="1293456" cy="0"/>
+            <a:off x="2894566" y="4361333"/>
+            <a:ext cx="1677434" cy="0"/>
           </a:xfrm>
           <a:prstGeom prst="line">
             <a:avLst/>
@@ -31819,6 +32022,35 @@
           </a:fontRef>
         </p:style>
       </p:cxnSp>
+      <p:pic>
+        <p:nvPicPr>
+          <p:cNvPr id="16" name="Content Placeholder 15" descr="Corrupting the 'Cur' pointer and what results from this">
+            <a:extLst>
+              <a:ext uri="{FF2B5EF4-FFF2-40B4-BE49-F238E27FC236}">
+                <a16:creationId xmlns:a16="http://schemas.microsoft.com/office/drawing/2014/main" id="{105E8A7D-57E9-744E-905B-AEED1625AE56}"/>
+              </a:ext>
+            </a:extLst>
+          </p:cNvPr>
+          <p:cNvPicPr>
+            <a:picLocks noGrp="1" noChangeAspect="1"/>
+          </p:cNvPicPr>
+          <p:nvPr>
+            <p:ph sz="half" idx="1"/>
+          </p:nvPr>
+        </p:nvPicPr>
+        <p:blipFill>
+          <a:blip r:embed="rId3"/>
+          <a:stretch>
+            <a:fillRect/>
+          </a:stretch>
+        </p:blipFill>
+        <p:spPr>
+          <a:xfrm>
+            <a:off x="516460" y="1129837"/>
+            <a:ext cx="5972207" cy="2875507"/>
+          </a:xfrm>
+        </p:spPr>
+      </p:pic>
     </p:spTree>
     <p:extLst>
       <p:ext uri="{BB962C8B-B14F-4D97-AF65-F5344CB8AC3E}">
@@ -31940,6 +32172,35 @@
           <a:chExt cx="0" cy="0"/>
         </a:xfrm>
       </p:grpSpPr>
+      <p:pic>
+        <p:nvPicPr>
+          <p:cNvPr id="9" name="Content Placeholder 15" descr="Corrupting the 'Cur' pointer and what results from this">
+            <a:extLst>
+              <a:ext uri="{FF2B5EF4-FFF2-40B4-BE49-F238E27FC236}">
+                <a16:creationId xmlns:a16="http://schemas.microsoft.com/office/drawing/2014/main" id="{8A96B262-0186-7F4A-9FE3-F20B04740978}"/>
+              </a:ext>
+            </a:extLst>
+          </p:cNvPr>
+          <p:cNvPicPr>
+            <a:picLocks noGrp="1" noChangeAspect="1"/>
+          </p:cNvPicPr>
+          <p:nvPr>
+            <p:ph sz="half" idx="1"/>
+          </p:nvPr>
+        </p:nvPicPr>
+        <p:blipFill>
+          <a:blip r:embed="rId2"/>
+          <a:stretch>
+            <a:fillRect/>
+          </a:stretch>
+        </p:blipFill>
+        <p:spPr>
+          <a:xfrm>
+            <a:off x="516038" y="1398074"/>
+            <a:ext cx="5449756" cy="2623957"/>
+          </a:xfrm>
+        </p:spPr>
+      </p:pic>
       <p:sp>
         <p:nvSpPr>
           <p:cNvPr id="2" name="Title 1">
@@ -31982,7 +32243,7 @@
         </p:nvSpPr>
         <p:spPr>
           <a:xfrm>
-            <a:off x="516038" y="3395711"/>
+            <a:off x="482420" y="3943171"/>
             <a:ext cx="5633634" cy="1200329"/>
           </a:xfrm>
           <a:prstGeom prst="rect">
@@ -32030,36 +32291,6 @@
           </a:p>
         </p:txBody>
       </p:sp>
-      <p:pic>
-        <p:nvPicPr>
-          <p:cNvPr id="7" name="Content Placeholder 6" descr="Corrupted FD (C) and BK (B) chunks">
-            <a:extLst>
-              <a:ext uri="{FF2B5EF4-FFF2-40B4-BE49-F238E27FC236}">
-                <a16:creationId xmlns:a16="http://schemas.microsoft.com/office/drawing/2014/main" id="{13C0F780-89B6-284A-BF52-5366DF82E3D4}"/>
-              </a:ext>
-            </a:extLst>
-          </p:cNvPr>
-          <p:cNvPicPr>
-            <a:picLocks noChangeAspect="1"/>
-          </p:cNvPicPr>
-          <p:nvPr/>
-        </p:nvPicPr>
-        <p:blipFill>
-          <a:blip r:embed="rId2"/>
-          <a:stretch>
-            <a:fillRect/>
-          </a:stretch>
-        </p:blipFill>
-        <p:spPr>
-          <a:xfrm>
-            <a:off x="405676" y="956450"/>
-            <a:ext cx="5873761" cy="2408242"/>
-          </a:xfrm>
-          <a:prstGeom prst="rect">
-            <a:avLst/>
-          </a:prstGeom>
-        </p:spPr>
-      </p:pic>
       <p:sp>
         <p:nvSpPr>
           <p:cNvPr id="15" name="TextBox 14">
@@ -32074,8 +32305,8 @@
         </p:nvSpPr>
         <p:spPr>
           <a:xfrm>
-            <a:off x="621516" y="2160571"/>
-            <a:ext cx="923730" cy="307777"/>
+            <a:off x="708549" y="2859823"/>
+            <a:ext cx="640857" cy="307777"/>
           </a:xfrm>
           <a:prstGeom prst="rect">
             <a:avLst/>
@@ -32111,8 +32342,8 @@
         </p:nvSpPr>
         <p:spPr>
           <a:xfrm>
-            <a:off x="5355707" y="991261"/>
-            <a:ext cx="923730" cy="307777"/>
+            <a:off x="5178166" y="1520976"/>
+            <a:ext cx="903050" cy="307777"/>
           </a:xfrm>
           <a:prstGeom prst="rect">
             <a:avLst/>
@@ -32136,10 +32367,10 @@
       </p:sp>
       <p:pic>
         <p:nvPicPr>
-          <p:cNvPr id="20" name="Picture 19" descr="Unlink WHAT and WHERE sub">
+          <p:cNvPr id="10" name="Picture 9" descr="Unlink source code with the 'where' and 'what' added">
             <a:extLst>
               <a:ext uri="{FF2B5EF4-FFF2-40B4-BE49-F238E27FC236}">
-                <a16:creationId xmlns:a16="http://schemas.microsoft.com/office/drawing/2014/main" id="{2F6D7014-1CCB-5246-8C4A-932CEEF17EF6}"/>
+                <a16:creationId xmlns:a16="http://schemas.microsoft.com/office/drawing/2014/main" id="{1D3AB08C-848C-4348-9864-175F666EC891}"/>
               </a:ext>
             </a:extLst>
           </p:cNvPr>
@@ -32156,8 +32387,8 @@
         </p:blipFill>
         <p:spPr>
           <a:xfrm>
-            <a:off x="4133137" y="2925810"/>
-            <a:ext cx="3965834" cy="1736519"/>
+            <a:off x="5178166" y="3008243"/>
+            <a:ext cx="3852462" cy="1495662"/>
           </a:xfrm>
           <a:prstGeom prst="rect">
             <a:avLst/>
@@ -32194,36 +32425,6 @@
           <a:chExt cx="0" cy="0"/>
         </a:xfrm>
       </p:grpSpPr>
-      <p:pic>
-        <p:nvPicPr>
-          <p:cNvPr id="4" name="Picture 3" descr="Unlink WHAT and WHERE">
-            <a:extLst>
-              <a:ext uri="{FF2B5EF4-FFF2-40B4-BE49-F238E27FC236}">
-                <a16:creationId xmlns:a16="http://schemas.microsoft.com/office/drawing/2014/main" id="{837868BE-3B6F-2947-87BF-06744B0F4131}"/>
-              </a:ext>
-            </a:extLst>
-          </p:cNvPr>
-          <p:cNvPicPr>
-            <a:picLocks noChangeAspect="1"/>
-          </p:cNvPicPr>
-          <p:nvPr/>
-        </p:nvPicPr>
-        <p:blipFill>
-          <a:blip r:embed="rId2"/>
-          <a:stretch>
-            <a:fillRect/>
-          </a:stretch>
-        </p:blipFill>
-        <p:spPr>
-          <a:xfrm>
-            <a:off x="397069" y="1074705"/>
-            <a:ext cx="6022392" cy="2150854"/>
-          </a:xfrm>
-          <a:prstGeom prst="rect">
-            <a:avLst/>
-          </a:prstGeom>
-        </p:spPr>
-      </p:pic>
       <p:sp>
         <p:nvSpPr>
           <p:cNvPr id="2" name="Title 1">
@@ -32288,7 +32489,7 @@
             </a:pPr>
             <a:r>
               <a:rPr lang="en-US" dirty="0"/>
-              <a:t>WHERE = C (because of overwrite) </a:t>
+              <a:t>WHERE = Next (because of overwrite) </a:t>
             </a:r>
           </a:p>
           <a:p>
@@ -32298,7 +32499,7 @@
             </a:pPr>
             <a:r>
               <a:rPr lang="en-US" dirty="0"/>
-              <a:t>WHAT = A (because of overwrite)</a:t>
+              <a:t>WHAT = Prev (because of overwrite)</a:t>
             </a:r>
           </a:p>
           <a:p>
@@ -32318,10 +32519,40 @@
       </p:sp>
       <p:pic>
         <p:nvPicPr>
-          <p:cNvPr id="10" name="Picture 9" descr="Unlink WHAT and WHERE sub">
+          <p:cNvPr id="5" name="Picture 4" descr="A picture containing diagram&#10;&#10;Description automatically generated">
             <a:extLst>
               <a:ext uri="{FF2B5EF4-FFF2-40B4-BE49-F238E27FC236}">
-                <a16:creationId xmlns:a16="http://schemas.microsoft.com/office/drawing/2014/main" id="{04388542-5EDC-624D-A941-8FFE5057DD6B}"/>
+                <a16:creationId xmlns:a16="http://schemas.microsoft.com/office/drawing/2014/main" id="{595D26CB-A95F-7F43-A8D7-BBE213BCBEF4}"/>
+              </a:ext>
+            </a:extLst>
+          </p:cNvPr>
+          <p:cNvPicPr>
+            <a:picLocks noChangeAspect="1"/>
+          </p:cNvPicPr>
+          <p:nvPr/>
+        </p:nvPicPr>
+        <p:blipFill>
+          <a:blip r:embed="rId2"/>
+          <a:stretch>
+            <a:fillRect/>
+          </a:stretch>
+        </p:blipFill>
+        <p:spPr>
+          <a:xfrm>
+            <a:off x="516038" y="1017539"/>
+            <a:ext cx="5511900" cy="1968536"/>
+          </a:xfrm>
+          <a:prstGeom prst="rect">
+            <a:avLst/>
+          </a:prstGeom>
+        </p:spPr>
+      </p:pic>
+      <p:pic>
+        <p:nvPicPr>
+          <p:cNvPr id="11" name="Picture 10" descr="Unlink source code with the 'where' and 'what' added">
+            <a:extLst>
+              <a:ext uri="{FF2B5EF4-FFF2-40B4-BE49-F238E27FC236}">
+                <a16:creationId xmlns:a16="http://schemas.microsoft.com/office/drawing/2014/main" id="{B50149A0-CADB-3E4B-8950-B8DB51A403AD}"/>
               </a:ext>
             </a:extLst>
           </p:cNvPr>
@@ -32338,8 +32569,8 @@
         </p:blipFill>
         <p:spPr>
           <a:xfrm>
-            <a:off x="4133137" y="2925810"/>
-            <a:ext cx="3965834" cy="1736519"/>
+            <a:off x="4775500" y="2981936"/>
+            <a:ext cx="3852462" cy="1495662"/>
           </a:xfrm>
           <a:prstGeom prst="rect">
             <a:avLst/>
@@ -32378,10 +32609,10 @@
       </p:grpSpPr>
       <p:pic>
         <p:nvPicPr>
-          <p:cNvPr id="14" name="Picture 13" descr="Unlink WHAT and WHERE sub">
+          <p:cNvPr id="7" name="Picture 6" descr="Unlink source code with the 'where' and 'what' added">
             <a:extLst>
               <a:ext uri="{FF2B5EF4-FFF2-40B4-BE49-F238E27FC236}">
-                <a16:creationId xmlns:a16="http://schemas.microsoft.com/office/drawing/2014/main" id="{5EF0B984-2378-4C41-8402-1CFD34125A34}"/>
+                <a16:creationId xmlns:a16="http://schemas.microsoft.com/office/drawing/2014/main" id="{082D4EF4-EEA7-0342-B8AB-30F0F314CE6A}"/>
               </a:ext>
             </a:extLst>
           </p:cNvPr>
@@ -32392,13 +32623,13 @@
         </p:nvPicPr>
         <p:blipFill rotWithShape="1">
           <a:blip r:embed="rId2"/>
-          <a:srcRect l="11066" t="56113" r="17881" b="14925"/>
+          <a:srcRect l="10132" t="50000" b="18158"/>
           <a:stretch/>
         </p:blipFill>
         <p:spPr>
           <a:xfrm>
-            <a:off x="4944048" y="3888665"/>
-            <a:ext cx="3943350" cy="703823"/>
+            <a:off x="4942895" y="3962500"/>
+            <a:ext cx="4042949" cy="556151"/>
           </a:xfrm>
           <a:prstGeom prst="rect">
             <a:avLst/>
@@ -32530,7 +32761,7 @@
         <p:spPr>
           <a:xfrm>
             <a:off x="4944283" y="4223427"/>
-            <a:ext cx="2417570" cy="17149"/>
+            <a:ext cx="2020086" cy="17148"/>
           </a:xfrm>
           <a:prstGeom prst="line">
             <a:avLst/>
@@ -32558,10 +32789,10 @@
       </p:cxnSp>
       <p:pic>
         <p:nvPicPr>
-          <p:cNvPr id="10" name="Picture 9" descr="Write WHERE to WHAT">
+          <p:cNvPr id="13" name="Picture 12" descr="WHERE=WHAT for primative">
             <a:extLst>
               <a:ext uri="{FF2B5EF4-FFF2-40B4-BE49-F238E27FC236}">
-                <a16:creationId xmlns:a16="http://schemas.microsoft.com/office/drawing/2014/main" id="{236B341C-B88E-7140-A09E-44F0AFE94697}"/>
+                <a16:creationId xmlns:a16="http://schemas.microsoft.com/office/drawing/2014/main" id="{47B8FC93-7EE9-C140-BBD2-19EACBD85E32}"/>
               </a:ext>
             </a:extLst>
           </p:cNvPr>
@@ -32578,8 +32809,8 @@
         </p:blipFill>
         <p:spPr>
           <a:xfrm>
-            <a:off x="426224" y="1106694"/>
-            <a:ext cx="5097498" cy="1843292"/>
+            <a:off x="457199" y="1247290"/>
+            <a:ext cx="4907819" cy="1863154"/>
           </a:xfrm>
           <a:prstGeom prst="rect">
             <a:avLst/>
@@ -32618,10 +32849,10 @@
       </p:grpSpPr>
       <p:pic>
         <p:nvPicPr>
-          <p:cNvPr id="14" name="Picture 13" descr="Unlink WHAT and WHERE sub">
+          <p:cNvPr id="9" name="Picture 8" descr="Unlink source code with the 'where' and 'what' added">
             <a:extLst>
               <a:ext uri="{FF2B5EF4-FFF2-40B4-BE49-F238E27FC236}">
-                <a16:creationId xmlns:a16="http://schemas.microsoft.com/office/drawing/2014/main" id="{5EF0B984-2378-4C41-8402-1CFD34125A34}"/>
+                <a16:creationId xmlns:a16="http://schemas.microsoft.com/office/drawing/2014/main" id="{4495CFB2-BF93-4D48-AD5B-6AA8AAEDBAB8}"/>
               </a:ext>
             </a:extLst>
           </p:cNvPr>
@@ -32632,13 +32863,13 @@
         </p:nvPicPr>
         <p:blipFill rotWithShape="1">
           <a:blip r:embed="rId2"/>
-          <a:srcRect l="11066" t="56113" r="17881" b="14925"/>
+          <a:srcRect l="10132" t="50000" b="18158"/>
           <a:stretch/>
         </p:blipFill>
         <p:spPr>
           <a:xfrm>
-            <a:off x="4374881" y="3888665"/>
-            <a:ext cx="3943350" cy="703823"/>
+            <a:off x="4942895" y="3962500"/>
+            <a:ext cx="4042949" cy="556151"/>
           </a:xfrm>
           <a:prstGeom prst="rect">
             <a:avLst/>
@@ -32687,7 +32918,7 @@
         </p:nvSpPr>
         <p:spPr>
           <a:xfrm>
-            <a:off x="516038" y="3115160"/>
+            <a:off x="276341" y="3505778"/>
             <a:ext cx="5633634" cy="923330"/>
           </a:xfrm>
           <a:prstGeom prst="rect">
@@ -32716,10 +32947,7 @@
             </a:endParaRPr>
           </a:p>
           <a:p>
-            <a:pPr marL="742950" lvl="1" indent="-285750">
-              <a:buFont typeface="Arial" panose="020B0604020202020204" pitchFamily="34" charset="0"/>
-              <a:buChar char="•"/>
-            </a:pPr>
+            <a:pPr lvl="1"/>
             <a:endParaRPr lang="en-US" dirty="0">
               <a:solidFill>
                 <a:srgbClr val="FF0000"/>
@@ -32747,7 +32975,7 @@
         </p:nvCxnSpPr>
         <p:spPr>
           <a:xfrm>
-            <a:off x="4375116" y="4223427"/>
+            <a:off x="4942895" y="4223426"/>
             <a:ext cx="2417570" cy="17149"/>
           </a:xfrm>
           <a:prstGeom prst="line">
@@ -32776,10 +33004,10 @@
       </p:cxnSp>
       <p:pic>
         <p:nvPicPr>
-          <p:cNvPr id="7" name="Picture 6" descr="Unlink with shellcode">
+          <p:cNvPr id="4" name="Picture 3" descr="Write to function pointer with addrtess of the shellcode">
             <a:extLst>
               <a:ext uri="{FF2B5EF4-FFF2-40B4-BE49-F238E27FC236}">
-                <a16:creationId xmlns:a16="http://schemas.microsoft.com/office/drawing/2014/main" id="{328EC4B7-67FA-0B45-AAEE-8C0D7CC39A81}"/>
+                <a16:creationId xmlns:a16="http://schemas.microsoft.com/office/drawing/2014/main" id="{F02F76B3-68FE-ED47-87A5-27DF2AC1B90B}"/>
               </a:ext>
             </a:extLst>
           </p:cNvPr>
@@ -32796,8 +33024,8 @@
         </p:blipFill>
         <p:spPr>
           <a:xfrm>
-            <a:off x="516038" y="1268018"/>
-            <a:ext cx="5063668" cy="1831059"/>
+            <a:off x="628650" y="1368123"/>
+            <a:ext cx="5633634" cy="2138694"/>
           </a:xfrm>
           <a:prstGeom prst="rect">
             <a:avLst/>
@@ -32867,108 +33095,6 @@
           </a:p>
         </p:txBody>
       </p:sp>
-      <p:pic>
-        <p:nvPicPr>
-          <p:cNvPr id="5" name="Picture 4" descr="Diagram&#10;&#10;Description automatically generated">
-            <a:extLst>
-              <a:ext uri="{FF2B5EF4-FFF2-40B4-BE49-F238E27FC236}">
-                <a16:creationId xmlns:a16="http://schemas.microsoft.com/office/drawing/2014/main" id="{2A851F68-05FF-C347-A0AA-D49E16724400}"/>
-              </a:ext>
-            </a:extLst>
-          </p:cNvPr>
-          <p:cNvPicPr>
-            <a:picLocks noChangeAspect="1"/>
-          </p:cNvPicPr>
-          <p:nvPr/>
-        </p:nvPicPr>
-        <p:blipFill>
-          <a:blip r:embed="rId2"/>
-          <a:stretch>
-            <a:fillRect/>
-          </a:stretch>
-        </p:blipFill>
-        <p:spPr>
-          <a:xfrm>
-            <a:off x="628650" y="1082351"/>
-            <a:ext cx="5359023" cy="1913937"/>
-          </a:xfrm>
-          <a:prstGeom prst="rect">
-            <a:avLst/>
-          </a:prstGeom>
-        </p:spPr>
-      </p:pic>
-      <p:pic>
-        <p:nvPicPr>
-          <p:cNvPr id="11" name="Picture 10" descr="Unlink WHAT and WHERE sub">
-            <a:extLst>
-              <a:ext uri="{FF2B5EF4-FFF2-40B4-BE49-F238E27FC236}">
-                <a16:creationId xmlns:a16="http://schemas.microsoft.com/office/drawing/2014/main" id="{D1BB8929-39F9-5846-9ABB-0428C353F21F}"/>
-              </a:ext>
-            </a:extLst>
-          </p:cNvPr>
-          <p:cNvPicPr>
-            <a:picLocks noChangeAspect="1"/>
-          </p:cNvPicPr>
-          <p:nvPr/>
-        </p:nvPicPr>
-        <p:blipFill rotWithShape="1">
-          <a:blip r:embed="rId3"/>
-          <a:srcRect l="11066" t="56113" r="17881" b="14925"/>
-          <a:stretch/>
-        </p:blipFill>
-        <p:spPr>
-          <a:xfrm>
-            <a:off x="4953379" y="3888665"/>
-            <a:ext cx="3943350" cy="703823"/>
-          </a:xfrm>
-          <a:prstGeom prst="rect">
-            <a:avLst/>
-          </a:prstGeom>
-        </p:spPr>
-      </p:pic>
-      <p:cxnSp>
-        <p:nvCxnSpPr>
-          <p:cNvPr id="12" name="Straight Connector 11">
-            <a:extLst>
-              <a:ext uri="{FF2B5EF4-FFF2-40B4-BE49-F238E27FC236}">
-                <a16:creationId xmlns:a16="http://schemas.microsoft.com/office/drawing/2014/main" id="{BA0B92DA-8A49-694A-A617-4A849B067B92}"/>
-              </a:ext>
-            </a:extLst>
-          </p:cNvPr>
-          <p:cNvCxnSpPr>
-            <a:cxnSpLocks/>
-          </p:cNvCxnSpPr>
-          <p:nvPr/>
-        </p:nvCxnSpPr>
-        <p:spPr>
-          <a:xfrm>
-            <a:off x="4953379" y="4503345"/>
-            <a:ext cx="2417570" cy="17149"/>
-          </a:xfrm>
-          <a:prstGeom prst="line">
-            <a:avLst/>
-          </a:prstGeom>
-          <a:ln w="25400">
-            <a:solidFill>
-              <a:srgbClr val="FF0000"/>
-            </a:solidFill>
-          </a:ln>
-        </p:spPr>
-        <p:style>
-          <a:lnRef idx="1">
-            <a:schemeClr val="accent1"/>
-          </a:lnRef>
-          <a:fillRef idx="0">
-            <a:schemeClr val="accent1"/>
-          </a:fillRef>
-          <a:effectRef idx="0">
-            <a:schemeClr val="accent1"/>
-          </a:effectRef>
-          <a:fontRef idx="minor">
-            <a:schemeClr val="tx1"/>
-          </a:fontRef>
-        </p:style>
-      </p:cxnSp>
       <p:sp>
         <p:nvSpPr>
           <p:cNvPr id="14" name="TextBox 13">
@@ -33069,6 +33195,108 @@
           </a:p>
         </p:txBody>
       </p:sp>
+      <p:pic>
+        <p:nvPicPr>
+          <p:cNvPr id="4" name="Picture 3" descr="Overwrite shellcode with address of the function pointer">
+            <a:extLst>
+              <a:ext uri="{FF2B5EF4-FFF2-40B4-BE49-F238E27FC236}">
+                <a16:creationId xmlns:a16="http://schemas.microsoft.com/office/drawing/2014/main" id="{D879EF65-EFB8-AA4F-98F9-6BEF553A7165}"/>
+              </a:ext>
+            </a:extLst>
+          </p:cNvPr>
+          <p:cNvPicPr>
+            <a:picLocks noChangeAspect="1"/>
+          </p:cNvPicPr>
+          <p:nvPr/>
+        </p:nvPicPr>
+        <p:blipFill>
+          <a:blip r:embed="rId2"/>
+          <a:stretch>
+            <a:fillRect/>
+          </a:stretch>
+        </p:blipFill>
+        <p:spPr>
+          <a:xfrm>
+            <a:off x="325638" y="1069019"/>
+            <a:ext cx="5466152" cy="2189856"/>
+          </a:xfrm>
+          <a:prstGeom prst="rect">
+            <a:avLst/>
+          </a:prstGeom>
+        </p:spPr>
+      </p:pic>
+      <p:pic>
+        <p:nvPicPr>
+          <p:cNvPr id="9" name="Picture 8" descr="Unlink source code with the 'where' and 'what' added">
+            <a:extLst>
+              <a:ext uri="{FF2B5EF4-FFF2-40B4-BE49-F238E27FC236}">
+                <a16:creationId xmlns:a16="http://schemas.microsoft.com/office/drawing/2014/main" id="{B62493D9-D6CF-1449-AAB8-CF846E6DF6CB}"/>
+              </a:ext>
+            </a:extLst>
+          </p:cNvPr>
+          <p:cNvPicPr>
+            <a:picLocks noChangeAspect="1"/>
+          </p:cNvPicPr>
+          <p:nvPr/>
+        </p:nvPicPr>
+        <p:blipFill rotWithShape="1">
+          <a:blip r:embed="rId3"/>
+          <a:srcRect l="10132" t="50000" b="18158"/>
+          <a:stretch/>
+        </p:blipFill>
+        <p:spPr>
+          <a:xfrm>
+            <a:off x="4942895" y="3967865"/>
+            <a:ext cx="4042949" cy="556151"/>
+          </a:xfrm>
+          <a:prstGeom prst="rect">
+            <a:avLst/>
+          </a:prstGeom>
+        </p:spPr>
+      </p:pic>
+      <p:cxnSp>
+        <p:nvCxnSpPr>
+          <p:cNvPr id="10" name="Straight Connector 9">
+            <a:extLst>
+              <a:ext uri="{FF2B5EF4-FFF2-40B4-BE49-F238E27FC236}">
+                <a16:creationId xmlns:a16="http://schemas.microsoft.com/office/drawing/2014/main" id="{CDADC01A-DD85-BA45-BAAA-53426310694A}"/>
+              </a:ext>
+            </a:extLst>
+          </p:cNvPr>
+          <p:cNvCxnSpPr>
+            <a:cxnSpLocks/>
+          </p:cNvCxnSpPr>
+          <p:nvPr/>
+        </p:nvCxnSpPr>
+        <p:spPr>
+          <a:xfrm>
+            <a:off x="4971247" y="4506867"/>
+            <a:ext cx="2417570" cy="17149"/>
+          </a:xfrm>
+          <a:prstGeom prst="line">
+            <a:avLst/>
+          </a:prstGeom>
+          <a:ln w="25400">
+            <a:solidFill>
+              <a:srgbClr val="FF0000"/>
+            </a:solidFill>
+          </a:ln>
+        </p:spPr>
+        <p:style>
+          <a:lnRef idx="1">
+            <a:schemeClr val="accent1"/>
+          </a:lnRef>
+          <a:fillRef idx="0">
+            <a:schemeClr val="accent1"/>
+          </a:fillRef>
+          <a:effectRef idx="0">
+            <a:schemeClr val="accent1"/>
+          </a:effectRef>
+          <a:fontRef idx="minor">
+            <a:schemeClr val="tx1"/>
+          </a:fontRef>
+        </p:style>
+      </p:cxnSp>
     </p:spTree>
     <p:extLst>
       <p:ext uri="{BB962C8B-B14F-4D97-AF65-F5344CB8AC3E}">
@@ -33099,35 +33327,6 @@
           <a:chExt cx="0" cy="0"/>
         </a:xfrm>
       </p:grpSpPr>
-      <p:pic>
-        <p:nvPicPr>
-          <p:cNvPr id="14" name="Picture 13" descr="Unlink WHAT and WHERE sub">
-            <a:extLst>
-              <a:ext uri="{FF2B5EF4-FFF2-40B4-BE49-F238E27FC236}">
-                <a16:creationId xmlns:a16="http://schemas.microsoft.com/office/drawing/2014/main" id="{5EF0B984-2378-4C41-8402-1CFD34125A34}"/>
-              </a:ext>
-            </a:extLst>
-          </p:cNvPr>
-          <p:cNvPicPr>
-            <a:picLocks noChangeAspect="1"/>
-          </p:cNvPicPr>
-          <p:nvPr/>
-        </p:nvPicPr>
-        <p:blipFill rotWithShape="1">
-          <a:blip r:embed="rId2"/>
-          <a:srcRect l="11066" t="56113" r="17881" b="14925"/>
-          <a:stretch/>
-        </p:blipFill>
-        <p:spPr>
-          <a:xfrm>
-            <a:off x="4374881" y="3888665"/>
-            <a:ext cx="3943350" cy="703823"/>
-          </a:xfrm>
-          <a:prstGeom prst="rect">
-            <a:avLst/>
-          </a:prstGeom>
-        </p:spPr>
-      </p:pic>
       <p:sp>
         <p:nvSpPr>
           <p:cNvPr id="2" name="Title 1">
@@ -33203,12 +33402,41 @@
           </a:p>
         </p:txBody>
       </p:sp>
+      <p:pic>
+        <p:nvPicPr>
+          <p:cNvPr id="7" name="Picture 6" descr="Unlink source code with the 'where' and 'what' added">
+            <a:extLst>
+              <a:ext uri="{FF2B5EF4-FFF2-40B4-BE49-F238E27FC236}">
+                <a16:creationId xmlns:a16="http://schemas.microsoft.com/office/drawing/2014/main" id="{47009602-4305-1E41-8390-0B39A092AEBB}"/>
+              </a:ext>
+            </a:extLst>
+          </p:cNvPr>
+          <p:cNvPicPr>
+            <a:picLocks noChangeAspect="1"/>
+          </p:cNvPicPr>
+          <p:nvPr/>
+        </p:nvPicPr>
+        <p:blipFill rotWithShape="1">
+          <a:blip r:embed="rId2"/>
+          <a:srcRect l="10132" t="50000" b="18158"/>
+          <a:stretch/>
+        </p:blipFill>
+        <p:spPr>
+          <a:xfrm>
+            <a:off x="4942895" y="3962500"/>
+            <a:ext cx="4042949" cy="556151"/>
+          </a:xfrm>
+          <a:prstGeom prst="rect">
+            <a:avLst/>
+          </a:prstGeom>
+        </p:spPr>
+      </p:pic>
       <p:cxnSp>
         <p:nvCxnSpPr>
-          <p:cNvPr id="6" name="Straight Connector 5">
+          <p:cNvPr id="9" name="Straight Connector 8">
             <a:extLst>
               <a:ext uri="{FF2B5EF4-FFF2-40B4-BE49-F238E27FC236}">
-                <a16:creationId xmlns:a16="http://schemas.microsoft.com/office/drawing/2014/main" id="{CD171E65-600E-2842-B04B-B40AD3C7287B}"/>
+                <a16:creationId xmlns:a16="http://schemas.microsoft.com/office/drawing/2014/main" id="{D6096FD3-DCEC-5347-8039-A3035CEC75DC}"/>
               </a:ext>
             </a:extLst>
           </p:cNvPr>
@@ -33219,7 +33447,7 @@
         </p:nvCxnSpPr>
         <p:spPr>
           <a:xfrm>
-            <a:off x="4374881" y="4494015"/>
+            <a:off x="4940887" y="4501502"/>
             <a:ext cx="2417570" cy="17149"/>
           </a:xfrm>
           <a:prstGeom prst="line">
@@ -33248,10 +33476,10 @@
       </p:cxnSp>
       <p:pic>
         <p:nvPicPr>
-          <p:cNvPr id="4" name="Picture 3" descr="BK write to FD">
+          <p:cNvPr id="10" name="Picture 9" descr="Overwrite shellcode with address of the function pointer">
             <a:extLst>
               <a:ext uri="{FF2B5EF4-FFF2-40B4-BE49-F238E27FC236}">
-                <a16:creationId xmlns:a16="http://schemas.microsoft.com/office/drawing/2014/main" id="{5325E413-9E23-F544-82B7-CE7080FCB3AD}"/>
+                <a16:creationId xmlns:a16="http://schemas.microsoft.com/office/drawing/2014/main" id="{8262C190-E297-AE42-A08E-00E7C97ECAAC}"/>
               </a:ext>
             </a:extLst>
           </p:cNvPr>
@@ -33268,8 +33496,8 @@
         </p:blipFill>
         <p:spPr>
           <a:xfrm>
-            <a:off x="628650" y="1175589"/>
-            <a:ext cx="5633634" cy="2012012"/>
+            <a:off x="325638" y="1069019"/>
+            <a:ext cx="5466152" cy="2189856"/>
           </a:xfrm>
           <a:prstGeom prst="rect">
             <a:avLst/>

</xml_diff>

<commit_message>
Unsafe unlink slides with 'prev' and 'next' terminology
</commit_message>
<xml_diff>
--- a/modules/unlink/Unlink.pptx
+++ b/modules/unlink/Unlink.pptx
@@ -5,7 +5,7 @@
     <p:sldMasterId id="2147483660" r:id="rId1"/>
   </p:sldMasterIdLst>
   <p:notesMasterIdLst>
-    <p:notesMasterId r:id="rId98"/>
+    <p:notesMasterId r:id="rId103"/>
   </p:notesMasterIdLst>
   <p:sldIdLst>
     <p:sldId id="440" r:id="rId2"/>
@@ -93,17 +93,22 @@
     <p:sldId id="515" r:id="rId84"/>
     <p:sldId id="461" r:id="rId85"/>
     <p:sldId id="517" r:id="rId86"/>
-    <p:sldId id="462" r:id="rId87"/>
-    <p:sldId id="463" r:id="rId88"/>
-    <p:sldId id="465" r:id="rId89"/>
-    <p:sldId id="467" r:id="rId90"/>
-    <p:sldId id="468" r:id="rId91"/>
-    <p:sldId id="466" r:id="rId92"/>
-    <p:sldId id="469" r:id="rId93"/>
-    <p:sldId id="458" r:id="rId94"/>
-    <p:sldId id="470" r:id="rId95"/>
-    <p:sldId id="442" r:id="rId96"/>
-    <p:sldId id="429" r:id="rId97"/>
+    <p:sldId id="519" r:id="rId87"/>
+    <p:sldId id="518" r:id="rId88"/>
+    <p:sldId id="520" r:id="rId89"/>
+    <p:sldId id="521" r:id="rId90"/>
+    <p:sldId id="467" r:id="rId91"/>
+    <p:sldId id="468" r:id="rId92"/>
+    <p:sldId id="466" r:id="rId93"/>
+    <p:sldId id="522" r:id="rId94"/>
+    <p:sldId id="523" r:id="rId95"/>
+    <p:sldId id="524" r:id="rId96"/>
+    <p:sldId id="525" r:id="rId97"/>
+    <p:sldId id="526" r:id="rId98"/>
+    <p:sldId id="458" r:id="rId99"/>
+    <p:sldId id="470" r:id="rId100"/>
+    <p:sldId id="442" r:id="rId101"/>
+    <p:sldId id="429" r:id="rId102"/>
   </p:sldIdLst>
   <p:sldSz cx="9144000" cy="5143500" type="screen16x9"/>
   <p:notesSz cx="6858000" cy="9144000"/>
@@ -24628,7 +24633,7 @@
           <a:p>
             <a:fld id="{2DA23E8D-1792-1541-9147-970A8DD8A355}" type="datetimeFigureOut">
               <a:rPr lang="en-US" smtClean="0"/>
-              <a:t>12/5/21</a:t>
+              <a:t>12/18/21</a:t>
             </a:fld>
             <a:endParaRPr lang="en-US" dirty="0"/>
           </a:p>
@@ -24979,6 +24984,180 @@
 </p:notes>
 </file>
 
+<file path=ppt/notesSlides/notesSlide10.xml><?xml version="1.0" encoding="utf-8"?>
+<p:notes xmlns:a="http://schemas.openxmlformats.org/drawingml/2006/main" xmlns:r="http://schemas.openxmlformats.org/officeDocument/2006/relationships" xmlns:p="http://schemas.openxmlformats.org/presentationml/2006/main">
+  <p:cSld>
+    <p:spTree>
+      <p:nvGrpSpPr>
+        <p:cNvPr id="1" name=""/>
+        <p:cNvGrpSpPr/>
+        <p:nvPr/>
+      </p:nvGrpSpPr>
+      <p:grpSpPr>
+        <a:xfrm>
+          <a:off x="0" y="0"/>
+          <a:ext cx="0" cy="0"/>
+          <a:chOff x="0" y="0"/>
+          <a:chExt cx="0" cy="0"/>
+        </a:xfrm>
+      </p:grpSpPr>
+      <p:sp>
+        <p:nvSpPr>
+          <p:cNvPr id="2" name="Slide Image Placeholder 1"/>
+          <p:cNvSpPr>
+            <a:spLocks noGrp="1" noRot="1" noChangeAspect="1"/>
+          </p:cNvSpPr>
+          <p:nvPr>
+            <p:ph type="sldImg"/>
+          </p:nvPr>
+        </p:nvSpPr>
+        <p:spPr/>
+      </p:sp>
+      <p:sp>
+        <p:nvSpPr>
+          <p:cNvPr id="3" name="Notes Placeholder 2"/>
+          <p:cNvSpPr>
+            <a:spLocks noGrp="1"/>
+          </p:cNvSpPr>
+          <p:nvPr>
+            <p:ph type="body" idx="1"/>
+          </p:nvPr>
+        </p:nvSpPr>
+        <p:spPr/>
+        <p:txBody>
+          <a:bodyPr/>
+          <a:lstStyle/>
+          <a:p>
+            <a:r>
+              <a:rPr lang="en-US" dirty="0"/>
+              <a:t>Is this useful? Let’s see how the rest of the macro works out!</a:t>
+            </a:r>
+          </a:p>
+        </p:txBody>
+      </p:sp>
+      <p:sp>
+        <p:nvSpPr>
+          <p:cNvPr id="4" name="Slide Number Placeholder 3"/>
+          <p:cNvSpPr>
+            <a:spLocks noGrp="1"/>
+          </p:cNvSpPr>
+          <p:nvPr>
+            <p:ph type="sldNum" sz="quarter" idx="5"/>
+          </p:nvPr>
+        </p:nvSpPr>
+        <p:spPr/>
+        <p:txBody>
+          <a:bodyPr/>
+          <a:lstStyle/>
+          <a:p>
+            <a:fld id="{AC55928C-CD14-454C-B617-1AFCF9A58596}" type="slidenum">
+              <a:rPr lang="en-US" smtClean="0"/>
+              <a:t>90</a:t>
+            </a:fld>
+            <a:endParaRPr lang="en-US" dirty="0"/>
+          </a:p>
+        </p:txBody>
+      </p:sp>
+    </p:spTree>
+    <p:extLst>
+      <p:ext uri="{BB962C8B-B14F-4D97-AF65-F5344CB8AC3E}">
+        <p14:creationId xmlns:p14="http://schemas.microsoft.com/office/powerpoint/2010/main" val="3063626548"/>
+      </p:ext>
+    </p:extLst>
+  </p:cSld>
+  <p:clrMapOvr>
+    <a:masterClrMapping/>
+  </p:clrMapOvr>
+</p:notes>
+</file>
+
+<file path=ppt/notesSlides/notesSlide11.xml><?xml version="1.0" encoding="utf-8"?>
+<p:notes xmlns:a="http://schemas.openxmlformats.org/drawingml/2006/main" xmlns:r="http://schemas.openxmlformats.org/officeDocument/2006/relationships" xmlns:p="http://schemas.openxmlformats.org/presentationml/2006/main">
+  <p:cSld>
+    <p:spTree>
+      <p:nvGrpSpPr>
+        <p:cNvPr id="1" name=""/>
+        <p:cNvGrpSpPr/>
+        <p:nvPr/>
+      </p:nvGrpSpPr>
+      <p:grpSpPr>
+        <a:xfrm>
+          <a:off x="0" y="0"/>
+          <a:ext cx="0" cy="0"/>
+          <a:chOff x="0" y="0"/>
+          <a:chExt cx="0" cy="0"/>
+        </a:xfrm>
+      </p:grpSpPr>
+      <p:sp>
+        <p:nvSpPr>
+          <p:cNvPr id="2" name="Slide Image Placeholder 1"/>
+          <p:cNvSpPr>
+            <a:spLocks noGrp="1" noRot="1" noChangeAspect="1"/>
+          </p:cNvSpPr>
+          <p:nvPr>
+            <p:ph type="sldImg"/>
+          </p:nvPr>
+        </p:nvSpPr>
+        <p:spPr/>
+      </p:sp>
+      <p:sp>
+        <p:nvSpPr>
+          <p:cNvPr id="3" name="Notes Placeholder 2"/>
+          <p:cNvSpPr>
+            <a:spLocks noGrp="1"/>
+          </p:cNvSpPr>
+          <p:nvPr>
+            <p:ph type="body" idx="1"/>
+          </p:nvPr>
+        </p:nvSpPr>
+        <p:spPr/>
+        <p:txBody>
+          <a:bodyPr/>
+          <a:lstStyle/>
+          <a:p>
+            <a:r>
+              <a:rPr lang="en-US" dirty="0"/>
+              <a:t>Removed the security check… just remember that it is there. </a:t>
+            </a:r>
+          </a:p>
+        </p:txBody>
+      </p:sp>
+      <p:sp>
+        <p:nvSpPr>
+          <p:cNvPr id="4" name="Slide Number Placeholder 3"/>
+          <p:cNvSpPr>
+            <a:spLocks noGrp="1"/>
+          </p:cNvSpPr>
+          <p:nvPr>
+            <p:ph type="sldNum" sz="quarter" idx="5"/>
+          </p:nvPr>
+        </p:nvSpPr>
+        <p:spPr/>
+        <p:txBody>
+          <a:bodyPr/>
+          <a:lstStyle/>
+          <a:p>
+            <a:fld id="{AC55928C-CD14-454C-B617-1AFCF9A58596}" type="slidenum">
+              <a:rPr lang="en-US" smtClean="0"/>
+              <a:t>91</a:t>
+            </a:fld>
+            <a:endParaRPr lang="en-US" dirty="0"/>
+          </a:p>
+        </p:txBody>
+      </p:sp>
+    </p:spTree>
+    <p:extLst>
+      <p:ext uri="{BB962C8B-B14F-4D97-AF65-F5344CB8AC3E}">
+        <p14:creationId xmlns:p14="http://schemas.microsoft.com/office/powerpoint/2010/main" val="3170883085"/>
+      </p:ext>
+    </p:extLst>
+  </p:cSld>
+  <p:clrMapOvr>
+    <a:masterClrMapping/>
+  </p:clrMapOvr>
+</p:notes>
+</file>
+
 <file path=ppt/notesSlides/notesSlide2.xml><?xml version="1.0" encoding="utf-8"?>
 <p:notes xmlns:a="http://schemas.openxmlformats.org/drawingml/2006/main" xmlns:r="http://schemas.openxmlformats.org/officeDocument/2006/relationships" xmlns:p="http://schemas.openxmlformats.org/presentationml/2006/main">
   <p:cSld>
@@ -25315,6 +25494,354 @@
     <p:extLst>
       <p:ext uri="{BB962C8B-B14F-4D97-AF65-F5344CB8AC3E}">
         <p14:creationId xmlns:p14="http://schemas.microsoft.com/office/powerpoint/2010/main" val="3036814789"/>
+      </p:ext>
+    </p:extLst>
+  </p:cSld>
+  <p:clrMapOvr>
+    <a:masterClrMapping/>
+  </p:clrMapOvr>
+</p:notes>
+</file>
+
+<file path=ppt/notesSlides/notesSlide6.xml><?xml version="1.0" encoding="utf-8"?>
+<p:notes xmlns:a="http://schemas.openxmlformats.org/drawingml/2006/main" xmlns:r="http://schemas.openxmlformats.org/officeDocument/2006/relationships" xmlns:p="http://schemas.openxmlformats.org/presentationml/2006/main">
+  <p:cSld>
+    <p:spTree>
+      <p:nvGrpSpPr>
+        <p:cNvPr id="1" name=""/>
+        <p:cNvGrpSpPr/>
+        <p:nvPr/>
+      </p:nvGrpSpPr>
+      <p:grpSpPr>
+        <a:xfrm>
+          <a:off x="0" y="0"/>
+          <a:ext cx="0" cy="0"/>
+          <a:chOff x="0" y="0"/>
+          <a:chExt cx="0" cy="0"/>
+        </a:xfrm>
+      </p:grpSpPr>
+      <p:sp>
+        <p:nvSpPr>
+          <p:cNvPr id="2" name="Slide Image Placeholder 1"/>
+          <p:cNvSpPr>
+            <a:spLocks noGrp="1" noRot="1" noChangeAspect="1"/>
+          </p:cNvSpPr>
+          <p:nvPr>
+            <p:ph type="sldImg"/>
+          </p:nvPr>
+        </p:nvSpPr>
+        <p:spPr/>
+      </p:sp>
+      <p:sp>
+        <p:nvSpPr>
+          <p:cNvPr id="3" name="Notes Placeholder 2"/>
+          <p:cNvSpPr>
+            <a:spLocks noGrp="1"/>
+          </p:cNvSpPr>
+          <p:nvPr>
+            <p:ph type="body" idx="1"/>
+          </p:nvPr>
+        </p:nvSpPr>
+        <p:spPr/>
+        <p:txBody>
+          <a:bodyPr/>
+          <a:lstStyle/>
+          <a:p>
+            <a:r>
+              <a:rPr lang="en-US" dirty="0"/>
+              <a:t>The goal is to bypass THIS security check while doing something meaningful</a:t>
+            </a:r>
+          </a:p>
+        </p:txBody>
+      </p:sp>
+      <p:sp>
+        <p:nvSpPr>
+          <p:cNvPr id="4" name="Slide Number Placeholder 3"/>
+          <p:cNvSpPr>
+            <a:spLocks noGrp="1"/>
+          </p:cNvSpPr>
+          <p:nvPr>
+            <p:ph type="sldNum" sz="quarter" idx="5"/>
+          </p:nvPr>
+        </p:nvSpPr>
+        <p:spPr/>
+        <p:txBody>
+          <a:bodyPr/>
+          <a:lstStyle/>
+          <a:p>
+            <a:fld id="{AC55928C-CD14-454C-B617-1AFCF9A58596}" type="slidenum">
+              <a:rPr lang="en-US" smtClean="0"/>
+              <a:t>86</a:t>
+            </a:fld>
+            <a:endParaRPr lang="en-US" dirty="0"/>
+          </a:p>
+        </p:txBody>
+      </p:sp>
+    </p:spTree>
+    <p:extLst>
+      <p:ext uri="{BB962C8B-B14F-4D97-AF65-F5344CB8AC3E}">
+        <p14:creationId xmlns:p14="http://schemas.microsoft.com/office/powerpoint/2010/main" val="1402674623"/>
+      </p:ext>
+    </p:extLst>
+  </p:cSld>
+  <p:clrMapOvr>
+    <a:masterClrMapping/>
+  </p:clrMapOvr>
+</p:notes>
+</file>
+
+<file path=ppt/notesSlides/notesSlide7.xml><?xml version="1.0" encoding="utf-8"?>
+<p:notes xmlns:a="http://schemas.openxmlformats.org/drawingml/2006/main" xmlns:r="http://schemas.openxmlformats.org/officeDocument/2006/relationships" xmlns:p="http://schemas.openxmlformats.org/presentationml/2006/main">
+  <p:cSld>
+    <p:spTree>
+      <p:nvGrpSpPr>
+        <p:cNvPr id="1" name=""/>
+        <p:cNvGrpSpPr/>
+        <p:nvPr/>
+      </p:nvGrpSpPr>
+      <p:grpSpPr>
+        <a:xfrm>
+          <a:off x="0" y="0"/>
+          <a:ext cx="0" cy="0"/>
+          <a:chOff x="0" y="0"/>
+          <a:chExt cx="0" cy="0"/>
+        </a:xfrm>
+      </p:grpSpPr>
+      <p:sp>
+        <p:nvSpPr>
+          <p:cNvPr id="2" name="Slide Image Placeholder 1"/>
+          <p:cNvSpPr>
+            <a:spLocks noGrp="1" noRot="1" noChangeAspect="1"/>
+          </p:cNvSpPr>
+          <p:nvPr>
+            <p:ph type="sldImg"/>
+          </p:nvPr>
+        </p:nvSpPr>
+        <p:spPr/>
+      </p:sp>
+      <p:sp>
+        <p:nvSpPr>
+          <p:cNvPr id="3" name="Notes Placeholder 2"/>
+          <p:cNvSpPr>
+            <a:spLocks noGrp="1"/>
+          </p:cNvSpPr>
+          <p:nvPr>
+            <p:ph type="body" idx="1"/>
+          </p:nvPr>
+        </p:nvSpPr>
+        <p:spPr/>
+        <p:txBody>
+          <a:bodyPr/>
+          <a:lstStyle/>
+          <a:p>
+            <a:r>
+              <a:rPr lang="en-US" dirty="0"/>
+              <a:t>Bypass the first security check</a:t>
+            </a:r>
+          </a:p>
+        </p:txBody>
+      </p:sp>
+      <p:sp>
+        <p:nvSpPr>
+          <p:cNvPr id="4" name="Slide Number Placeholder 3"/>
+          <p:cNvSpPr>
+            <a:spLocks noGrp="1"/>
+          </p:cNvSpPr>
+          <p:nvPr>
+            <p:ph type="sldNum" sz="quarter" idx="5"/>
+          </p:nvPr>
+        </p:nvSpPr>
+        <p:spPr/>
+        <p:txBody>
+          <a:bodyPr/>
+          <a:lstStyle/>
+          <a:p>
+            <a:fld id="{AC55928C-CD14-454C-B617-1AFCF9A58596}" type="slidenum">
+              <a:rPr lang="en-US" smtClean="0"/>
+              <a:t>87</a:t>
+            </a:fld>
+            <a:endParaRPr lang="en-US" dirty="0"/>
+          </a:p>
+        </p:txBody>
+      </p:sp>
+    </p:spTree>
+    <p:extLst>
+      <p:ext uri="{BB962C8B-B14F-4D97-AF65-F5344CB8AC3E}">
+        <p14:creationId xmlns:p14="http://schemas.microsoft.com/office/powerpoint/2010/main" val="3144274338"/>
+      </p:ext>
+    </p:extLst>
+  </p:cSld>
+  <p:clrMapOvr>
+    <a:masterClrMapping/>
+  </p:clrMapOvr>
+</p:notes>
+</file>
+
+<file path=ppt/notesSlides/notesSlide8.xml><?xml version="1.0" encoding="utf-8"?>
+<p:notes xmlns:a="http://schemas.openxmlformats.org/drawingml/2006/main" xmlns:r="http://schemas.openxmlformats.org/officeDocument/2006/relationships" xmlns:p="http://schemas.openxmlformats.org/presentationml/2006/main">
+  <p:cSld>
+    <p:spTree>
+      <p:nvGrpSpPr>
+        <p:cNvPr id="1" name=""/>
+        <p:cNvGrpSpPr/>
+        <p:nvPr/>
+      </p:nvGrpSpPr>
+      <p:grpSpPr>
+        <a:xfrm>
+          <a:off x="0" y="0"/>
+          <a:ext cx="0" cy="0"/>
+          <a:chOff x="0" y="0"/>
+          <a:chExt cx="0" cy="0"/>
+        </a:xfrm>
+      </p:grpSpPr>
+      <p:sp>
+        <p:nvSpPr>
+          <p:cNvPr id="2" name="Slide Image Placeholder 1"/>
+          <p:cNvSpPr>
+            <a:spLocks noGrp="1" noRot="1" noChangeAspect="1"/>
+          </p:cNvSpPr>
+          <p:nvPr>
+            <p:ph type="sldImg"/>
+          </p:nvPr>
+        </p:nvSpPr>
+        <p:spPr/>
+      </p:sp>
+      <p:sp>
+        <p:nvSpPr>
+          <p:cNvPr id="3" name="Notes Placeholder 2"/>
+          <p:cNvSpPr>
+            <a:spLocks noGrp="1"/>
+          </p:cNvSpPr>
+          <p:nvPr>
+            <p:ph type="body" idx="1"/>
+          </p:nvPr>
+        </p:nvSpPr>
+        <p:spPr/>
+        <p:txBody>
+          <a:bodyPr/>
+          <a:lstStyle/>
+          <a:p>
+            <a:r>
+              <a:rPr lang="en-US" dirty="0"/>
+              <a:t>Bypass the first security check</a:t>
+            </a:r>
+          </a:p>
+        </p:txBody>
+      </p:sp>
+      <p:sp>
+        <p:nvSpPr>
+          <p:cNvPr id="4" name="Slide Number Placeholder 3"/>
+          <p:cNvSpPr>
+            <a:spLocks noGrp="1"/>
+          </p:cNvSpPr>
+          <p:nvPr>
+            <p:ph type="sldNum" sz="quarter" idx="5"/>
+          </p:nvPr>
+        </p:nvSpPr>
+        <p:spPr/>
+        <p:txBody>
+          <a:bodyPr/>
+          <a:lstStyle/>
+          <a:p>
+            <a:fld id="{AC55928C-CD14-454C-B617-1AFCF9A58596}" type="slidenum">
+              <a:rPr lang="en-US" smtClean="0"/>
+              <a:t>88</a:t>
+            </a:fld>
+            <a:endParaRPr lang="en-US" dirty="0"/>
+          </a:p>
+        </p:txBody>
+      </p:sp>
+    </p:spTree>
+    <p:extLst>
+      <p:ext uri="{BB962C8B-B14F-4D97-AF65-F5344CB8AC3E}">
+        <p14:creationId xmlns:p14="http://schemas.microsoft.com/office/powerpoint/2010/main" val="3811770443"/>
+      </p:ext>
+    </p:extLst>
+  </p:cSld>
+  <p:clrMapOvr>
+    <a:masterClrMapping/>
+  </p:clrMapOvr>
+</p:notes>
+</file>
+
+<file path=ppt/notesSlides/notesSlide9.xml><?xml version="1.0" encoding="utf-8"?>
+<p:notes xmlns:a="http://schemas.openxmlformats.org/drawingml/2006/main" xmlns:r="http://schemas.openxmlformats.org/officeDocument/2006/relationships" xmlns:p="http://schemas.openxmlformats.org/presentationml/2006/main">
+  <p:cSld>
+    <p:spTree>
+      <p:nvGrpSpPr>
+        <p:cNvPr id="1" name=""/>
+        <p:cNvGrpSpPr/>
+        <p:nvPr/>
+      </p:nvGrpSpPr>
+      <p:grpSpPr>
+        <a:xfrm>
+          <a:off x="0" y="0"/>
+          <a:ext cx="0" cy="0"/>
+          <a:chOff x="0" y="0"/>
+          <a:chExt cx="0" cy="0"/>
+        </a:xfrm>
+      </p:grpSpPr>
+      <p:sp>
+        <p:nvSpPr>
+          <p:cNvPr id="2" name="Slide Image Placeholder 1"/>
+          <p:cNvSpPr>
+            <a:spLocks noGrp="1" noRot="1" noChangeAspect="1"/>
+          </p:cNvSpPr>
+          <p:nvPr>
+            <p:ph type="sldImg"/>
+          </p:nvPr>
+        </p:nvSpPr>
+        <p:spPr/>
+      </p:sp>
+      <p:sp>
+        <p:nvSpPr>
+          <p:cNvPr id="3" name="Notes Placeholder 2"/>
+          <p:cNvSpPr>
+            <a:spLocks noGrp="1"/>
+          </p:cNvSpPr>
+          <p:nvPr>
+            <p:ph type="body" idx="1"/>
+          </p:nvPr>
+        </p:nvSpPr>
+        <p:spPr/>
+        <p:txBody>
+          <a:bodyPr/>
+          <a:lstStyle/>
+          <a:p>
+            <a:r>
+              <a:rPr lang="en-US" dirty="0"/>
+              <a:t>Bypass the first security check</a:t>
+            </a:r>
+          </a:p>
+        </p:txBody>
+      </p:sp>
+      <p:sp>
+        <p:nvSpPr>
+          <p:cNvPr id="4" name="Slide Number Placeholder 3"/>
+          <p:cNvSpPr>
+            <a:spLocks noGrp="1"/>
+          </p:cNvSpPr>
+          <p:nvPr>
+            <p:ph type="sldNum" sz="quarter" idx="5"/>
+          </p:nvPr>
+        </p:nvSpPr>
+        <p:spPr/>
+        <p:txBody>
+          <a:bodyPr/>
+          <a:lstStyle/>
+          <a:p>
+            <a:fld id="{AC55928C-CD14-454C-B617-1AFCF9A58596}" type="slidenum">
+              <a:rPr lang="en-US" smtClean="0"/>
+              <a:t>89</a:t>
+            </a:fld>
+            <a:endParaRPr lang="en-US" dirty="0"/>
+          </a:p>
+        </p:txBody>
+      </p:sp>
+    </p:spTree>
+    <p:extLst>
+      <p:ext uri="{BB962C8B-B14F-4D97-AF65-F5344CB8AC3E}">
+        <p14:creationId xmlns:p14="http://schemas.microsoft.com/office/powerpoint/2010/main" val="1149768454"/>
       </p:ext>
     </p:extLst>
   </p:cSld>
@@ -25527,7 +26054,7 @@
                 <a:latin typeface="Calibri"/>
               </a:rPr>
               <a:pPr/>
-              <a:t>12/5/21</a:t>
+              <a:t>12/18/21</a:t>
             </a:fld>
             <a:endParaRPr lang="en-US" dirty="0">
               <a:solidFill>
@@ -25780,7 +26307,7 @@
                 <a:latin typeface="Calibri"/>
               </a:rPr>
               <a:pPr/>
-              <a:t>12/5/21</a:t>
+              <a:t>12/18/21</a:t>
             </a:fld>
             <a:endParaRPr lang="en-US" dirty="0">
               <a:solidFill>
@@ -25995,7 +26522,7 @@
                 <a:latin typeface="Calibri"/>
               </a:rPr>
               <a:pPr/>
-              <a:t>12/5/21</a:t>
+              <a:t>12/18/21</a:t>
             </a:fld>
             <a:endParaRPr lang="en-US" dirty="0">
               <a:solidFill>
@@ -26393,7 +26920,7 @@
                 <a:latin typeface="Calibri"/>
               </a:rPr>
               <a:pPr/>
-              <a:t>12/5/21</a:t>
+              <a:t>12/18/21</a:t>
             </a:fld>
             <a:endParaRPr lang="en-US" dirty="0">
               <a:solidFill>
@@ -26735,7 +27262,7 @@
                 <a:latin typeface="Calibri"/>
               </a:rPr>
               <a:pPr/>
-              <a:t>12/5/21</a:t>
+              <a:t>12/18/21</a:t>
             </a:fld>
             <a:endParaRPr lang="en-US" dirty="0">
               <a:solidFill>
@@ -27063,7 +27590,7 @@
                 <a:latin typeface="Calibri"/>
               </a:rPr>
               <a:pPr/>
-              <a:t>12/5/21</a:t>
+              <a:t>12/18/21</a:t>
             </a:fld>
             <a:endParaRPr lang="en-US" dirty="0">
               <a:solidFill>
@@ -27552,7 +28079,7 @@
                 <a:latin typeface="Calibri"/>
               </a:rPr>
               <a:pPr/>
-              <a:t>12/5/21</a:t>
+              <a:t>12/18/21</a:t>
             </a:fld>
             <a:endParaRPr lang="en-US" dirty="0">
               <a:solidFill>
@@ -27735,7 +28262,7 @@
                 <a:latin typeface="Calibri"/>
               </a:rPr>
               <a:pPr/>
-              <a:t>12/5/21</a:t>
+              <a:t>12/18/21</a:t>
             </a:fld>
             <a:endParaRPr lang="en-US" dirty="0">
               <a:solidFill>
@@ -27981,7 +28508,7 @@
                 <a:latin typeface="Calibri"/>
               </a:rPr>
               <a:pPr/>
-              <a:t>12/5/21</a:t>
+              <a:t>12/18/21</a:t>
             </a:fld>
             <a:endParaRPr lang="en-US" dirty="0">
               <a:solidFill>
@@ -28323,7 +28850,7 @@
                 <a:latin typeface="Calibri"/>
               </a:rPr>
               <a:pPr/>
-              <a:t>12/5/21</a:t>
+              <a:t>12/18/21</a:t>
             </a:fld>
             <a:endParaRPr lang="en-US" dirty="0">
               <a:solidFill>
@@ -28615,7 +29142,7 @@
                 <a:latin typeface="Calibri"/>
               </a:rPr>
               <a:pPr/>
-              <a:t>12/5/21</a:t>
+              <a:t>12/18/21</a:t>
             </a:fld>
             <a:endParaRPr lang="en-US" dirty="0">
               <a:solidFill>
@@ -28865,7 +29392,7 @@
                 <a:latin typeface="Calibri"/>
               </a:rPr>
               <a:pPr defTabSz="914400"/>
-              <a:t>12/5/21</a:t>
+              <a:t>12/18/21</a:t>
             </a:fld>
             <a:endParaRPr lang="en-US" dirty="0">
               <a:solidFill>
@@ -29487,6 +30014,257 @@
     <p:extLst>
       <p:ext uri="{BB962C8B-B14F-4D97-AF65-F5344CB8AC3E}">
         <p14:creationId xmlns:p14="http://schemas.microsoft.com/office/powerpoint/2010/main" val="2073662773"/>
+      </p:ext>
+    </p:extLst>
+  </p:cSld>
+  <p:clrMapOvr>
+    <a:masterClrMapping/>
+  </p:clrMapOvr>
+</p:sld>
+</file>
+
+<file path=ppt/slides/slide100.xml><?xml version="1.0" encoding="utf-8"?>
+<p:sld xmlns:a="http://schemas.openxmlformats.org/drawingml/2006/main" xmlns:r="http://schemas.openxmlformats.org/officeDocument/2006/relationships" xmlns:p="http://schemas.openxmlformats.org/presentationml/2006/main">
+  <p:cSld>
+    <p:spTree>
+      <p:nvGrpSpPr>
+        <p:cNvPr id="1" name=""/>
+        <p:cNvGrpSpPr/>
+        <p:nvPr/>
+      </p:nvGrpSpPr>
+      <p:grpSpPr>
+        <a:xfrm>
+          <a:off x="0" y="0"/>
+          <a:ext cx="0" cy="0"/>
+          <a:chOff x="0" y="0"/>
+          <a:chExt cx="0" cy="0"/>
+        </a:xfrm>
+      </p:grpSpPr>
+      <p:sp>
+        <p:nvSpPr>
+          <p:cNvPr id="2" name="Title 1">
+            <a:extLst>
+              <a:ext uri="{FF2B5EF4-FFF2-40B4-BE49-F238E27FC236}">
+                <a16:creationId xmlns:a16="http://schemas.microsoft.com/office/drawing/2014/main" id="{C96CF04D-2F9B-2D4B-BB6E-1DBC2C66150E}"/>
+              </a:ext>
+            </a:extLst>
+          </p:cNvPr>
+          <p:cNvSpPr>
+            <a:spLocks noGrp="1"/>
+          </p:cNvSpPr>
+          <p:nvPr>
+            <p:ph type="title"/>
+          </p:nvPr>
+        </p:nvSpPr>
+        <p:spPr/>
+        <p:txBody>
+          <a:bodyPr/>
+          <a:lstStyle/>
+          <a:p>
+            <a:r>
+              <a:rPr lang="en-US" dirty="0"/>
+              <a:t>Similar Techniques</a:t>
+            </a:r>
+          </a:p>
+        </p:txBody>
+      </p:sp>
+      <p:sp>
+        <p:nvSpPr>
+          <p:cNvPr id="3" name="Content Placeholder 2">
+            <a:extLst>
+              <a:ext uri="{FF2B5EF4-FFF2-40B4-BE49-F238E27FC236}">
+                <a16:creationId xmlns:a16="http://schemas.microsoft.com/office/drawing/2014/main" id="{DB0B48B3-4287-5643-8B39-63515724D843}"/>
+              </a:ext>
+            </a:extLst>
+          </p:cNvPr>
+          <p:cNvSpPr>
+            <a:spLocks noGrp="1"/>
+          </p:cNvSpPr>
+          <p:nvPr>
+            <p:ph idx="1"/>
+          </p:nvPr>
+        </p:nvSpPr>
+        <p:spPr/>
+        <p:txBody>
+          <a:bodyPr/>
+          <a:lstStyle/>
+          <a:p>
+            <a:r>
+              <a:rPr lang="en-US" dirty="0"/>
+              <a:t>House of Einherjar: </a:t>
+            </a:r>
+          </a:p>
+          <a:p>
+            <a:pPr lvl="1"/>
+            <a:r>
+              <a:rPr lang="en-US" dirty="0"/>
+              <a:t>Unlink a fake chunk to overlap a large chunk of data</a:t>
+            </a:r>
+          </a:p>
+          <a:p>
+            <a:r>
+              <a:rPr lang="en-US" dirty="0"/>
+              <a:t>House of Storm: 	</a:t>
+            </a:r>
+          </a:p>
+          <a:p>
+            <a:pPr lvl="1"/>
+            <a:r>
+              <a:rPr lang="en-US" dirty="0"/>
+              <a:t>Add in a chunk by corrupting free list pointers</a:t>
+            </a:r>
+          </a:p>
+        </p:txBody>
+      </p:sp>
+    </p:spTree>
+    <p:extLst>
+      <p:ext uri="{BB962C8B-B14F-4D97-AF65-F5344CB8AC3E}">
+        <p14:creationId xmlns:p14="http://schemas.microsoft.com/office/powerpoint/2010/main" val="3545615887"/>
+      </p:ext>
+    </p:extLst>
+  </p:cSld>
+  <p:clrMapOvr>
+    <a:masterClrMapping/>
+  </p:clrMapOvr>
+</p:sld>
+</file>
+
+<file path=ppt/slides/slide101.xml><?xml version="1.0" encoding="utf-8"?>
+<p:sld xmlns:a="http://schemas.openxmlformats.org/drawingml/2006/main" xmlns:r="http://schemas.openxmlformats.org/officeDocument/2006/relationships" xmlns:p="http://schemas.openxmlformats.org/presentationml/2006/main">
+  <p:cSld>
+    <p:spTree>
+      <p:nvGrpSpPr>
+        <p:cNvPr id="1" name=""/>
+        <p:cNvGrpSpPr/>
+        <p:nvPr/>
+      </p:nvGrpSpPr>
+      <p:grpSpPr>
+        <a:xfrm>
+          <a:off x="0" y="0"/>
+          <a:ext cx="0" cy="0"/>
+          <a:chOff x="0" y="0"/>
+          <a:chExt cx="0" cy="0"/>
+        </a:xfrm>
+      </p:grpSpPr>
+      <p:sp>
+        <p:nvSpPr>
+          <p:cNvPr id="2" name="Title 1">
+            <a:extLst>
+              <a:ext uri="{FF2B5EF4-FFF2-40B4-BE49-F238E27FC236}">
+                <a16:creationId xmlns:a16="http://schemas.microsoft.com/office/drawing/2014/main" id="{B4A67C53-5C79-0548-A92E-EC918DEE6260}"/>
+              </a:ext>
+            </a:extLst>
+          </p:cNvPr>
+          <p:cNvSpPr>
+            <a:spLocks noGrp="1"/>
+          </p:cNvSpPr>
+          <p:nvPr>
+            <p:ph type="title"/>
+          </p:nvPr>
+        </p:nvSpPr>
+        <p:spPr/>
+        <p:txBody>
+          <a:bodyPr/>
+          <a:lstStyle/>
+          <a:p>
+            <a:r>
+              <a:rPr lang="en-US" dirty="0"/>
+              <a:t>Resources</a:t>
+            </a:r>
+          </a:p>
+        </p:txBody>
+      </p:sp>
+      <p:sp>
+        <p:nvSpPr>
+          <p:cNvPr id="3" name="Content Placeholder 2">
+            <a:extLst>
+              <a:ext uri="{FF2B5EF4-FFF2-40B4-BE49-F238E27FC236}">
+                <a16:creationId xmlns:a16="http://schemas.microsoft.com/office/drawing/2014/main" id="{31ED45E3-BAAF-194E-B4F4-BBE1A78FE0F0}"/>
+              </a:ext>
+            </a:extLst>
+          </p:cNvPr>
+          <p:cNvSpPr>
+            <a:spLocks noGrp="1"/>
+          </p:cNvSpPr>
+          <p:nvPr>
+            <p:ph idx="1"/>
+          </p:nvPr>
+        </p:nvSpPr>
+        <p:spPr/>
+        <p:txBody>
+          <a:bodyPr/>
+          <a:lstStyle/>
+          <a:p>
+            <a:r>
+              <a:rPr lang="en-US" dirty="0" err="1"/>
+              <a:t>LiveOverflow</a:t>
+            </a:r>
+            <a:r>
+              <a:rPr lang="en-US" dirty="0"/>
+              <a:t>: </a:t>
+            </a:r>
+            <a:r>
+              <a:rPr lang="en-US" dirty="0">
+                <a:hlinkClick r:id="rId2"/>
+              </a:rPr>
+              <a:t>https://www.youtube.com/watch?v=gL45bjQvZSU</a:t>
+            </a:r>
+            <a:endParaRPr lang="en-US" dirty="0"/>
+          </a:p>
+          <a:p>
+            <a:r>
+              <a:rPr lang="en-US" dirty="0"/>
+              <a:t>Once Upon a Free: </a:t>
+            </a:r>
+            <a:r>
+              <a:rPr lang="en-US" dirty="0">
+                <a:hlinkClick r:id="rId3"/>
+              </a:rPr>
+              <a:t>http://phrack.org/issues/57/9.html</a:t>
+            </a:r>
+            <a:endParaRPr lang="en-US" dirty="0"/>
+          </a:p>
+          <a:p>
+            <a:r>
+              <a:rPr lang="en-US" dirty="0"/>
+              <a:t>Unsafe Unlink: </a:t>
+            </a:r>
+          </a:p>
+          <a:p>
+            <a:pPr lvl="1"/>
+            <a:r>
+              <a:rPr lang="en-US" dirty="0">
+                <a:hlinkClick r:id="rId4"/>
+              </a:rPr>
+              <a:t>https://heap-exploitation.dhavalkapil.com/attacks/unlink_exploit.html</a:t>
+            </a:r>
+            <a:endParaRPr lang="en-US" dirty="0"/>
+          </a:p>
+          <a:p>
+            <a:pPr lvl="1"/>
+            <a:r>
+              <a:rPr lang="en-US" dirty="0">
+                <a:hlinkClick r:id="rId5"/>
+              </a:rPr>
+              <a:t>https://dangokyo.me/2018/01/01/heap-exploitation-unsafe-unlink-fastbin-corruption/</a:t>
+            </a:r>
+            <a:endParaRPr lang="en-US" dirty="0"/>
+          </a:p>
+          <a:p>
+            <a:pPr marL="457200" lvl="1" indent="0">
+              <a:buNone/>
+            </a:pPr>
+            <a:endParaRPr lang="en-US" dirty="0"/>
+          </a:p>
+          <a:p>
+            <a:endParaRPr lang="en-US" dirty="0"/>
+          </a:p>
+        </p:txBody>
+      </p:sp>
+    </p:spTree>
+    <p:extLst>
+      <p:ext uri="{BB962C8B-B14F-4D97-AF65-F5344CB8AC3E}">
+        <p14:creationId xmlns:p14="http://schemas.microsoft.com/office/powerpoint/2010/main" val="726634461"/>
       </p:ext>
     </p:extLst>
   </p:cSld>
@@ -47413,19 +48191,19 @@
         </p:nvSpPr>
         <p:spPr>
           <a:xfrm>
-            <a:off x="628650" y="273847"/>
-            <a:ext cx="7886700" cy="994172"/>
+            <a:off x="159798" y="273847"/>
+            <a:ext cx="9135122" cy="994172"/>
           </a:xfrm>
         </p:spPr>
         <p:txBody>
           <a:bodyPr anchor="ctr">
-            <a:normAutofit/>
+            <a:normAutofit fontScale="90000"/>
           </a:bodyPr>
           <a:lstStyle/>
           <a:p>
             <a:r>
               <a:rPr lang="en-US" dirty="0"/>
-              <a:t>Unsafe Unlink Setup – 5</a:t>
+              <a:t>Unsafe Unlink Setup – Mem Vs. Chunk</a:t>
             </a:r>
           </a:p>
         </p:txBody>
@@ -47657,7 +48435,7 @@
           <p:cNvPr id="2" name="Title 1">
             <a:extLst>
               <a:ext uri="{FF2B5EF4-FFF2-40B4-BE49-F238E27FC236}">
-                <a16:creationId xmlns:a16="http://schemas.microsoft.com/office/drawing/2014/main" id="{E9E670F8-AACA-D046-8E4F-17454C7527D7}"/>
+                <a16:creationId xmlns:a16="http://schemas.microsoft.com/office/drawing/2014/main" id="{493DDB27-1B87-CB4F-9100-F10B92D42884}"/>
               </a:ext>
             </a:extLst>
           </p:cNvPr>
@@ -47671,28 +48449,28 @@
         <p:spPr>
           <a:xfrm>
             <a:off x="628650" y="273847"/>
-            <a:ext cx="7886700" cy="994172"/>
+            <a:ext cx="8417696" cy="994172"/>
           </a:xfrm>
         </p:spPr>
         <p:txBody>
-          <a:bodyPr anchor="ctr">
-            <a:normAutofit/>
+          <a:bodyPr>
+            <a:normAutofit fontScale="90000"/>
           </a:bodyPr>
           <a:lstStyle/>
           <a:p>
             <a:r>
               <a:rPr lang="en-US" dirty="0"/>
-              <a:t>Unsafe Unlink Setup – 4 </a:t>
+              <a:t>What if we Setup the Pointers like this?</a:t>
             </a:r>
           </a:p>
         </p:txBody>
       </p:sp>
       <p:sp>
         <p:nvSpPr>
-          <p:cNvPr id="10" name="Content Placeholder 3">
+          <p:cNvPr id="3" name="Content Placeholder 2">
             <a:extLst>
               <a:ext uri="{FF2B5EF4-FFF2-40B4-BE49-F238E27FC236}">
-                <a16:creationId xmlns:a16="http://schemas.microsoft.com/office/drawing/2014/main" id="{2261C260-EABE-400C-BFDD-E06E1533800F}"/>
+                <a16:creationId xmlns:a16="http://schemas.microsoft.com/office/drawing/2014/main" id="{66773FD0-646F-3943-A87A-54D13598B121}"/>
               </a:ext>
             </a:extLst>
           </p:cNvPr>
@@ -47700,13 +48478,13 @@
             <a:spLocks noGrp="1"/>
           </p:cNvSpPr>
           <p:nvPr>
-            <p:ph sz="half" idx="2"/>
+            <p:ph idx="1"/>
           </p:nvPr>
         </p:nvSpPr>
         <p:spPr>
           <a:xfrm>
-            <a:off x="4629150" y="1369219"/>
-            <a:ext cx="4137778" cy="3263504"/>
+            <a:off x="195017" y="1268019"/>
+            <a:ext cx="7886700" cy="3263504"/>
           </a:xfrm>
         </p:spPr>
         <p:txBody>
@@ -47715,52 +48493,38 @@
           <a:p>
             <a:r>
               <a:rPr lang="en-US" dirty="0"/>
-              <a:t>FD + 0x18 (bk) = Pointer!</a:t>
+              <a:t>Next&gt;bk = P</a:t>
             </a:r>
           </a:p>
           <a:p>
             <a:r>
               <a:rPr lang="en-US" dirty="0"/>
-              <a:t>Passes the FIRST part of the check</a:t>
+              <a:t>Prev&gt;fd = P</a:t>
+            </a:r>
+          </a:p>
+          <a:p>
+            <a:endParaRPr lang="en-US" dirty="0"/>
+          </a:p>
+          <a:p>
+            <a:endParaRPr lang="en-US" dirty="0"/>
+          </a:p>
+          <a:p>
+            <a:endParaRPr lang="en-US" dirty="0"/>
+          </a:p>
+          <a:p>
+            <a:r>
+              <a:rPr lang="en-US" dirty="0"/>
+              <a:t>Could bypass the security check!</a:t>
             </a:r>
           </a:p>
         </p:txBody>
       </p:sp>
       <p:pic>
         <p:nvPicPr>
-          <p:cNvPr id="12" name="Content Placeholder 11" descr="Fake FD on unsafe unlink">
+          <p:cNvPr id="5" name="Graphic 4" descr="Unlink initial setup">
             <a:extLst>
               <a:ext uri="{FF2B5EF4-FFF2-40B4-BE49-F238E27FC236}">
-                <a16:creationId xmlns:a16="http://schemas.microsoft.com/office/drawing/2014/main" id="{51EAE596-BE11-074D-8BEC-B59954782971}"/>
-              </a:ext>
-            </a:extLst>
-          </p:cNvPr>
-          <p:cNvPicPr>
-            <a:picLocks noGrp="1" noChangeAspect="1"/>
-          </p:cNvPicPr>
-          <p:nvPr>
-            <p:ph sz="half" idx="1"/>
-          </p:nvPr>
-        </p:nvPicPr>
-        <p:blipFill>
-          <a:blip r:embed="rId2"/>
-          <a:stretch>
-            <a:fillRect/>
-          </a:stretch>
-        </p:blipFill>
-        <p:spPr>
-          <a:xfrm>
-            <a:off x="446071" y="1257890"/>
-            <a:ext cx="3909112" cy="3206876"/>
-          </a:xfrm>
-        </p:spPr>
-      </p:pic>
-      <p:pic>
-        <p:nvPicPr>
-          <p:cNvPr id="13" name="Content Placeholder 4" descr="Unlink Mitigation">
-            <a:extLst>
-              <a:ext uri="{FF2B5EF4-FFF2-40B4-BE49-F238E27FC236}">
-                <a16:creationId xmlns:a16="http://schemas.microsoft.com/office/drawing/2014/main" id="{E2D7F700-5AD9-E749-A930-4450D98053D2}"/>
+                <a16:creationId xmlns:a16="http://schemas.microsoft.com/office/drawing/2014/main" id="{2599062D-EC2F-EB43-924C-8848FFDE4264}"/>
               </a:ext>
             </a:extLst>
           </p:cNvPr>
@@ -47769,70 +48533,31 @@
           </p:cNvPicPr>
           <p:nvPr/>
         </p:nvPicPr>
-        <p:blipFill>
-          <a:blip r:embed="rId3"/>
-          <a:stretch>
-            <a:fillRect/>
-          </a:stretch>
+        <p:blipFill rotWithShape="1">
+          <a:blip r:embed="rId3">
+            <a:extLst>
+              <a:ext uri="{96DAC541-7B7A-43D3-8B79-37D633B846F1}">
+                <asvg:svgBlip xmlns:asvg="http://schemas.microsoft.com/office/drawing/2016/SVG/main" r:embed="rId4"/>
+              </a:ext>
+            </a:extLst>
+          </a:blip>
+          <a:srcRect l="12630" t="18608" r="30118" b="64218"/>
+          <a:stretch/>
         </p:blipFill>
         <p:spPr>
           <a:xfrm>
-            <a:off x="2195582" y="3995951"/>
-            <a:ext cx="6892446" cy="1120021"/>
+            <a:off x="2899458" y="1184577"/>
+            <a:ext cx="5552084" cy="2155227"/>
           </a:xfrm>
           <a:prstGeom prst="rect">
             <a:avLst/>
           </a:prstGeom>
-          <a:noFill/>
         </p:spPr>
       </p:pic>
-      <p:cxnSp>
-        <p:nvCxnSpPr>
-          <p:cNvPr id="14" name="Straight Connector 13">
-            <a:extLst>
-              <a:ext uri="{FF2B5EF4-FFF2-40B4-BE49-F238E27FC236}">
-                <a16:creationId xmlns:a16="http://schemas.microsoft.com/office/drawing/2014/main" id="{2ED6C49A-E183-3440-AD64-D776264FCDD9}"/>
-              </a:ext>
-            </a:extLst>
-          </p:cNvPr>
-          <p:cNvCxnSpPr>
-            <a:cxnSpLocks/>
-          </p:cNvCxnSpPr>
-          <p:nvPr/>
-        </p:nvCxnSpPr>
-        <p:spPr>
-          <a:xfrm>
-            <a:off x="4477732" y="4869653"/>
-            <a:ext cx="961534" cy="0"/>
-          </a:xfrm>
-          <a:prstGeom prst="line">
-            <a:avLst/>
-          </a:prstGeom>
-          <a:ln w="25400">
-            <a:solidFill>
-              <a:srgbClr val="FF0000"/>
-            </a:solidFill>
-          </a:ln>
-        </p:spPr>
-        <p:style>
-          <a:lnRef idx="1">
-            <a:schemeClr val="accent1"/>
-          </a:lnRef>
-          <a:fillRef idx="0">
-            <a:schemeClr val="accent1"/>
-          </a:fillRef>
-          <a:effectRef idx="0">
-            <a:schemeClr val="accent1"/>
-          </a:effectRef>
-          <a:fontRef idx="minor">
-            <a:schemeClr val="tx1"/>
-          </a:fontRef>
-        </p:style>
-      </p:cxnSp>
     </p:spTree>
     <p:extLst>
       <p:ext uri="{BB962C8B-B14F-4D97-AF65-F5344CB8AC3E}">
-        <p14:creationId xmlns:p14="http://schemas.microsoft.com/office/powerpoint/2010/main" val="2467445632"/>
+        <p14:creationId xmlns:p14="http://schemas.microsoft.com/office/powerpoint/2010/main" val="354962705"/>
       </p:ext>
     </p:extLst>
   </p:cSld>
@@ -47861,31 +48586,32 @@
       </p:grpSpPr>
       <p:pic>
         <p:nvPicPr>
-          <p:cNvPr id="6" name="Content Placeholder 5" descr="Fake bk for unsafe unlink">
+          <p:cNvPr id="4" name="Picture 3" descr="Unlink macro with the security check">
             <a:extLst>
               <a:ext uri="{FF2B5EF4-FFF2-40B4-BE49-F238E27FC236}">
-                <a16:creationId xmlns:a16="http://schemas.microsoft.com/office/drawing/2014/main" id="{F5682B9B-CE3F-484D-A96C-6050D3682CB3}"/>
+                <a16:creationId xmlns:a16="http://schemas.microsoft.com/office/drawing/2014/main" id="{1DD282F1-2337-7B46-8AFC-25009E2BFE9B}"/>
               </a:ext>
             </a:extLst>
           </p:cNvPr>
           <p:cNvPicPr>
-            <a:picLocks noGrp="1" noChangeAspect="1"/>
+            <a:picLocks noChangeAspect="1"/>
           </p:cNvPicPr>
-          <p:nvPr>
-            <p:ph sz="half" idx="1"/>
-          </p:nvPr>
+          <p:nvPr/>
         </p:nvPicPr>
         <p:blipFill>
-          <a:blip r:embed="rId2"/>
+          <a:blip r:embed="rId3"/>
           <a:stretch>
             <a:fillRect/>
           </a:stretch>
         </p:blipFill>
         <p:spPr>
           <a:xfrm>
-            <a:off x="197963" y="1151876"/>
-            <a:ext cx="3774191" cy="3096193"/>
+            <a:off x="1551344" y="3905768"/>
+            <a:ext cx="7592656" cy="1237732"/>
           </a:xfrm>
+          <a:prstGeom prst="rect">
+            <a:avLst/>
+          </a:prstGeom>
         </p:spPr>
       </p:pic>
       <p:sp>
@@ -47941,8 +48667,8 @@
         </p:nvSpPr>
         <p:spPr>
           <a:xfrm>
-            <a:off x="4629150" y="1369219"/>
-            <a:ext cx="4137778" cy="3263504"/>
+            <a:off x="5459767" y="1369219"/>
+            <a:ext cx="3684233" cy="3176962"/>
           </a:xfrm>
         </p:spPr>
         <p:txBody>
@@ -47951,48 +48677,43 @@
           <a:p>
             <a:r>
               <a:rPr lang="en-US" dirty="0"/>
-              <a:t>BK + 0x10 (fd) = Pointer!</a:t>
-            </a:r>
-          </a:p>
-          <a:p>
+              <a:t>Set </a:t>
+            </a:r>
+            <a:r>
+              <a:rPr lang="en-US" b="1" dirty="0"/>
+              <a:t>Next</a:t>
+            </a:r>
             <a:r>
               <a:rPr lang="en-US" dirty="0"/>
-              <a:t>Passes the SECOND part of the check</a:t>
+              <a:t> to be </a:t>
+            </a:r>
+            <a:r>
+              <a:rPr lang="en-US" b="1" dirty="0"/>
+              <a:t>Pointer</a:t>
+            </a:r>
+            <a:r>
+              <a:rPr lang="en-US" dirty="0"/>
+              <a:t> </a:t>
+            </a:r>
+            <a:r>
+              <a:rPr lang="en-US" b="1" dirty="0"/>
+              <a:t>– 0x18</a:t>
+            </a:r>
+          </a:p>
+          <a:p>
+            <a:r>
+              <a:rPr lang="en-US" dirty="0"/>
+              <a:t>Next + 0x18 (bk) = Pointer!</a:t>
+            </a:r>
+          </a:p>
+          <a:p>
+            <a:r>
+              <a:rPr lang="en-US" dirty="0"/>
+              <a:t>Passes the FIRST part of the check</a:t>
             </a:r>
           </a:p>
         </p:txBody>
       </p:sp>
-      <p:pic>
-        <p:nvPicPr>
-          <p:cNvPr id="13" name="Content Placeholder 4" descr="Unlink Mitigation">
-            <a:extLst>
-              <a:ext uri="{FF2B5EF4-FFF2-40B4-BE49-F238E27FC236}">
-                <a16:creationId xmlns:a16="http://schemas.microsoft.com/office/drawing/2014/main" id="{E2D7F700-5AD9-E749-A930-4450D98053D2}"/>
-              </a:ext>
-            </a:extLst>
-          </p:cNvPr>
-          <p:cNvPicPr>
-            <a:picLocks noChangeAspect="1"/>
-          </p:cNvPicPr>
-          <p:nvPr/>
-        </p:nvPicPr>
-        <p:blipFill>
-          <a:blip r:embed="rId3"/>
-          <a:stretch>
-            <a:fillRect/>
-          </a:stretch>
-        </p:blipFill>
-        <p:spPr>
-          <a:xfrm>
-            <a:off x="2195582" y="3995951"/>
-            <a:ext cx="6892446" cy="1120021"/>
-          </a:xfrm>
-          <a:prstGeom prst="rect">
-            <a:avLst/>
-          </a:prstGeom>
-          <a:noFill/>
-        </p:spPr>
-      </p:pic>
       <p:cxnSp>
         <p:nvCxnSpPr>
           <p:cNvPr id="14" name="Straight Connector 13">
@@ -48009,8 +48730,8 @@
         </p:nvCxnSpPr>
         <p:spPr>
           <a:xfrm>
-            <a:off x="5684363" y="4869653"/>
-            <a:ext cx="961534" cy="0"/>
+            <a:off x="4024971" y="4834142"/>
+            <a:ext cx="1570455" cy="0"/>
           </a:xfrm>
           <a:prstGeom prst="line">
             <a:avLst/>
@@ -48036,10 +48757,39 @@
           </a:fontRef>
         </p:style>
       </p:cxnSp>
+      <p:pic>
+        <p:nvPicPr>
+          <p:cNvPr id="26" name="Content Placeholder 25" descr="Unsafe Unlink next pointer setup">
+            <a:extLst>
+              <a:ext uri="{FF2B5EF4-FFF2-40B4-BE49-F238E27FC236}">
+                <a16:creationId xmlns:a16="http://schemas.microsoft.com/office/drawing/2014/main" id="{004B5B82-B0F5-D44F-A168-E93AE893DBD7}"/>
+              </a:ext>
+            </a:extLst>
+          </p:cNvPr>
+          <p:cNvPicPr>
+            <a:picLocks noGrp="1" noChangeAspect="1"/>
+          </p:cNvPicPr>
+          <p:nvPr>
+            <p:ph sz="half" idx="1"/>
+          </p:nvPr>
+        </p:nvPicPr>
+        <p:blipFill>
+          <a:blip r:embed="rId4"/>
+          <a:stretch>
+            <a:fillRect/>
+          </a:stretch>
+        </p:blipFill>
+        <p:spPr>
+          <a:xfrm>
+            <a:off x="428621" y="922890"/>
+            <a:ext cx="5166805" cy="2909727"/>
+          </a:xfrm>
+        </p:spPr>
+      </p:pic>
     </p:spTree>
     <p:extLst>
       <p:ext uri="{BB962C8B-B14F-4D97-AF65-F5344CB8AC3E}">
-        <p14:creationId xmlns:p14="http://schemas.microsoft.com/office/powerpoint/2010/main" val="3805253557"/>
+        <p14:creationId xmlns:p14="http://schemas.microsoft.com/office/powerpoint/2010/main" val="3575343712"/>
       </p:ext>
     </p:extLst>
   </p:cSld>
@@ -48068,31 +48818,32 @@
       </p:grpSpPr>
       <p:pic>
         <p:nvPicPr>
-          <p:cNvPr id="6" name="Content Placeholder 5" descr="Bypass the unlink security check">
+          <p:cNvPr id="4" name="Picture 3" descr="Unlink macro with the security check">
             <a:extLst>
               <a:ext uri="{FF2B5EF4-FFF2-40B4-BE49-F238E27FC236}">
-                <a16:creationId xmlns:a16="http://schemas.microsoft.com/office/drawing/2014/main" id="{F5682B9B-CE3F-484D-A96C-6050D3682CB3}"/>
+                <a16:creationId xmlns:a16="http://schemas.microsoft.com/office/drawing/2014/main" id="{1DD282F1-2337-7B46-8AFC-25009E2BFE9B}"/>
               </a:ext>
             </a:extLst>
           </p:cNvPr>
           <p:cNvPicPr>
-            <a:picLocks noGrp="1" noChangeAspect="1"/>
+            <a:picLocks noChangeAspect="1"/>
           </p:cNvPicPr>
-          <p:nvPr>
-            <p:ph sz="half" idx="1"/>
-          </p:nvPr>
+          <p:nvPr/>
         </p:nvPicPr>
         <p:blipFill>
-          <a:blip r:embed="rId2"/>
+          <a:blip r:embed="rId3"/>
           <a:stretch>
             <a:fillRect/>
           </a:stretch>
         </p:blipFill>
         <p:spPr>
           <a:xfrm>
-            <a:off x="197963" y="1151876"/>
-            <a:ext cx="3774191" cy="3096193"/>
+            <a:off x="1551344" y="3905768"/>
+            <a:ext cx="7592656" cy="1237732"/>
           </a:xfrm>
+          <a:prstGeom prst="rect">
+            <a:avLst/>
+          </a:prstGeom>
         </p:spPr>
       </p:pic>
       <p:sp>
@@ -48148,8 +48899,8 @@
         </p:nvSpPr>
         <p:spPr>
           <a:xfrm>
-            <a:off x="4629150" y="1369219"/>
-            <a:ext cx="4137778" cy="3263504"/>
+            <a:off x="5459767" y="1369219"/>
+            <a:ext cx="3684233" cy="3176962"/>
           </a:xfrm>
         </p:spPr>
         <p:txBody>
@@ -48158,54 +48909,43 @@
           <a:p>
             <a:r>
               <a:rPr lang="en-US" dirty="0"/>
-              <a:t>FD-&gt;bk = Pointer!</a:t>
-            </a:r>
-          </a:p>
-          <a:p>
+              <a:t>Set </a:t>
+            </a:r>
+            <a:r>
+              <a:rPr lang="en-US" b="1" dirty="0"/>
+              <a:t>Prev</a:t>
+            </a:r>
             <a:r>
               <a:rPr lang="en-US" dirty="0"/>
-              <a:t>BK-&gt;fd = Pointer!</a:t>
-            </a:r>
-          </a:p>
-          <a:p>
+              <a:t> to be </a:t>
+            </a:r>
+            <a:r>
+              <a:rPr lang="en-US" b="1" dirty="0"/>
+              <a:t>Pointer</a:t>
+            </a:r>
             <a:r>
               <a:rPr lang="en-US" dirty="0"/>
-              <a:t>Passes BOTH parts of the check</a:t>
+              <a:t> </a:t>
+            </a:r>
+            <a:r>
+              <a:rPr lang="en-US" b="1" dirty="0"/>
+              <a:t>– 0x10</a:t>
+            </a:r>
+          </a:p>
+          <a:p>
+            <a:r>
+              <a:rPr lang="en-US" dirty="0"/>
+              <a:t>Prev + 0x10 (bk) = Pointer!</a:t>
+            </a:r>
+          </a:p>
+          <a:p>
+            <a:r>
+              <a:rPr lang="en-US" dirty="0"/>
+              <a:t>Passes the SECOND part of the check</a:t>
             </a:r>
           </a:p>
         </p:txBody>
       </p:sp>
-      <p:pic>
-        <p:nvPicPr>
-          <p:cNvPr id="13" name="Content Placeholder 4" descr="Unlink Mitigation">
-            <a:extLst>
-              <a:ext uri="{FF2B5EF4-FFF2-40B4-BE49-F238E27FC236}">
-                <a16:creationId xmlns:a16="http://schemas.microsoft.com/office/drawing/2014/main" id="{E2D7F700-5AD9-E749-A930-4450D98053D2}"/>
-              </a:ext>
-            </a:extLst>
-          </p:cNvPr>
-          <p:cNvPicPr>
-            <a:picLocks noChangeAspect="1"/>
-          </p:cNvPicPr>
-          <p:nvPr/>
-        </p:nvPicPr>
-        <p:blipFill>
-          <a:blip r:embed="rId3"/>
-          <a:stretch>
-            <a:fillRect/>
-          </a:stretch>
-        </p:blipFill>
-        <p:spPr>
-          <a:xfrm>
-            <a:off x="2195582" y="3995951"/>
-            <a:ext cx="6892446" cy="1120021"/>
-          </a:xfrm>
-          <a:prstGeom prst="rect">
-            <a:avLst/>
-          </a:prstGeom>
-          <a:noFill/>
-        </p:spPr>
-      </p:pic>
       <p:cxnSp>
         <p:nvCxnSpPr>
           <p:cNvPr id="14" name="Straight Connector 13">
@@ -48222,8 +48962,8 @@
         </p:nvCxnSpPr>
         <p:spPr>
           <a:xfrm>
-            <a:off x="4458878" y="4869653"/>
-            <a:ext cx="2187019" cy="0"/>
+            <a:off x="5862648" y="4843020"/>
+            <a:ext cx="1570455" cy="0"/>
           </a:xfrm>
           <a:prstGeom prst="line">
             <a:avLst/>
@@ -48249,10 +48989,39 @@
           </a:fontRef>
         </p:style>
       </p:cxnSp>
+      <p:pic>
+        <p:nvPicPr>
+          <p:cNvPr id="12" name="Content Placeholder 11" descr="Unsafe unlink prev pointer setup">
+            <a:extLst>
+              <a:ext uri="{FF2B5EF4-FFF2-40B4-BE49-F238E27FC236}">
+                <a16:creationId xmlns:a16="http://schemas.microsoft.com/office/drawing/2014/main" id="{7A89A986-ABBF-E64D-8C92-2BA253CFC472}"/>
+              </a:ext>
+            </a:extLst>
+          </p:cNvPr>
+          <p:cNvPicPr>
+            <a:picLocks noGrp="1" noChangeAspect="1"/>
+          </p:cNvPicPr>
+          <p:nvPr>
+            <p:ph sz="half" idx="1"/>
+          </p:nvPr>
+        </p:nvPicPr>
+        <p:blipFill>
+          <a:blip r:embed="rId4"/>
+          <a:stretch>
+            <a:fillRect/>
+          </a:stretch>
+        </p:blipFill>
+        <p:spPr>
+          <a:xfrm>
+            <a:off x="0" y="1007824"/>
+            <a:ext cx="5051394" cy="2844732"/>
+          </a:xfrm>
+        </p:spPr>
+      </p:pic>
     </p:spTree>
     <p:extLst>
       <p:ext uri="{BB962C8B-B14F-4D97-AF65-F5344CB8AC3E}">
-        <p14:creationId xmlns:p14="http://schemas.microsoft.com/office/powerpoint/2010/main" val="2802998201"/>
+        <p14:creationId xmlns:p14="http://schemas.microsoft.com/office/powerpoint/2010/main" val="3041122637"/>
       </p:ext>
     </p:extLst>
   </p:cSld>
@@ -48279,12 +49048,42 @@
           <a:chExt cx="0" cy="0"/>
         </a:xfrm>
       </p:grpSpPr>
+      <p:pic>
+        <p:nvPicPr>
+          <p:cNvPr id="4" name="Picture 3" descr="Unlink macro with the security check">
+            <a:extLst>
+              <a:ext uri="{FF2B5EF4-FFF2-40B4-BE49-F238E27FC236}">
+                <a16:creationId xmlns:a16="http://schemas.microsoft.com/office/drawing/2014/main" id="{1DD282F1-2337-7B46-8AFC-25009E2BFE9B}"/>
+              </a:ext>
+            </a:extLst>
+          </p:cNvPr>
+          <p:cNvPicPr>
+            <a:picLocks noChangeAspect="1"/>
+          </p:cNvPicPr>
+          <p:nvPr/>
+        </p:nvPicPr>
+        <p:blipFill>
+          <a:blip r:embed="rId3"/>
+          <a:stretch>
+            <a:fillRect/>
+          </a:stretch>
+        </p:blipFill>
+        <p:spPr>
+          <a:xfrm>
+            <a:off x="1551344" y="3905768"/>
+            <a:ext cx="7592656" cy="1237732"/>
+          </a:xfrm>
+          <a:prstGeom prst="rect">
+            <a:avLst/>
+          </a:prstGeom>
+        </p:spPr>
+      </p:pic>
       <p:sp>
         <p:nvSpPr>
           <p:cNvPr id="2" name="Title 1">
             <a:extLst>
               <a:ext uri="{FF2B5EF4-FFF2-40B4-BE49-F238E27FC236}">
-                <a16:creationId xmlns:a16="http://schemas.microsoft.com/office/drawing/2014/main" id="{F301ED8F-4787-BB44-A31D-56A8EBB356A6}"/>
+                <a16:creationId xmlns:a16="http://schemas.microsoft.com/office/drawing/2014/main" id="{E9E670F8-AACA-D046-8E4F-17454C7527D7}"/>
               </a:ext>
             </a:extLst>
           </p:cNvPr>
@@ -48295,53 +49094,31 @@
             <p:ph type="title"/>
           </p:nvPr>
         </p:nvSpPr>
-        <p:spPr/>
+        <p:spPr>
+          <a:xfrm>
+            <a:off x="628650" y="273847"/>
+            <a:ext cx="7886700" cy="994172"/>
+          </a:xfrm>
+        </p:spPr>
         <p:txBody>
-          <a:bodyPr/>
+          <a:bodyPr anchor="ctr">
+            <a:normAutofit/>
+          </a:bodyPr>
           <a:lstStyle/>
           <a:p>
             <a:r>
               <a:rPr lang="en-US" dirty="0"/>
-              <a:t>Remember This Macro?</a:t>
+              <a:t>Unsafe Unlink Setup – 7 </a:t>
             </a:r>
           </a:p>
         </p:txBody>
       </p:sp>
-      <p:pic>
-        <p:nvPicPr>
-          <p:cNvPr id="5" name="Content Placeholder 4" descr="A screenshot of a cell phone&#10;&#10;Description automatically generated">
+      <p:cxnSp>
+        <p:nvCxnSpPr>
+          <p:cNvPr id="14" name="Straight Connector 13">
             <a:extLst>
               <a:ext uri="{FF2B5EF4-FFF2-40B4-BE49-F238E27FC236}">
-                <a16:creationId xmlns:a16="http://schemas.microsoft.com/office/drawing/2014/main" id="{70D2DF68-10AC-764E-9191-57CBE9190183}"/>
-              </a:ext>
-            </a:extLst>
-          </p:cNvPr>
-          <p:cNvPicPr>
-            <a:picLocks noGrp="1" noChangeAspect="1"/>
-          </p:cNvPicPr>
-          <p:nvPr>
-            <p:ph idx="1"/>
-          </p:nvPr>
-        </p:nvPicPr>
-        <p:blipFill>
-          <a:blip r:embed="rId2"/>
-          <a:stretch>
-            <a:fillRect/>
-          </a:stretch>
-        </p:blipFill>
-        <p:spPr>
-          <a:xfrm>
-            <a:off x="1155593" y="1063706"/>
-            <a:ext cx="7988407" cy="3356474"/>
-          </a:xfrm>
-        </p:spPr>
-      </p:pic>
-      <p:cxnSp>
-        <p:nvCxnSpPr>
-          <p:cNvPr id="6" name="Straight Connector 5">
-            <a:extLst>
-              <a:ext uri="{FF2B5EF4-FFF2-40B4-BE49-F238E27FC236}">
-                <a16:creationId xmlns:a16="http://schemas.microsoft.com/office/drawing/2014/main" id="{08E2D46C-6615-1840-880C-890D7C2E7BFF}"/>
+                <a16:creationId xmlns:a16="http://schemas.microsoft.com/office/drawing/2014/main" id="{2ED6C49A-E183-3440-AD64-D776264FCDD9}"/>
               </a:ext>
             </a:extLst>
           </p:cNvPr>
@@ -48352,8 +49129,8 @@
         </p:nvCxnSpPr>
         <p:spPr>
           <a:xfrm>
-            <a:off x="1662152" y="3763466"/>
-            <a:ext cx="2702458" cy="0"/>
+            <a:off x="4030462" y="4843020"/>
+            <a:ext cx="3402641" cy="0"/>
           </a:xfrm>
           <a:prstGeom prst="line">
             <a:avLst/>
@@ -48379,53 +49156,109 @@
           </a:fontRef>
         </p:style>
       </p:cxnSp>
-      <p:cxnSp>
-        <p:nvCxnSpPr>
-          <p:cNvPr id="9" name="Straight Connector 8">
+      <p:sp>
+        <p:nvSpPr>
+          <p:cNvPr id="11" name="TextBox 10">
             <a:extLst>
               <a:ext uri="{FF2B5EF4-FFF2-40B4-BE49-F238E27FC236}">
-                <a16:creationId xmlns:a16="http://schemas.microsoft.com/office/drawing/2014/main" id="{DC2948BE-4341-DD4B-8395-8C913235A5B1}"/>
+                <a16:creationId xmlns:a16="http://schemas.microsoft.com/office/drawing/2014/main" id="{8DFB1D6B-FC36-AB43-AB49-E926AF9E41E1}"/>
               </a:ext>
             </a:extLst>
           </p:cNvPr>
-          <p:cNvCxnSpPr>
-            <a:cxnSpLocks/>
-          </p:cNvCxnSpPr>
+          <p:cNvSpPr txBox="1"/>
           <p:nvPr/>
-        </p:nvCxnSpPr>
+        </p:nvSpPr>
         <p:spPr>
           <a:xfrm>
-            <a:off x="1662152" y="3314786"/>
-            <a:ext cx="2702458" cy="0"/>
+            <a:off x="5514698" y="1425220"/>
+            <a:ext cx="3346882" cy="2400657"/>
           </a:xfrm>
-          <a:prstGeom prst="line">
+          <a:prstGeom prst="rect">
             <a:avLst/>
           </a:prstGeom>
-          <a:ln w="25400">
-            <a:solidFill>
-              <a:srgbClr val="FF0000"/>
-            </a:solidFill>
-          </a:ln>
+          <a:noFill/>
         </p:spPr>
-        <p:style>
-          <a:lnRef idx="1">
-            <a:schemeClr val="accent1"/>
-          </a:lnRef>
-          <a:fillRef idx="0">
-            <a:schemeClr val="accent1"/>
-          </a:fillRef>
-          <a:effectRef idx="0">
-            <a:schemeClr val="accent1"/>
-          </a:effectRef>
-          <a:fontRef idx="minor">
-            <a:schemeClr val="tx1"/>
-          </a:fontRef>
-        </p:style>
-      </p:cxnSp>
+        <p:txBody>
+          <a:bodyPr wrap="square">
+            <a:spAutoFit/>
+          </a:bodyPr>
+          <a:lstStyle/>
+          <a:p>
+            <a:pPr marL="285750" indent="-285750">
+              <a:buFont typeface="Arial" panose="020B0604020202020204" pitchFamily="34" charset="0"/>
+              <a:buChar char="•"/>
+            </a:pPr>
+            <a:r>
+              <a:rPr lang="en-US" sz="2500" dirty="0"/>
+              <a:t>FD-&gt;bk = Pointer!</a:t>
+            </a:r>
+          </a:p>
+          <a:p>
+            <a:pPr marL="285750" indent="-285750">
+              <a:buFont typeface="Arial" panose="020B0604020202020204" pitchFamily="34" charset="0"/>
+              <a:buChar char="•"/>
+            </a:pPr>
+            <a:r>
+              <a:rPr lang="en-US" sz="2500" dirty="0"/>
+              <a:t>BK-&gt;fd = Pointer!</a:t>
+            </a:r>
+          </a:p>
+          <a:p>
+            <a:pPr marL="285750" indent="-285750">
+              <a:buFont typeface="Arial" panose="020B0604020202020204" pitchFamily="34" charset="0"/>
+              <a:buChar char="•"/>
+            </a:pPr>
+            <a:r>
+              <a:rPr lang="en-US" sz="2500" dirty="0"/>
+              <a:t>Passes BOTH parts of the check!</a:t>
+            </a:r>
+          </a:p>
+          <a:p>
+            <a:pPr marL="285750" indent="-285750">
+              <a:buFont typeface="Arial" panose="020B0604020202020204" pitchFamily="34" charset="0"/>
+              <a:buChar char="•"/>
+            </a:pPr>
+            <a:r>
+              <a:rPr lang="en-US" sz="2500" dirty="0"/>
+              <a:t>Goes to the same location…</a:t>
+            </a:r>
+          </a:p>
+        </p:txBody>
+      </p:sp>
+      <p:pic>
+        <p:nvPicPr>
+          <p:cNvPr id="15" name="Content Placeholder 11" descr="Unsafe unlink prev pointer setup">
+            <a:extLst>
+              <a:ext uri="{FF2B5EF4-FFF2-40B4-BE49-F238E27FC236}">
+                <a16:creationId xmlns:a16="http://schemas.microsoft.com/office/drawing/2014/main" id="{351FE8B9-1E21-9F4A-9344-CFF0BFD2C559}"/>
+              </a:ext>
+            </a:extLst>
+          </p:cNvPr>
+          <p:cNvPicPr>
+            <a:picLocks noChangeAspect="1"/>
+          </p:cNvPicPr>
+          <p:nvPr/>
+        </p:nvPicPr>
+        <p:blipFill>
+          <a:blip r:embed="rId4"/>
+          <a:stretch>
+            <a:fillRect/>
+          </a:stretch>
+        </p:blipFill>
+        <p:spPr>
+          <a:xfrm>
+            <a:off x="0" y="1007824"/>
+            <a:ext cx="5051394" cy="2844732"/>
+          </a:xfrm>
+          <a:prstGeom prst="rect">
+            <a:avLst/>
+          </a:prstGeom>
+        </p:spPr>
+      </p:pic>
     </p:spTree>
     <p:extLst>
       <p:ext uri="{BB962C8B-B14F-4D97-AF65-F5344CB8AC3E}">
-        <p14:creationId xmlns:p14="http://schemas.microsoft.com/office/powerpoint/2010/main" val="1474679594"/>
+        <p14:creationId xmlns:p14="http://schemas.microsoft.com/office/powerpoint/2010/main" val="2963577786"/>
       </p:ext>
     </p:extLst>
   </p:cSld>
@@ -48786,17 +49619,17 @@
           <a:p>
             <a:r>
               <a:rPr lang="en-US" dirty="0"/>
-              <a:t>Actually Unlink Now!</a:t>
+              <a:t>Remember This Macro?</a:t>
             </a:r>
           </a:p>
         </p:txBody>
       </p:sp>
       <p:pic>
         <p:nvPicPr>
-          <p:cNvPr id="9" name="Content Placeholder 8" descr="Unlink last two lines">
+          <p:cNvPr id="5" name="Content Placeholder 4" descr="A screenshot of a cell phone&#10;&#10;Description automatically generated">
             <a:extLst>
               <a:ext uri="{FF2B5EF4-FFF2-40B4-BE49-F238E27FC236}">
-                <a16:creationId xmlns:a16="http://schemas.microsoft.com/office/drawing/2014/main" id="{F2A925A2-9E8E-9442-BFAD-A41F23251990}"/>
+                <a16:creationId xmlns:a16="http://schemas.microsoft.com/office/drawing/2014/main" id="{70D2DF68-10AC-764E-9191-57CBE9190183}"/>
               </a:ext>
             </a:extLst>
           </p:cNvPr>
@@ -48807,32 +49640,6 @@
             <p:ph idx="1"/>
           </p:nvPr>
         </p:nvPicPr>
-        <p:blipFill rotWithShape="1">
-          <a:blip r:embed="rId2"/>
-          <a:srcRect r="47856"/>
-          <a:stretch/>
-        </p:blipFill>
-        <p:spPr>
-          <a:xfrm>
-            <a:off x="516038" y="1152041"/>
-            <a:ext cx="2364137" cy="876300"/>
-          </a:xfrm>
-        </p:spPr>
-      </p:pic>
-      <p:pic>
-        <p:nvPicPr>
-          <p:cNvPr id="5" name="Picture 4">
-            <a:extLst>
-              <a:ext uri="{FF2B5EF4-FFF2-40B4-BE49-F238E27FC236}">
-                <a16:creationId xmlns:a16="http://schemas.microsoft.com/office/drawing/2014/main" id="{E88DECB1-3E07-6C48-B9E3-96955483BFFB}"/>
-              </a:ext>
-            </a:extLst>
-          </p:cNvPr>
-          <p:cNvPicPr>
-            <a:picLocks noChangeAspect="1"/>
-          </p:cNvPicPr>
-          <p:nvPr/>
-        </p:nvPicPr>
         <p:blipFill>
           <a:blip r:embed="rId3"/>
           <a:stretch>
@@ -48841,18 +49648,148 @@
         </p:blipFill>
         <p:spPr>
           <a:xfrm>
-            <a:off x="1215937" y="1743217"/>
-            <a:ext cx="6683725" cy="3007675"/>
+            <a:off x="177554" y="1268019"/>
+            <a:ext cx="5939134" cy="2495435"/>
+          </a:xfrm>
+        </p:spPr>
+      </p:pic>
+      <p:cxnSp>
+        <p:nvCxnSpPr>
+          <p:cNvPr id="6" name="Straight Connector 5">
+            <a:extLst>
+              <a:ext uri="{FF2B5EF4-FFF2-40B4-BE49-F238E27FC236}">
+                <a16:creationId xmlns:a16="http://schemas.microsoft.com/office/drawing/2014/main" id="{08E2D46C-6615-1840-880C-890D7C2E7BFF}"/>
+              </a:ext>
+            </a:extLst>
+          </p:cNvPr>
+          <p:cNvCxnSpPr>
+            <a:cxnSpLocks/>
+          </p:cNvCxnSpPr>
+          <p:nvPr/>
+        </p:nvCxnSpPr>
+        <p:spPr>
+          <a:xfrm>
+            <a:off x="437033" y="2946721"/>
+            <a:ext cx="2702458" cy="0"/>
+          </a:xfrm>
+          <a:prstGeom prst="line">
+            <a:avLst/>
+          </a:prstGeom>
+          <a:ln w="25400">
+            <a:solidFill>
+              <a:srgbClr val="FF0000"/>
+            </a:solidFill>
+          </a:ln>
+        </p:spPr>
+        <p:style>
+          <a:lnRef idx="1">
+            <a:schemeClr val="accent1"/>
+          </a:lnRef>
+          <a:fillRef idx="0">
+            <a:schemeClr val="accent1"/>
+          </a:fillRef>
+          <a:effectRef idx="0">
+            <a:schemeClr val="accent1"/>
+          </a:effectRef>
+          <a:fontRef idx="minor">
+            <a:schemeClr val="tx1"/>
+          </a:fontRef>
+        </p:style>
+      </p:cxnSp>
+      <p:cxnSp>
+        <p:nvCxnSpPr>
+          <p:cNvPr id="9" name="Straight Connector 8">
+            <a:extLst>
+              <a:ext uri="{FF2B5EF4-FFF2-40B4-BE49-F238E27FC236}">
+                <a16:creationId xmlns:a16="http://schemas.microsoft.com/office/drawing/2014/main" id="{DC2948BE-4341-DD4B-8395-8C913235A5B1}"/>
+              </a:ext>
+            </a:extLst>
+          </p:cNvPr>
+          <p:cNvCxnSpPr>
+            <a:cxnSpLocks/>
+          </p:cNvCxnSpPr>
+          <p:nvPr/>
+        </p:nvCxnSpPr>
+        <p:spPr>
+          <a:xfrm>
+            <a:off x="437033" y="3297030"/>
+            <a:ext cx="2702458" cy="0"/>
+          </a:xfrm>
+          <a:prstGeom prst="line">
+            <a:avLst/>
+          </a:prstGeom>
+          <a:ln w="25400">
+            <a:solidFill>
+              <a:srgbClr val="FF0000"/>
+            </a:solidFill>
+          </a:ln>
+        </p:spPr>
+        <p:style>
+          <a:lnRef idx="1">
+            <a:schemeClr val="accent1"/>
+          </a:lnRef>
+          <a:fillRef idx="0">
+            <a:schemeClr val="accent1"/>
+          </a:fillRef>
+          <a:effectRef idx="0">
+            <a:schemeClr val="accent1"/>
+          </a:effectRef>
+          <a:fontRef idx="minor">
+            <a:schemeClr val="tx1"/>
+          </a:fontRef>
+        </p:style>
+      </p:cxnSp>
+      <p:pic>
+        <p:nvPicPr>
+          <p:cNvPr id="1026" name="Picture 2" descr="31 Photos That Prove Life As A Parent Is Basically One Big Mess | HuffPost  Life">
+            <a:extLst>
+              <a:ext uri="{FF2B5EF4-FFF2-40B4-BE49-F238E27FC236}">
+                <a16:creationId xmlns:a16="http://schemas.microsoft.com/office/drawing/2014/main" id="{C3CB1E2A-E808-094B-AB5C-2B7F8CD2784D}"/>
+              </a:ext>
+            </a:extLst>
+          </p:cNvPr>
+          <p:cNvPicPr>
+            <a:picLocks noChangeAspect="1" noChangeArrowheads="1"/>
+          </p:cNvPicPr>
+          <p:nvPr/>
+        </p:nvPicPr>
+        <p:blipFill>
+          <a:blip r:embed="rId4">
+            <a:extLst>
+              <a:ext uri="{28A0092B-C50C-407E-A947-70E740481C1C}">
+                <a14:useLocalDpi xmlns:a14="http://schemas.microsoft.com/office/drawing/2010/main" val="0"/>
+              </a:ext>
+            </a:extLst>
+          </a:blip>
+          <a:srcRect/>
+          <a:stretch>
+            <a:fillRect/>
+          </a:stretch>
+        </p:blipFill>
+        <p:spPr bwMode="auto">
+          <a:xfrm>
+            <a:off x="5419570" y="1171851"/>
+            <a:ext cx="2796124" cy="3741021"/>
           </a:xfrm>
           <a:prstGeom prst="rect">
             <a:avLst/>
           </a:prstGeom>
+          <a:noFill/>
+          <a:extLst>
+            <a:ext uri="{909E8E84-426E-40DD-AFC4-6F175D3DCCD1}">
+              <a14:hiddenFill xmlns:a14="http://schemas.microsoft.com/office/drawing/2010/main">
+                <a:solidFill>
+                  <a:srgbClr val="FFFFFF"/>
+                </a:solidFill>
+              </a14:hiddenFill>
+            </a:ext>
+          </a:extLst>
         </p:spPr>
       </p:pic>
     </p:spTree>
     <p:extLst>
       <p:ext uri="{BB962C8B-B14F-4D97-AF65-F5344CB8AC3E}">
-        <p14:creationId xmlns:p14="http://schemas.microsoft.com/office/powerpoint/2010/main" val="2186476783"/>
+        <p14:creationId xmlns:p14="http://schemas.microsoft.com/office/powerpoint/2010/main" val="1474679594"/>
       </p:ext>
     </p:extLst>
   </p:cSld>
@@ -48879,41 +49816,12 @@
           <a:chExt cx="0" cy="0"/>
         </a:xfrm>
       </p:grpSpPr>
-      <p:pic>
-        <p:nvPicPr>
-          <p:cNvPr id="7" name="Content Placeholder 6" descr="Unlink results in pointer editing">
-            <a:extLst>
-              <a:ext uri="{FF2B5EF4-FFF2-40B4-BE49-F238E27FC236}">
-                <a16:creationId xmlns:a16="http://schemas.microsoft.com/office/drawing/2014/main" id="{6AEE9D39-D1C9-1E48-B6CC-55C4F01FD2B1}"/>
-              </a:ext>
-            </a:extLst>
-          </p:cNvPr>
-          <p:cNvPicPr>
-            <a:picLocks noGrp="1" noChangeAspect="1"/>
-          </p:cNvPicPr>
-          <p:nvPr>
-            <p:ph sz="half" idx="1"/>
-          </p:nvPr>
-        </p:nvPicPr>
-        <p:blipFill>
-          <a:blip r:embed="rId2"/>
-          <a:stretch>
-            <a:fillRect/>
-          </a:stretch>
-        </p:blipFill>
-        <p:spPr>
-          <a:xfrm>
-            <a:off x="213282" y="1003766"/>
-            <a:ext cx="4137778" cy="3315062"/>
-          </a:xfrm>
-        </p:spPr>
-      </p:pic>
       <p:sp>
         <p:nvSpPr>
           <p:cNvPr id="2" name="Title 1">
             <a:extLst>
               <a:ext uri="{FF2B5EF4-FFF2-40B4-BE49-F238E27FC236}">
-                <a16:creationId xmlns:a16="http://schemas.microsoft.com/office/drawing/2014/main" id="{E9E670F8-AACA-D046-8E4F-17454C7527D7}"/>
+                <a16:creationId xmlns:a16="http://schemas.microsoft.com/office/drawing/2014/main" id="{F301ED8F-4787-BB44-A31D-56A8EBB356A6}"/>
               </a:ext>
             </a:extLst>
           </p:cNvPr>
@@ -48924,76 +49832,59 @@
             <p:ph type="title"/>
           </p:nvPr>
         </p:nvSpPr>
-        <p:spPr>
-          <a:xfrm>
-            <a:off x="628650" y="273847"/>
-            <a:ext cx="7886700" cy="994172"/>
-          </a:xfrm>
-        </p:spPr>
-        <p:txBody>
-          <a:bodyPr anchor="ctr">
-            <a:normAutofit/>
-          </a:bodyPr>
-          <a:lstStyle/>
-          <a:p>
-            <a:r>
-              <a:rPr lang="en-US" dirty="0"/>
-              <a:t>Unsafe Unlink Result</a:t>
-            </a:r>
-          </a:p>
-        </p:txBody>
-      </p:sp>
-      <p:sp>
-        <p:nvSpPr>
-          <p:cNvPr id="10" name="Content Placeholder 3">
-            <a:extLst>
-              <a:ext uri="{FF2B5EF4-FFF2-40B4-BE49-F238E27FC236}">
-                <a16:creationId xmlns:a16="http://schemas.microsoft.com/office/drawing/2014/main" id="{2261C260-EABE-400C-BFDD-E06E1533800F}"/>
-              </a:ext>
-            </a:extLst>
-          </p:cNvPr>
-          <p:cNvSpPr>
-            <a:spLocks noGrp="1"/>
-          </p:cNvSpPr>
-          <p:nvPr>
-            <p:ph sz="half" idx="2"/>
-          </p:nvPr>
-        </p:nvSpPr>
-        <p:spPr>
-          <a:xfrm>
-            <a:off x="4629150" y="1369219"/>
-            <a:ext cx="4137778" cy="3263504"/>
-          </a:xfrm>
-        </p:spPr>
+        <p:spPr/>
         <p:txBody>
           <a:bodyPr/>
           <a:lstStyle/>
           <a:p>
             <a:r>
               <a:rPr lang="en-US" dirty="0"/>
-              <a:t>P-&gt;bk-&gt;fd = BK</a:t>
-            </a:r>
-          </a:p>
-          <a:p>
-            <a:r>
-              <a:rPr lang="en-US" dirty="0"/>
-              <a:t>P-&gt;fd-&gt;bk = FD</a:t>
-            </a:r>
-          </a:p>
-          <a:p>
-            <a:r>
-              <a:rPr lang="en-US" dirty="0"/>
-              <a:t>Overwrite the pointer itself!</a:t>
+              <a:t>Actually Unlink Now!</a:t>
             </a:r>
           </a:p>
         </p:txBody>
       </p:sp>
       <p:pic>
         <p:nvPicPr>
-          <p:cNvPr id="4" name="Picture 3" descr="Unsafe unlink writing over the top of itself.">
+          <p:cNvPr id="6" name="Graphic 5" descr="Edit Prevs fd (BK) to be the same as Next (FD) ">
             <a:extLst>
               <a:ext uri="{FF2B5EF4-FFF2-40B4-BE49-F238E27FC236}">
-                <a16:creationId xmlns:a16="http://schemas.microsoft.com/office/drawing/2014/main" id="{58592682-B9B8-4248-9071-BDF61B8A204F}"/>
+                <a16:creationId xmlns:a16="http://schemas.microsoft.com/office/drawing/2014/main" id="{8CD1DE6E-26B6-6F4B-AD59-846B9F958419}"/>
+              </a:ext>
+            </a:extLst>
+          </p:cNvPr>
+          <p:cNvPicPr>
+            <a:picLocks noChangeAspect="1"/>
+          </p:cNvPicPr>
+          <p:nvPr/>
+        </p:nvPicPr>
+        <p:blipFill rotWithShape="1">
+          <a:blip r:embed="rId3">
+            <a:extLst>
+              <a:ext uri="{96DAC541-7B7A-43D3-8B79-37D633B846F1}">
+                <asvg:svgBlip xmlns:asvg="http://schemas.microsoft.com/office/drawing/2016/SVG/main" r:embed="rId4"/>
+              </a:ext>
+            </a:extLst>
+          </a:blip>
+          <a:srcRect l="12921" t="17087" r="31908" b="65998"/>
+          <a:stretch/>
+        </p:blipFill>
+        <p:spPr>
+          <a:xfrm>
+            <a:off x="3284032" y="2450861"/>
+            <a:ext cx="5502755" cy="2183283"/>
+          </a:xfrm>
+          <a:prstGeom prst="rect">
+            <a:avLst/>
+          </a:prstGeom>
+        </p:spPr>
+      </p:pic>
+      <p:pic>
+        <p:nvPicPr>
+          <p:cNvPr id="10" name="Picture 9" descr="Unlink Macro with name update">
+            <a:extLst>
+              <a:ext uri="{FF2B5EF4-FFF2-40B4-BE49-F238E27FC236}">
+                <a16:creationId xmlns:a16="http://schemas.microsoft.com/office/drawing/2014/main" id="{7912C908-3C6B-BA43-B5F1-7DA89CB3150F}"/>
               </a:ext>
             </a:extLst>
           </p:cNvPr>
@@ -49003,25 +49894,111 @@
           <p:nvPr/>
         </p:nvPicPr>
         <p:blipFill>
-          <a:blip r:embed="rId3"/>
+          <a:blip r:embed="rId5"/>
           <a:stretch>
             <a:fillRect/>
           </a:stretch>
         </p:blipFill>
         <p:spPr>
           <a:xfrm>
-            <a:off x="2525587" y="3702027"/>
-            <a:ext cx="3223279" cy="1233601"/>
+            <a:off x="29621" y="1042803"/>
+            <a:ext cx="4178300" cy="1638300"/>
           </a:xfrm>
           <a:prstGeom prst="rect">
             <a:avLst/>
           </a:prstGeom>
         </p:spPr>
       </p:pic>
+      <p:cxnSp>
+        <p:nvCxnSpPr>
+          <p:cNvPr id="11" name="Straight Connector 10">
+            <a:extLst>
+              <a:ext uri="{FF2B5EF4-FFF2-40B4-BE49-F238E27FC236}">
+                <a16:creationId xmlns:a16="http://schemas.microsoft.com/office/drawing/2014/main" id="{21B4E65C-1F18-9D4C-AF7B-A843FFF7EEBC}"/>
+              </a:ext>
+            </a:extLst>
+          </p:cNvPr>
+          <p:cNvCxnSpPr>
+            <a:cxnSpLocks/>
+          </p:cNvCxnSpPr>
+          <p:nvPr/>
+        </p:nvCxnSpPr>
+        <p:spPr>
+          <a:xfrm>
+            <a:off x="508518" y="2371916"/>
+            <a:ext cx="1716792" cy="0"/>
+          </a:xfrm>
+          <a:prstGeom prst="line">
+            <a:avLst/>
+          </a:prstGeom>
+          <a:ln w="25400">
+            <a:solidFill>
+              <a:srgbClr val="FF0000"/>
+            </a:solidFill>
+          </a:ln>
+        </p:spPr>
+        <p:style>
+          <a:lnRef idx="1">
+            <a:schemeClr val="accent1"/>
+          </a:lnRef>
+          <a:fillRef idx="0">
+            <a:schemeClr val="accent1"/>
+          </a:fillRef>
+          <a:effectRef idx="0">
+            <a:schemeClr val="accent1"/>
+          </a:effectRef>
+          <a:fontRef idx="minor">
+            <a:schemeClr val="tx1"/>
+          </a:fontRef>
+        </p:style>
+      </p:cxnSp>
+      <p:cxnSp>
+        <p:nvCxnSpPr>
+          <p:cNvPr id="12" name="Straight Connector 11">
+            <a:extLst>
+              <a:ext uri="{FF2B5EF4-FFF2-40B4-BE49-F238E27FC236}">
+                <a16:creationId xmlns:a16="http://schemas.microsoft.com/office/drawing/2014/main" id="{EA9F895A-72FB-4E49-9829-E83D546F3B1A}"/>
+              </a:ext>
+            </a:extLst>
+          </p:cNvPr>
+          <p:cNvCxnSpPr>
+            <a:cxnSpLocks/>
+          </p:cNvCxnSpPr>
+          <p:nvPr/>
+        </p:nvCxnSpPr>
+        <p:spPr>
+          <a:xfrm>
+            <a:off x="508518" y="2110528"/>
+            <a:ext cx="1716792" cy="0"/>
+          </a:xfrm>
+          <a:prstGeom prst="line">
+            <a:avLst/>
+          </a:prstGeom>
+          <a:ln w="25400">
+            <a:solidFill>
+              <a:srgbClr val="FF0000"/>
+            </a:solidFill>
+          </a:ln>
+        </p:spPr>
+        <p:style>
+          <a:lnRef idx="1">
+            <a:schemeClr val="accent1"/>
+          </a:lnRef>
+          <a:fillRef idx="0">
+            <a:schemeClr val="accent1"/>
+          </a:fillRef>
+          <a:effectRef idx="0">
+            <a:schemeClr val="accent1"/>
+          </a:effectRef>
+          <a:fontRef idx="minor">
+            <a:schemeClr val="tx1"/>
+          </a:fontRef>
+        </p:style>
+      </p:cxnSp>
     </p:spTree>
     <p:extLst>
       <p:ext uri="{BB962C8B-B14F-4D97-AF65-F5344CB8AC3E}">
-        <p14:creationId xmlns:p14="http://schemas.microsoft.com/office/powerpoint/2010/main" val="2272459286"/>
+        <p14:creationId xmlns:p14="http://schemas.microsoft.com/office/powerpoint/2010/main" val="2186476783"/>
       </p:ext>
     </p:extLst>
   </p:cSld>
@@ -49066,6 +50043,480 @@
         </p:nvSpPr>
         <p:spPr>
           <a:xfrm>
+            <a:off x="592585" y="0"/>
+            <a:ext cx="8418249" cy="994172"/>
+          </a:xfrm>
+        </p:spPr>
+        <p:txBody>
+          <a:bodyPr anchor="ctr">
+            <a:normAutofit fontScale="90000"/>
+          </a:bodyPr>
+          <a:lstStyle/>
+          <a:p>
+            <a:r>
+              <a:rPr lang="en-US" dirty="0"/>
+              <a:t>Unsafe Unlink – Overwrite Pointer!</a:t>
+            </a:r>
+          </a:p>
+        </p:txBody>
+      </p:sp>
+      <p:sp>
+        <p:nvSpPr>
+          <p:cNvPr id="8" name="Content Placeholder 7">
+            <a:extLst>
+              <a:ext uri="{FF2B5EF4-FFF2-40B4-BE49-F238E27FC236}">
+                <a16:creationId xmlns:a16="http://schemas.microsoft.com/office/drawing/2014/main" id="{3D35A732-1F45-D147-B0BB-44CB04EA56CF}"/>
+              </a:ext>
+            </a:extLst>
+          </p:cNvPr>
+          <p:cNvSpPr>
+            <a:spLocks noGrp="1"/>
+          </p:cNvSpPr>
+          <p:nvPr>
+            <p:ph sz="half" idx="2"/>
+          </p:nvPr>
+        </p:nvSpPr>
+        <p:spPr>
+          <a:xfrm>
+            <a:off x="5395501" y="809926"/>
+            <a:ext cx="3615334" cy="3263504"/>
+          </a:xfrm>
+        </p:spPr>
+        <p:txBody>
+          <a:bodyPr/>
+          <a:lstStyle/>
+          <a:p>
+            <a:pPr marL="0" indent="0">
+              <a:buNone/>
+            </a:pPr>
+            <a:endParaRPr lang="en-US" dirty="0"/>
+          </a:p>
+          <a:p>
+            <a:r>
+              <a:rPr lang="en-US" dirty="0"/>
+              <a:t>Next = Pointer – 0x18</a:t>
+            </a:r>
+          </a:p>
+          <a:p>
+            <a:r>
+              <a:rPr lang="en-US" dirty="0"/>
+              <a:t>Prev = Pointer – 0x10</a:t>
+            </a:r>
+          </a:p>
+          <a:p>
+            <a:r>
+              <a:rPr lang="en-US" dirty="0"/>
+              <a:t>Next-&gt;bk = prev</a:t>
+            </a:r>
+          </a:p>
+          <a:p>
+            <a:r>
+              <a:rPr lang="en-US" dirty="0"/>
+              <a:t>Overwrites the </a:t>
+            </a:r>
+            <a:r>
+              <a:rPr lang="en-US" i="1" dirty="0"/>
+              <a:t>Pointer to Chunk</a:t>
+            </a:r>
+            <a:r>
+              <a:rPr lang="en-US" dirty="0"/>
+              <a:t> with a pointer close to itself!</a:t>
+            </a:r>
+          </a:p>
+          <a:p>
+            <a:pPr marL="0" indent="0">
+              <a:buNone/>
+            </a:pPr>
+            <a:endParaRPr lang="en-US" dirty="0"/>
+          </a:p>
+        </p:txBody>
+      </p:sp>
+      <p:pic>
+        <p:nvPicPr>
+          <p:cNvPr id="12" name="Picture 11" descr="Unlink Macro with name update">
+            <a:extLst>
+              <a:ext uri="{FF2B5EF4-FFF2-40B4-BE49-F238E27FC236}">
+                <a16:creationId xmlns:a16="http://schemas.microsoft.com/office/drawing/2014/main" id="{D224A1C7-CD3F-BE40-AE4B-88DF65C91CD6}"/>
+              </a:ext>
+            </a:extLst>
+          </p:cNvPr>
+          <p:cNvPicPr>
+            <a:picLocks noChangeAspect="1"/>
+          </p:cNvPicPr>
+          <p:nvPr/>
+        </p:nvPicPr>
+        <p:blipFill rotWithShape="1">
+          <a:blip r:embed="rId2"/>
+          <a:srcRect l="9194" t="48512" r="41691" b="14201"/>
+          <a:stretch/>
+        </p:blipFill>
+        <p:spPr>
+          <a:xfrm>
+            <a:off x="861134" y="3822478"/>
+            <a:ext cx="3710866" cy="1104630"/>
+          </a:xfrm>
+          <a:prstGeom prst="rect">
+            <a:avLst/>
+          </a:prstGeom>
+        </p:spPr>
+      </p:pic>
+      <p:cxnSp>
+        <p:nvCxnSpPr>
+          <p:cNvPr id="17" name="Straight Connector 16">
+            <a:extLst>
+              <a:ext uri="{FF2B5EF4-FFF2-40B4-BE49-F238E27FC236}">
+                <a16:creationId xmlns:a16="http://schemas.microsoft.com/office/drawing/2014/main" id="{63FA7DF3-9F11-4B4B-97C4-C28A6353DA62}"/>
+              </a:ext>
+            </a:extLst>
+          </p:cNvPr>
+          <p:cNvCxnSpPr>
+            <a:cxnSpLocks/>
+          </p:cNvCxnSpPr>
+          <p:nvPr/>
+        </p:nvCxnSpPr>
+        <p:spPr>
+          <a:xfrm>
+            <a:off x="1005204" y="4273574"/>
+            <a:ext cx="3273833" cy="0"/>
+          </a:xfrm>
+          <a:prstGeom prst="line">
+            <a:avLst/>
+          </a:prstGeom>
+          <a:ln w="25400">
+            <a:solidFill>
+              <a:srgbClr val="FF0000"/>
+            </a:solidFill>
+          </a:ln>
+        </p:spPr>
+        <p:style>
+          <a:lnRef idx="1">
+            <a:schemeClr val="accent1"/>
+          </a:lnRef>
+          <a:fillRef idx="0">
+            <a:schemeClr val="accent1"/>
+          </a:fillRef>
+          <a:effectRef idx="0">
+            <a:schemeClr val="accent1"/>
+          </a:effectRef>
+          <a:fontRef idx="minor">
+            <a:schemeClr val="tx1"/>
+          </a:fontRef>
+        </p:style>
+      </p:cxnSp>
+      <p:pic>
+        <p:nvPicPr>
+          <p:cNvPr id="22" name="Content Placeholder 21" descr="Unsafe unlink overwrite the pointer to itself - FD-&gt;bk">
+            <a:extLst>
+              <a:ext uri="{FF2B5EF4-FFF2-40B4-BE49-F238E27FC236}">
+                <a16:creationId xmlns:a16="http://schemas.microsoft.com/office/drawing/2014/main" id="{DE41A23F-455B-0E45-A47B-0F044D4BB58B}"/>
+              </a:ext>
+            </a:extLst>
+          </p:cNvPr>
+          <p:cNvPicPr>
+            <a:picLocks noGrp="1" noChangeAspect="1"/>
+          </p:cNvPicPr>
+          <p:nvPr>
+            <p:ph sz="half" idx="1"/>
+          </p:nvPr>
+        </p:nvPicPr>
+        <p:blipFill>
+          <a:blip r:embed="rId3"/>
+          <a:stretch>
+            <a:fillRect/>
+          </a:stretch>
+        </p:blipFill>
+        <p:spPr>
+          <a:xfrm>
+            <a:off x="0" y="765818"/>
+            <a:ext cx="5395500" cy="2901098"/>
+          </a:xfrm>
+        </p:spPr>
+      </p:pic>
+    </p:spTree>
+    <p:extLst>
+      <p:ext uri="{BB962C8B-B14F-4D97-AF65-F5344CB8AC3E}">
+        <p14:creationId xmlns:p14="http://schemas.microsoft.com/office/powerpoint/2010/main" val="2272459286"/>
+      </p:ext>
+    </p:extLst>
+  </p:cSld>
+  <p:clrMapOvr>
+    <a:masterClrMapping/>
+  </p:clrMapOvr>
+</p:sld>
+</file>
+
+<file path=ppt/slides/slide93.xml><?xml version="1.0" encoding="utf-8"?>
+<p:sld xmlns:a="http://schemas.openxmlformats.org/drawingml/2006/main" xmlns:r="http://schemas.openxmlformats.org/officeDocument/2006/relationships" xmlns:p="http://schemas.openxmlformats.org/presentationml/2006/main">
+  <p:cSld>
+    <p:spTree>
+      <p:nvGrpSpPr>
+        <p:cNvPr id="1" name=""/>
+        <p:cNvGrpSpPr/>
+        <p:nvPr/>
+      </p:nvGrpSpPr>
+      <p:grpSpPr>
+        <a:xfrm>
+          <a:off x="0" y="0"/>
+          <a:ext cx="0" cy="0"/>
+          <a:chOff x="0" y="0"/>
+          <a:chExt cx="0" cy="0"/>
+        </a:xfrm>
+      </p:grpSpPr>
+      <p:sp>
+        <p:nvSpPr>
+          <p:cNvPr id="2" name="Title 1">
+            <a:extLst>
+              <a:ext uri="{FF2B5EF4-FFF2-40B4-BE49-F238E27FC236}">
+                <a16:creationId xmlns:a16="http://schemas.microsoft.com/office/drawing/2014/main" id="{E9E670F8-AACA-D046-8E4F-17454C7527D7}"/>
+              </a:ext>
+            </a:extLst>
+          </p:cNvPr>
+          <p:cNvSpPr>
+            <a:spLocks noGrp="1"/>
+          </p:cNvSpPr>
+          <p:nvPr>
+            <p:ph type="title"/>
+          </p:nvPr>
+        </p:nvSpPr>
+        <p:spPr>
+          <a:xfrm>
+            <a:off x="592585" y="0"/>
+            <a:ext cx="8418249" cy="994172"/>
+          </a:xfrm>
+        </p:spPr>
+        <p:txBody>
+          <a:bodyPr anchor="ctr">
+            <a:normAutofit fontScale="90000"/>
+          </a:bodyPr>
+          <a:lstStyle/>
+          <a:p>
+            <a:r>
+              <a:rPr lang="en-US" dirty="0"/>
+              <a:t>Unsafe Unlink – Overwrite Pointer!</a:t>
+            </a:r>
+          </a:p>
+        </p:txBody>
+      </p:sp>
+      <p:sp>
+        <p:nvSpPr>
+          <p:cNvPr id="8" name="Content Placeholder 7">
+            <a:extLst>
+              <a:ext uri="{FF2B5EF4-FFF2-40B4-BE49-F238E27FC236}">
+                <a16:creationId xmlns:a16="http://schemas.microsoft.com/office/drawing/2014/main" id="{3D35A732-1F45-D147-B0BB-44CB04EA56CF}"/>
+              </a:ext>
+            </a:extLst>
+          </p:cNvPr>
+          <p:cNvSpPr>
+            <a:spLocks noGrp="1"/>
+          </p:cNvSpPr>
+          <p:nvPr>
+            <p:ph sz="half" idx="2"/>
+          </p:nvPr>
+        </p:nvSpPr>
+        <p:spPr>
+          <a:xfrm>
+            <a:off x="5395501" y="809926"/>
+            <a:ext cx="3615334" cy="3263504"/>
+          </a:xfrm>
+        </p:spPr>
+        <p:txBody>
+          <a:bodyPr/>
+          <a:lstStyle/>
+          <a:p>
+            <a:pPr marL="0" indent="0">
+              <a:buNone/>
+            </a:pPr>
+            <a:endParaRPr lang="en-US" dirty="0"/>
+          </a:p>
+          <a:p>
+            <a:r>
+              <a:rPr lang="en-US" dirty="0"/>
+              <a:t>Next = Pointer – 0x18</a:t>
+            </a:r>
+          </a:p>
+          <a:p>
+            <a:r>
+              <a:rPr lang="en-US" dirty="0"/>
+              <a:t>Prev = Pointer – 0x10</a:t>
+            </a:r>
+          </a:p>
+          <a:p>
+            <a:r>
+              <a:rPr lang="en-US" dirty="0"/>
+              <a:t>Prev&gt;fd = Next</a:t>
+            </a:r>
+          </a:p>
+          <a:p>
+            <a:r>
+              <a:rPr lang="en-US" dirty="0"/>
+              <a:t>Overwrites the </a:t>
+            </a:r>
+            <a:r>
+              <a:rPr lang="en-US" i="1" dirty="0"/>
+              <a:t>Pointer to Chunk</a:t>
+            </a:r>
+            <a:r>
+              <a:rPr lang="en-US" dirty="0"/>
+              <a:t> with a pointer close to itself!.. Again!</a:t>
+            </a:r>
+          </a:p>
+          <a:p>
+            <a:pPr marL="0" indent="0">
+              <a:buNone/>
+            </a:pPr>
+            <a:endParaRPr lang="en-US" dirty="0"/>
+          </a:p>
+        </p:txBody>
+      </p:sp>
+      <p:pic>
+        <p:nvPicPr>
+          <p:cNvPr id="12" name="Picture 11" descr="Unlink Macro with name update">
+            <a:extLst>
+              <a:ext uri="{FF2B5EF4-FFF2-40B4-BE49-F238E27FC236}">
+                <a16:creationId xmlns:a16="http://schemas.microsoft.com/office/drawing/2014/main" id="{D224A1C7-CD3F-BE40-AE4B-88DF65C91CD6}"/>
+              </a:ext>
+            </a:extLst>
+          </p:cNvPr>
+          <p:cNvPicPr>
+            <a:picLocks noChangeAspect="1"/>
+          </p:cNvPicPr>
+          <p:nvPr/>
+        </p:nvPicPr>
+        <p:blipFill rotWithShape="1">
+          <a:blip r:embed="rId2"/>
+          <a:srcRect l="9194" t="48512" r="41691" b="14201"/>
+          <a:stretch/>
+        </p:blipFill>
+        <p:spPr>
+          <a:xfrm>
+            <a:off x="861134" y="3822478"/>
+            <a:ext cx="3710866" cy="1104630"/>
+          </a:xfrm>
+          <a:prstGeom prst="rect">
+            <a:avLst/>
+          </a:prstGeom>
+        </p:spPr>
+      </p:pic>
+      <p:cxnSp>
+        <p:nvCxnSpPr>
+          <p:cNvPr id="17" name="Straight Connector 16">
+            <a:extLst>
+              <a:ext uri="{FF2B5EF4-FFF2-40B4-BE49-F238E27FC236}">
+                <a16:creationId xmlns:a16="http://schemas.microsoft.com/office/drawing/2014/main" id="{63FA7DF3-9F11-4B4B-97C4-C28A6353DA62}"/>
+              </a:ext>
+            </a:extLst>
+          </p:cNvPr>
+          <p:cNvCxnSpPr>
+            <a:cxnSpLocks/>
+          </p:cNvCxnSpPr>
+          <p:nvPr/>
+        </p:nvCxnSpPr>
+        <p:spPr>
+          <a:xfrm>
+            <a:off x="996327" y="4815111"/>
+            <a:ext cx="3273833" cy="0"/>
+          </a:xfrm>
+          <a:prstGeom prst="line">
+            <a:avLst/>
+          </a:prstGeom>
+          <a:ln w="25400">
+            <a:solidFill>
+              <a:srgbClr val="FF0000"/>
+            </a:solidFill>
+          </a:ln>
+        </p:spPr>
+        <p:style>
+          <a:lnRef idx="1">
+            <a:schemeClr val="accent1"/>
+          </a:lnRef>
+          <a:fillRef idx="0">
+            <a:schemeClr val="accent1"/>
+          </a:fillRef>
+          <a:effectRef idx="0">
+            <a:schemeClr val="accent1"/>
+          </a:effectRef>
+          <a:fontRef idx="minor">
+            <a:schemeClr val="tx1"/>
+          </a:fontRef>
+        </p:style>
+      </p:cxnSp>
+      <p:pic>
+        <p:nvPicPr>
+          <p:cNvPr id="11" name="Content Placeholder 10" descr="Unsafe unlink overwrite the pointer to itself. BK-&gt;fd">
+            <a:extLst>
+              <a:ext uri="{FF2B5EF4-FFF2-40B4-BE49-F238E27FC236}">
+                <a16:creationId xmlns:a16="http://schemas.microsoft.com/office/drawing/2014/main" id="{4EBD1B1F-A12D-0C42-B3B5-9E830007947D}"/>
+              </a:ext>
+            </a:extLst>
+          </p:cNvPr>
+          <p:cNvPicPr>
+            <a:picLocks noGrp="1" noChangeAspect="1"/>
+          </p:cNvPicPr>
+          <p:nvPr>
+            <p:ph sz="half" idx="1"/>
+          </p:nvPr>
+        </p:nvPicPr>
+        <p:blipFill>
+          <a:blip r:embed="rId3"/>
+          <a:stretch>
+            <a:fillRect/>
+          </a:stretch>
+        </p:blipFill>
+        <p:spPr>
+          <a:xfrm>
+            <a:off x="133165" y="712272"/>
+            <a:ext cx="5395206" cy="2900940"/>
+          </a:xfrm>
+        </p:spPr>
+      </p:pic>
+    </p:spTree>
+    <p:extLst>
+      <p:ext uri="{BB962C8B-B14F-4D97-AF65-F5344CB8AC3E}">
+        <p14:creationId xmlns:p14="http://schemas.microsoft.com/office/powerpoint/2010/main" val="4054672689"/>
+      </p:ext>
+    </p:extLst>
+  </p:cSld>
+  <p:clrMapOvr>
+    <a:masterClrMapping/>
+  </p:clrMapOvr>
+</p:sld>
+</file>
+
+<file path=ppt/slides/slide94.xml><?xml version="1.0" encoding="utf-8"?>
+<p:sld xmlns:a="http://schemas.openxmlformats.org/drawingml/2006/main" xmlns:r="http://schemas.openxmlformats.org/officeDocument/2006/relationships" xmlns:p="http://schemas.openxmlformats.org/presentationml/2006/main">
+  <p:cSld>
+    <p:spTree>
+      <p:nvGrpSpPr>
+        <p:cNvPr id="1" name=""/>
+        <p:cNvGrpSpPr/>
+        <p:nvPr/>
+      </p:nvGrpSpPr>
+      <p:grpSpPr>
+        <a:xfrm>
+          <a:off x="0" y="0"/>
+          <a:ext cx="0" cy="0"/>
+          <a:chOff x="0" y="0"/>
+          <a:chExt cx="0" cy="0"/>
+        </a:xfrm>
+      </p:grpSpPr>
+      <p:sp>
+        <p:nvSpPr>
+          <p:cNvPr id="2" name="Title 1">
+            <a:extLst>
+              <a:ext uri="{FF2B5EF4-FFF2-40B4-BE49-F238E27FC236}">
+                <a16:creationId xmlns:a16="http://schemas.microsoft.com/office/drawing/2014/main" id="{E1300350-F572-5F47-ABDE-1045342454A9}"/>
+              </a:ext>
+            </a:extLst>
+          </p:cNvPr>
+          <p:cNvSpPr>
+            <a:spLocks noGrp="1"/>
+          </p:cNvSpPr>
+          <p:nvPr>
+            <p:ph type="title"/>
+          </p:nvPr>
+        </p:nvSpPr>
+        <p:spPr>
+          <a:xfrm>
             <a:off x="628650" y="273847"/>
             <a:ext cx="7886700" cy="994172"/>
           </a:xfrm>
@@ -49078,17 +50529,64 @@
           <a:p>
             <a:r>
               <a:rPr lang="en-US" dirty="0"/>
-              <a:t>Unsafe Unlink Result</a:t>
+              <a:t>Why Is This Useful?</a:t>
             </a:r>
           </a:p>
         </p:txBody>
       </p:sp>
+      <p:pic>
+        <p:nvPicPr>
+          <p:cNvPr id="4100" name="Picture 4" descr="George Foreman GR0040B 2-Serving Classic Plate Grill, Black">
+            <a:extLst>
+              <a:ext uri="{FF2B5EF4-FFF2-40B4-BE49-F238E27FC236}">
+                <a16:creationId xmlns:a16="http://schemas.microsoft.com/office/drawing/2014/main" id="{55E5A608-4E64-304A-BD71-E1ED69859EE4}"/>
+              </a:ext>
+            </a:extLst>
+          </p:cNvPr>
+          <p:cNvPicPr>
+            <a:picLocks noChangeAspect="1" noChangeArrowheads="1"/>
+          </p:cNvPicPr>
+          <p:nvPr/>
+        </p:nvPicPr>
+        <p:blipFill rotWithShape="1">
+          <a:blip r:embed="rId2">
+            <a:extLst>
+              <a:ext uri="{28A0092B-C50C-407E-A947-70E740481C1C}">
+                <a14:useLocalDpi xmlns:a14="http://schemas.microsoft.com/office/drawing/2010/main" val="0"/>
+              </a:ext>
+            </a:extLst>
+          </a:blip>
+          <a:srcRect t="14715" r="5" b="1313"/>
+          <a:stretch/>
+        </p:blipFill>
+        <p:spPr bwMode="auto">
+          <a:xfrm>
+            <a:off x="628650" y="1369219"/>
+            <a:ext cx="3886200" cy="3263504"/>
+          </a:xfrm>
+          <a:prstGeom prst="rect">
+            <a:avLst/>
+          </a:prstGeom>
+          <a:solidFill>
+            <a:srgbClr val="FFFFFF"/>
+          </a:solidFill>
+          <a:extLst>
+            <a:ext uri="{909E8E84-426E-40DD-AFC4-6F175D3DCCD1}">
+              <a14:hiddenFill xmlns:a14="http://schemas.microsoft.com/office/drawing/2010/main">
+                <a:solidFill>
+                  <a:srgbClr val="FFFFFF"/>
+                </a:solidFill>
+              </a14:hiddenFill>
+            </a:ext>
+          </a:extLst>
+        </p:spPr>
+      </p:pic>
       <p:sp>
         <p:nvSpPr>
-          <p:cNvPr id="10" name="Content Placeholder 3">
+          <p:cNvPr id="3" name="Content Placeholder 2">
             <a:extLst>
               <a:ext uri="{FF2B5EF4-FFF2-40B4-BE49-F238E27FC236}">
-                <a16:creationId xmlns:a16="http://schemas.microsoft.com/office/drawing/2014/main" id="{2261C260-EABE-400C-BFDD-E06E1533800F}"/>
+                <a16:creationId xmlns:a16="http://schemas.microsoft.com/office/drawing/2014/main" id="{FEBBC3D6-B462-6043-984B-5C52127AF17B}"/>
               </a:ext>
             </a:extLst>
           </p:cNvPr>
@@ -49102,7 +50600,120 @@
         <p:spPr>
           <a:xfrm>
             <a:off x="4629150" y="1369219"/>
-            <a:ext cx="4137778" cy="3263504"/>
+            <a:ext cx="3886200" cy="3263504"/>
+          </a:xfrm>
+        </p:spPr>
+        <p:txBody>
+          <a:bodyPr>
+            <a:normAutofit/>
+          </a:bodyPr>
+          <a:lstStyle/>
+          <a:p>
+            <a:r>
+              <a:rPr lang="en-US" dirty="0"/>
+              <a:t>Corrupt our original pointer with an additional write!</a:t>
+            </a:r>
+          </a:p>
+          <a:p>
+            <a:r>
+              <a:rPr lang="en-US" dirty="0"/>
+              <a:t>Pointers are commonly stored NEXT to each other. </a:t>
+            </a:r>
+          </a:p>
+          <a:p>
+            <a:pPr lvl="1"/>
+            <a:r>
+              <a:rPr lang="en-US" dirty="0"/>
+              <a:t>Corrupt nearby pointers as well!</a:t>
+            </a:r>
+          </a:p>
+        </p:txBody>
+      </p:sp>
+    </p:spTree>
+    <p:extLst>
+      <p:ext uri="{BB962C8B-B14F-4D97-AF65-F5344CB8AC3E}">
+        <p14:creationId xmlns:p14="http://schemas.microsoft.com/office/powerpoint/2010/main" val="1017505069"/>
+      </p:ext>
+    </p:extLst>
+  </p:cSld>
+  <p:clrMapOvr>
+    <a:masterClrMapping/>
+  </p:clrMapOvr>
+</p:sld>
+</file>
+
+<file path=ppt/slides/slide95.xml><?xml version="1.0" encoding="utf-8"?>
+<p:sld xmlns:a="http://schemas.openxmlformats.org/drawingml/2006/main" xmlns:r="http://schemas.openxmlformats.org/officeDocument/2006/relationships" xmlns:p="http://schemas.openxmlformats.org/presentationml/2006/main">
+  <p:cSld>
+    <p:spTree>
+      <p:nvGrpSpPr>
+        <p:cNvPr id="1" name=""/>
+        <p:cNvGrpSpPr/>
+        <p:nvPr/>
+      </p:nvGrpSpPr>
+      <p:grpSpPr>
+        <a:xfrm>
+          <a:off x="0" y="0"/>
+          <a:ext cx="0" cy="0"/>
+          <a:chOff x="0" y="0"/>
+          <a:chExt cx="0" cy="0"/>
+        </a:xfrm>
+      </p:grpSpPr>
+      <p:sp>
+        <p:nvSpPr>
+          <p:cNvPr id="2" name="Title 1">
+            <a:extLst>
+              <a:ext uri="{FF2B5EF4-FFF2-40B4-BE49-F238E27FC236}">
+                <a16:creationId xmlns:a16="http://schemas.microsoft.com/office/drawing/2014/main" id="{E9E670F8-AACA-D046-8E4F-17454C7527D7}"/>
+              </a:ext>
+            </a:extLst>
+          </p:cNvPr>
+          <p:cNvSpPr>
+            <a:spLocks noGrp="1"/>
+          </p:cNvSpPr>
+          <p:nvPr>
+            <p:ph type="title"/>
+          </p:nvPr>
+        </p:nvSpPr>
+        <p:spPr>
+          <a:xfrm>
+            <a:off x="592585" y="0"/>
+            <a:ext cx="8418249" cy="994172"/>
+          </a:xfrm>
+        </p:spPr>
+        <p:txBody>
+          <a:bodyPr anchor="ctr">
+            <a:normAutofit/>
+          </a:bodyPr>
+          <a:lstStyle/>
+          <a:p>
+            <a:r>
+              <a:rPr lang="en-US" dirty="0"/>
+              <a:t>Unsafe Unlink – Aftermath</a:t>
+            </a:r>
+          </a:p>
+        </p:txBody>
+      </p:sp>
+      <p:sp>
+        <p:nvSpPr>
+          <p:cNvPr id="8" name="Content Placeholder 7">
+            <a:extLst>
+              <a:ext uri="{FF2B5EF4-FFF2-40B4-BE49-F238E27FC236}">
+                <a16:creationId xmlns:a16="http://schemas.microsoft.com/office/drawing/2014/main" id="{3D35A732-1F45-D147-B0BB-44CB04EA56CF}"/>
+              </a:ext>
+            </a:extLst>
+          </p:cNvPr>
+          <p:cNvSpPr>
+            <a:spLocks noGrp="1"/>
+          </p:cNvSpPr>
+          <p:nvPr>
+            <p:ph sz="half" idx="2"/>
+          </p:nvPr>
+        </p:nvSpPr>
+        <p:spPr>
+          <a:xfrm>
+            <a:off x="5395501" y="809926"/>
+            <a:ext cx="3615334" cy="3263504"/>
           </a:xfrm>
         </p:spPr>
         <p:txBody>
@@ -49111,32 +50722,174 @@
           <a:p>
             <a:r>
               <a:rPr lang="en-US" dirty="0"/>
-              <a:t>Use our pointer to overwrite itself </a:t>
-            </a:r>
-            <a:r>
-              <a:rPr lang="en-US" dirty="0">
-                <a:sym typeface="Wingdings" pitchFamily="2" charset="2"/>
-              </a:rPr>
-              <a:t> </a:t>
-            </a:r>
-          </a:p>
-          <a:p>
-            <a:r>
-              <a:rPr lang="en-US" dirty="0">
-                <a:sym typeface="Wingdings" pitchFamily="2" charset="2"/>
-              </a:rPr>
-              <a:t>Overwrite the pointer used to bypass the unlink check</a:t>
-            </a:r>
-            <a:endParaRPr lang="en-US" dirty="0"/>
+              <a:t>Overwrite data right before the pointer itself.</a:t>
+            </a:r>
+          </a:p>
+          <a:p>
+            <a:r>
+              <a:rPr lang="en-US" dirty="0"/>
+              <a:t>Can corrupt the pointer itself, if we want!</a:t>
+            </a:r>
           </a:p>
         </p:txBody>
       </p:sp>
       <p:pic>
         <p:nvPicPr>
-          <p:cNvPr id="6" name="Content Placeholder 5" descr="Overwrite the pointer itself">
+          <p:cNvPr id="11" name="Content Placeholder 10" descr="Unsafe unlink overwrite the pointer to itself. BK-&gt;fd">
             <a:extLst>
               <a:ext uri="{FF2B5EF4-FFF2-40B4-BE49-F238E27FC236}">
-                <a16:creationId xmlns:a16="http://schemas.microsoft.com/office/drawing/2014/main" id="{2A9CC603-4B44-F840-BB5F-05CEEE18B5F7}"/>
+                <a16:creationId xmlns:a16="http://schemas.microsoft.com/office/drawing/2014/main" id="{C4BD03F8-2BB5-3842-B3B3-02F7688DEA5D}"/>
+              </a:ext>
+            </a:extLst>
+          </p:cNvPr>
+          <p:cNvPicPr>
+            <a:picLocks noChangeAspect="1"/>
+          </p:cNvPicPr>
+          <p:nvPr/>
+        </p:nvPicPr>
+        <p:blipFill>
+          <a:blip r:embed="rId2"/>
+          <a:stretch>
+            <a:fillRect/>
+          </a:stretch>
+        </p:blipFill>
+        <p:spPr>
+          <a:xfrm>
+            <a:off x="133165" y="712272"/>
+            <a:ext cx="5395206" cy="2900940"/>
+          </a:xfrm>
+          <a:prstGeom prst="rect">
+            <a:avLst/>
+          </a:prstGeom>
+        </p:spPr>
+      </p:pic>
+    </p:spTree>
+    <p:extLst>
+      <p:ext uri="{BB962C8B-B14F-4D97-AF65-F5344CB8AC3E}">
+        <p14:creationId xmlns:p14="http://schemas.microsoft.com/office/powerpoint/2010/main" val="1713783111"/>
+      </p:ext>
+    </p:extLst>
+  </p:cSld>
+  <p:clrMapOvr>
+    <a:masterClrMapping/>
+  </p:clrMapOvr>
+</p:sld>
+</file>
+
+<file path=ppt/slides/slide96.xml><?xml version="1.0" encoding="utf-8"?>
+<p:sld xmlns:a="http://schemas.openxmlformats.org/drawingml/2006/main" xmlns:r="http://schemas.openxmlformats.org/officeDocument/2006/relationships" xmlns:p="http://schemas.openxmlformats.org/presentationml/2006/main">
+  <p:cSld>
+    <p:spTree>
+      <p:nvGrpSpPr>
+        <p:cNvPr id="1" name=""/>
+        <p:cNvGrpSpPr/>
+        <p:nvPr/>
+      </p:nvGrpSpPr>
+      <p:grpSpPr>
+        <a:xfrm>
+          <a:off x="0" y="0"/>
+          <a:ext cx="0" cy="0"/>
+          <a:chOff x="0" y="0"/>
+          <a:chExt cx="0" cy="0"/>
+        </a:xfrm>
+      </p:grpSpPr>
+      <p:sp>
+        <p:nvSpPr>
+          <p:cNvPr id="2" name="Title 1">
+            <a:extLst>
+              <a:ext uri="{FF2B5EF4-FFF2-40B4-BE49-F238E27FC236}">
+                <a16:creationId xmlns:a16="http://schemas.microsoft.com/office/drawing/2014/main" id="{E9E670F8-AACA-D046-8E4F-17454C7527D7}"/>
+              </a:ext>
+            </a:extLst>
+          </p:cNvPr>
+          <p:cNvSpPr>
+            <a:spLocks noGrp="1"/>
+          </p:cNvSpPr>
+          <p:nvPr>
+            <p:ph type="title"/>
+          </p:nvPr>
+        </p:nvSpPr>
+        <p:spPr>
+          <a:xfrm>
+            <a:off x="592585" y="0"/>
+            <a:ext cx="8418249" cy="994172"/>
+          </a:xfrm>
+        </p:spPr>
+        <p:txBody>
+          <a:bodyPr anchor="ctr">
+            <a:normAutofit/>
+          </a:bodyPr>
+          <a:lstStyle/>
+          <a:p>
+            <a:r>
+              <a:rPr lang="en-US" dirty="0"/>
+              <a:t>Unsafe Unlink – Aftermath</a:t>
+            </a:r>
+          </a:p>
+        </p:txBody>
+      </p:sp>
+      <p:sp>
+        <p:nvSpPr>
+          <p:cNvPr id="8" name="Content Placeholder 7">
+            <a:extLst>
+              <a:ext uri="{FF2B5EF4-FFF2-40B4-BE49-F238E27FC236}">
+                <a16:creationId xmlns:a16="http://schemas.microsoft.com/office/drawing/2014/main" id="{3D35A732-1F45-D147-B0BB-44CB04EA56CF}"/>
+              </a:ext>
+            </a:extLst>
+          </p:cNvPr>
+          <p:cNvSpPr>
+            <a:spLocks noGrp="1"/>
+          </p:cNvSpPr>
+          <p:nvPr>
+            <p:ph sz="half" idx="2"/>
+          </p:nvPr>
+        </p:nvSpPr>
+        <p:spPr>
+          <a:xfrm>
+            <a:off x="5395501" y="809926"/>
+            <a:ext cx="3615334" cy="3263504"/>
+          </a:xfrm>
+        </p:spPr>
+        <p:txBody>
+          <a:bodyPr/>
+          <a:lstStyle/>
+          <a:p>
+            <a:r>
+              <a:rPr lang="en-US" dirty="0"/>
+              <a:t>Corrupt the 3 previous values to our pointer.</a:t>
+            </a:r>
+          </a:p>
+          <a:p>
+            <a:r>
+              <a:rPr lang="en-US" dirty="0"/>
+              <a:t>If list of pointers, this could be VERY useful!</a:t>
+            </a:r>
+          </a:p>
+          <a:p>
+            <a:r>
+              <a:rPr lang="en-US" dirty="0"/>
+              <a:t>If control </a:t>
+            </a:r>
+            <a:r>
+              <a:rPr lang="en-US" i="1" dirty="0"/>
+              <a:t>pointer to chunk,</a:t>
+            </a:r>
+            <a:r>
+              <a:rPr lang="en-US" dirty="0"/>
+              <a:t> we can edit this forever with our own values. </a:t>
+            </a:r>
+          </a:p>
+          <a:p>
+            <a:endParaRPr lang="en-US" dirty="0"/>
+          </a:p>
+        </p:txBody>
+      </p:sp>
+      <p:pic>
+        <p:nvPicPr>
+          <p:cNvPr id="12" name="Content Placeholder 11" descr="Overwriting the data around the pointers">
+            <a:extLst>
+              <a:ext uri="{FF2B5EF4-FFF2-40B4-BE49-F238E27FC236}">
+                <a16:creationId xmlns:a16="http://schemas.microsoft.com/office/drawing/2014/main" id="{E1519185-0BB1-D04B-8DC0-36FD123B0481}"/>
               </a:ext>
             </a:extLst>
           </p:cNvPr>
@@ -49155,45 +50908,15 @@
         </p:blipFill>
         <p:spPr>
           <a:xfrm>
-            <a:off x="335830" y="1091374"/>
-            <a:ext cx="3972220" cy="3182422"/>
+            <a:off x="210843" y="994172"/>
+            <a:ext cx="4777767" cy="2725572"/>
           </a:xfrm>
-        </p:spPr>
-      </p:pic>
-      <p:pic>
-        <p:nvPicPr>
-          <p:cNvPr id="7" name="Picture 6" descr="Unsafe unlink writing over the top of itself.">
-            <a:extLst>
-              <a:ext uri="{FF2B5EF4-FFF2-40B4-BE49-F238E27FC236}">
-                <a16:creationId xmlns:a16="http://schemas.microsoft.com/office/drawing/2014/main" id="{07AB6A48-DA8A-EE45-90EF-9802668B6D3F}"/>
-              </a:ext>
-            </a:extLst>
-          </p:cNvPr>
-          <p:cNvPicPr>
-            <a:picLocks noChangeAspect="1"/>
-          </p:cNvPicPr>
-          <p:nvPr/>
-        </p:nvPicPr>
-        <p:blipFill>
-          <a:blip r:embed="rId3"/>
-          <a:stretch>
-            <a:fillRect/>
-          </a:stretch>
-        </p:blipFill>
-        <p:spPr>
-          <a:xfrm>
-            <a:off x="2525587" y="3702027"/>
-            <a:ext cx="3223279" cy="1233601"/>
-          </a:xfrm>
-          <a:prstGeom prst="rect">
-            <a:avLst/>
-          </a:prstGeom>
         </p:spPr>
       </p:pic>
     </p:spTree>
     <p:extLst>
       <p:ext uri="{BB962C8B-B14F-4D97-AF65-F5344CB8AC3E}">
-        <p14:creationId xmlns:p14="http://schemas.microsoft.com/office/powerpoint/2010/main" val="2393535310"/>
+        <p14:creationId xmlns:p14="http://schemas.microsoft.com/office/powerpoint/2010/main" val="953586807"/>
       </p:ext>
     </p:extLst>
   </p:cSld>
@@ -49203,7 +50926,157 @@
 </p:sld>
 </file>
 
-<file path=ppt/slides/slide93.xml><?xml version="1.0" encoding="utf-8"?>
+<file path=ppt/slides/slide97.xml><?xml version="1.0" encoding="utf-8"?>
+<p:sld xmlns:a="http://schemas.openxmlformats.org/drawingml/2006/main" xmlns:r="http://schemas.openxmlformats.org/officeDocument/2006/relationships" xmlns:p="http://schemas.openxmlformats.org/presentationml/2006/main">
+  <p:cSld>
+    <p:spTree>
+      <p:nvGrpSpPr>
+        <p:cNvPr id="1" name=""/>
+        <p:cNvGrpSpPr/>
+        <p:nvPr/>
+      </p:nvGrpSpPr>
+      <p:grpSpPr>
+        <a:xfrm>
+          <a:off x="0" y="0"/>
+          <a:ext cx="0" cy="0"/>
+          <a:chOff x="0" y="0"/>
+          <a:chExt cx="0" cy="0"/>
+        </a:xfrm>
+      </p:grpSpPr>
+      <p:sp>
+        <p:nvSpPr>
+          <p:cNvPr id="2" name="Title 1">
+            <a:extLst>
+              <a:ext uri="{FF2B5EF4-FFF2-40B4-BE49-F238E27FC236}">
+                <a16:creationId xmlns:a16="http://schemas.microsoft.com/office/drawing/2014/main" id="{E9E670F8-AACA-D046-8E4F-17454C7527D7}"/>
+              </a:ext>
+            </a:extLst>
+          </p:cNvPr>
+          <p:cNvSpPr>
+            <a:spLocks noGrp="1"/>
+          </p:cNvSpPr>
+          <p:nvPr>
+            <p:ph type="title"/>
+          </p:nvPr>
+        </p:nvSpPr>
+        <p:spPr>
+          <a:xfrm>
+            <a:off x="592585" y="0"/>
+            <a:ext cx="8418249" cy="994172"/>
+          </a:xfrm>
+        </p:spPr>
+        <p:txBody>
+          <a:bodyPr anchor="ctr">
+            <a:normAutofit/>
+          </a:bodyPr>
+          <a:lstStyle/>
+          <a:p>
+            <a:r>
+              <a:rPr lang="en-US" dirty="0"/>
+              <a:t>Unsafe Unlink – Aftermath</a:t>
+            </a:r>
+          </a:p>
+        </p:txBody>
+      </p:sp>
+      <p:sp>
+        <p:nvSpPr>
+          <p:cNvPr id="8" name="Content Placeholder 7">
+            <a:extLst>
+              <a:ext uri="{FF2B5EF4-FFF2-40B4-BE49-F238E27FC236}">
+                <a16:creationId xmlns:a16="http://schemas.microsoft.com/office/drawing/2014/main" id="{3D35A732-1F45-D147-B0BB-44CB04EA56CF}"/>
+              </a:ext>
+            </a:extLst>
+          </p:cNvPr>
+          <p:cNvSpPr>
+            <a:spLocks noGrp="1"/>
+          </p:cNvSpPr>
+          <p:nvPr>
+            <p:ph sz="half" idx="2"/>
+          </p:nvPr>
+        </p:nvSpPr>
+        <p:spPr>
+          <a:xfrm>
+            <a:off x="5395501" y="809926"/>
+            <a:ext cx="3615334" cy="3263504"/>
+          </a:xfrm>
+        </p:spPr>
+        <p:txBody>
+          <a:bodyPr/>
+          <a:lstStyle/>
+          <a:p>
+            <a:r>
+              <a:rPr lang="en-US" dirty="0"/>
+              <a:t>Corrupt the 3 previous values to our pointer.</a:t>
+            </a:r>
+          </a:p>
+          <a:p>
+            <a:r>
+              <a:rPr lang="en-US" dirty="0"/>
+              <a:t>If list of pointers, this could be VERY useful!</a:t>
+            </a:r>
+          </a:p>
+          <a:p>
+            <a:r>
+              <a:rPr lang="en-US" dirty="0"/>
+              <a:t>If control </a:t>
+            </a:r>
+            <a:r>
+              <a:rPr lang="en-US" i="1" dirty="0"/>
+              <a:t>pointer to chunk,</a:t>
+            </a:r>
+            <a:r>
+              <a:rPr lang="en-US" dirty="0"/>
+              <a:t> we can edit this forever with our own values. </a:t>
+            </a:r>
+          </a:p>
+          <a:p>
+            <a:endParaRPr lang="en-US" dirty="0"/>
+          </a:p>
+        </p:txBody>
+      </p:sp>
+      <p:pic>
+        <p:nvPicPr>
+          <p:cNvPr id="6" name="Content Placeholder 5" descr="Overwriting a pointer to the chunk itself!">
+            <a:extLst>
+              <a:ext uri="{FF2B5EF4-FFF2-40B4-BE49-F238E27FC236}">
+                <a16:creationId xmlns:a16="http://schemas.microsoft.com/office/drawing/2014/main" id="{D5280E64-2B2D-394D-A643-8259B15F7925}"/>
+              </a:ext>
+            </a:extLst>
+          </p:cNvPr>
+          <p:cNvPicPr>
+            <a:picLocks noGrp="1" noChangeAspect="1"/>
+          </p:cNvPicPr>
+          <p:nvPr>
+            <p:ph sz="half" idx="1"/>
+          </p:nvPr>
+        </p:nvPicPr>
+        <p:blipFill>
+          <a:blip r:embed="rId2"/>
+          <a:stretch>
+            <a:fillRect/>
+          </a:stretch>
+        </p:blipFill>
+        <p:spPr>
+          <a:xfrm>
+            <a:off x="0" y="809926"/>
+            <a:ext cx="5143570" cy="3122882"/>
+          </a:xfrm>
+        </p:spPr>
+      </p:pic>
+    </p:spTree>
+    <p:extLst>
+      <p:ext uri="{BB962C8B-B14F-4D97-AF65-F5344CB8AC3E}">
+        <p14:creationId xmlns:p14="http://schemas.microsoft.com/office/powerpoint/2010/main" val="601024480"/>
+      </p:ext>
+    </p:extLst>
+  </p:cSld>
+  <p:clrMapOvr>
+    <a:masterClrMapping/>
+  </p:clrMapOvr>
+</p:sld>
+</file>
+
+<file path=ppt/slides/slide98.xml><?xml version="1.0" encoding="utf-8"?>
 <p:sld xmlns:a="http://schemas.openxmlformats.org/drawingml/2006/main" xmlns:r="http://schemas.openxmlformats.org/officeDocument/2006/relationships" xmlns:p="http://schemas.openxmlformats.org/presentationml/2006/main">
   <p:cSld>
     <p:spTree>
@@ -49299,7 +51172,7 @@
 </p:sld>
 </file>
 
-<file path=ppt/slides/slide94.xml><?xml version="1.0" encoding="utf-8"?>
+<file path=ppt/slides/slide99.xml><?xml version="1.0" encoding="utf-8"?>
 <p:sld xmlns:a="http://schemas.openxmlformats.org/drawingml/2006/main" xmlns:r="http://schemas.openxmlformats.org/officeDocument/2006/relationships" xmlns:p="http://schemas.openxmlformats.org/presentationml/2006/main">
   <p:cSld>
     <p:spTree>
@@ -49396,257 +51269,6 @@
     <p:extLst>
       <p:ext uri="{BB962C8B-B14F-4D97-AF65-F5344CB8AC3E}">
         <p14:creationId xmlns:p14="http://schemas.microsoft.com/office/powerpoint/2010/main" val="2337429973"/>
-      </p:ext>
-    </p:extLst>
-  </p:cSld>
-  <p:clrMapOvr>
-    <a:masterClrMapping/>
-  </p:clrMapOvr>
-</p:sld>
-</file>
-
-<file path=ppt/slides/slide95.xml><?xml version="1.0" encoding="utf-8"?>
-<p:sld xmlns:a="http://schemas.openxmlformats.org/drawingml/2006/main" xmlns:r="http://schemas.openxmlformats.org/officeDocument/2006/relationships" xmlns:p="http://schemas.openxmlformats.org/presentationml/2006/main">
-  <p:cSld>
-    <p:spTree>
-      <p:nvGrpSpPr>
-        <p:cNvPr id="1" name=""/>
-        <p:cNvGrpSpPr/>
-        <p:nvPr/>
-      </p:nvGrpSpPr>
-      <p:grpSpPr>
-        <a:xfrm>
-          <a:off x="0" y="0"/>
-          <a:ext cx="0" cy="0"/>
-          <a:chOff x="0" y="0"/>
-          <a:chExt cx="0" cy="0"/>
-        </a:xfrm>
-      </p:grpSpPr>
-      <p:sp>
-        <p:nvSpPr>
-          <p:cNvPr id="2" name="Title 1">
-            <a:extLst>
-              <a:ext uri="{FF2B5EF4-FFF2-40B4-BE49-F238E27FC236}">
-                <a16:creationId xmlns:a16="http://schemas.microsoft.com/office/drawing/2014/main" id="{C96CF04D-2F9B-2D4B-BB6E-1DBC2C66150E}"/>
-              </a:ext>
-            </a:extLst>
-          </p:cNvPr>
-          <p:cNvSpPr>
-            <a:spLocks noGrp="1"/>
-          </p:cNvSpPr>
-          <p:nvPr>
-            <p:ph type="title"/>
-          </p:nvPr>
-        </p:nvSpPr>
-        <p:spPr/>
-        <p:txBody>
-          <a:bodyPr/>
-          <a:lstStyle/>
-          <a:p>
-            <a:r>
-              <a:rPr lang="en-US" dirty="0"/>
-              <a:t>Similar Techniques</a:t>
-            </a:r>
-          </a:p>
-        </p:txBody>
-      </p:sp>
-      <p:sp>
-        <p:nvSpPr>
-          <p:cNvPr id="3" name="Content Placeholder 2">
-            <a:extLst>
-              <a:ext uri="{FF2B5EF4-FFF2-40B4-BE49-F238E27FC236}">
-                <a16:creationId xmlns:a16="http://schemas.microsoft.com/office/drawing/2014/main" id="{DB0B48B3-4287-5643-8B39-63515724D843}"/>
-              </a:ext>
-            </a:extLst>
-          </p:cNvPr>
-          <p:cNvSpPr>
-            <a:spLocks noGrp="1"/>
-          </p:cNvSpPr>
-          <p:nvPr>
-            <p:ph idx="1"/>
-          </p:nvPr>
-        </p:nvSpPr>
-        <p:spPr/>
-        <p:txBody>
-          <a:bodyPr/>
-          <a:lstStyle/>
-          <a:p>
-            <a:r>
-              <a:rPr lang="en-US" dirty="0"/>
-              <a:t>House of Einherjar: </a:t>
-            </a:r>
-          </a:p>
-          <a:p>
-            <a:pPr lvl="1"/>
-            <a:r>
-              <a:rPr lang="en-US" dirty="0"/>
-              <a:t>Unlink a fake chunk to overlap a large chunk of data</a:t>
-            </a:r>
-          </a:p>
-          <a:p>
-            <a:r>
-              <a:rPr lang="en-US" dirty="0"/>
-              <a:t>House of Storm: 	</a:t>
-            </a:r>
-          </a:p>
-          <a:p>
-            <a:pPr lvl="1"/>
-            <a:r>
-              <a:rPr lang="en-US" dirty="0"/>
-              <a:t>Add in a chunk by corrupting free list pointers</a:t>
-            </a:r>
-          </a:p>
-        </p:txBody>
-      </p:sp>
-    </p:spTree>
-    <p:extLst>
-      <p:ext uri="{BB962C8B-B14F-4D97-AF65-F5344CB8AC3E}">
-        <p14:creationId xmlns:p14="http://schemas.microsoft.com/office/powerpoint/2010/main" val="3545615887"/>
-      </p:ext>
-    </p:extLst>
-  </p:cSld>
-  <p:clrMapOvr>
-    <a:masterClrMapping/>
-  </p:clrMapOvr>
-</p:sld>
-</file>
-
-<file path=ppt/slides/slide96.xml><?xml version="1.0" encoding="utf-8"?>
-<p:sld xmlns:a="http://schemas.openxmlformats.org/drawingml/2006/main" xmlns:r="http://schemas.openxmlformats.org/officeDocument/2006/relationships" xmlns:p="http://schemas.openxmlformats.org/presentationml/2006/main">
-  <p:cSld>
-    <p:spTree>
-      <p:nvGrpSpPr>
-        <p:cNvPr id="1" name=""/>
-        <p:cNvGrpSpPr/>
-        <p:nvPr/>
-      </p:nvGrpSpPr>
-      <p:grpSpPr>
-        <a:xfrm>
-          <a:off x="0" y="0"/>
-          <a:ext cx="0" cy="0"/>
-          <a:chOff x="0" y="0"/>
-          <a:chExt cx="0" cy="0"/>
-        </a:xfrm>
-      </p:grpSpPr>
-      <p:sp>
-        <p:nvSpPr>
-          <p:cNvPr id="2" name="Title 1">
-            <a:extLst>
-              <a:ext uri="{FF2B5EF4-FFF2-40B4-BE49-F238E27FC236}">
-                <a16:creationId xmlns:a16="http://schemas.microsoft.com/office/drawing/2014/main" id="{B4A67C53-5C79-0548-A92E-EC918DEE6260}"/>
-              </a:ext>
-            </a:extLst>
-          </p:cNvPr>
-          <p:cNvSpPr>
-            <a:spLocks noGrp="1"/>
-          </p:cNvSpPr>
-          <p:nvPr>
-            <p:ph type="title"/>
-          </p:nvPr>
-        </p:nvSpPr>
-        <p:spPr/>
-        <p:txBody>
-          <a:bodyPr/>
-          <a:lstStyle/>
-          <a:p>
-            <a:r>
-              <a:rPr lang="en-US" dirty="0"/>
-              <a:t>Resources</a:t>
-            </a:r>
-          </a:p>
-        </p:txBody>
-      </p:sp>
-      <p:sp>
-        <p:nvSpPr>
-          <p:cNvPr id="3" name="Content Placeholder 2">
-            <a:extLst>
-              <a:ext uri="{FF2B5EF4-FFF2-40B4-BE49-F238E27FC236}">
-                <a16:creationId xmlns:a16="http://schemas.microsoft.com/office/drawing/2014/main" id="{31ED45E3-BAAF-194E-B4F4-BBE1A78FE0F0}"/>
-              </a:ext>
-            </a:extLst>
-          </p:cNvPr>
-          <p:cNvSpPr>
-            <a:spLocks noGrp="1"/>
-          </p:cNvSpPr>
-          <p:nvPr>
-            <p:ph idx="1"/>
-          </p:nvPr>
-        </p:nvSpPr>
-        <p:spPr/>
-        <p:txBody>
-          <a:bodyPr/>
-          <a:lstStyle/>
-          <a:p>
-            <a:r>
-              <a:rPr lang="en-US" dirty="0" err="1"/>
-              <a:t>LiveOverflow</a:t>
-            </a:r>
-            <a:r>
-              <a:rPr lang="en-US" dirty="0"/>
-              <a:t>: </a:t>
-            </a:r>
-            <a:r>
-              <a:rPr lang="en-US" dirty="0">
-                <a:hlinkClick r:id="rId2"/>
-              </a:rPr>
-              <a:t>https://www.youtube.com/watch?v=gL45bjQvZSU</a:t>
-            </a:r>
-            <a:endParaRPr lang="en-US" dirty="0"/>
-          </a:p>
-          <a:p>
-            <a:r>
-              <a:rPr lang="en-US" dirty="0"/>
-              <a:t>Once Upon a Free: </a:t>
-            </a:r>
-            <a:r>
-              <a:rPr lang="en-US" dirty="0">
-                <a:hlinkClick r:id="rId3"/>
-              </a:rPr>
-              <a:t>http://phrack.org/issues/57/9.html</a:t>
-            </a:r>
-            <a:endParaRPr lang="en-US" dirty="0"/>
-          </a:p>
-          <a:p>
-            <a:r>
-              <a:rPr lang="en-US" dirty="0"/>
-              <a:t>Unsafe Unlink: </a:t>
-            </a:r>
-          </a:p>
-          <a:p>
-            <a:pPr lvl="1"/>
-            <a:r>
-              <a:rPr lang="en-US" dirty="0">
-                <a:hlinkClick r:id="rId4"/>
-              </a:rPr>
-              <a:t>https://heap-exploitation.dhavalkapil.com/attacks/unlink_exploit.html</a:t>
-            </a:r>
-            <a:endParaRPr lang="en-US" dirty="0"/>
-          </a:p>
-          <a:p>
-            <a:pPr lvl="1"/>
-            <a:r>
-              <a:rPr lang="en-US" dirty="0">
-                <a:hlinkClick r:id="rId5"/>
-              </a:rPr>
-              <a:t>https://dangokyo.me/2018/01/01/heap-exploitation-unsafe-unlink-fastbin-corruption/</a:t>
-            </a:r>
-            <a:endParaRPr lang="en-US" dirty="0"/>
-          </a:p>
-          <a:p>
-            <a:pPr marL="457200" lvl="1" indent="0">
-              <a:buNone/>
-            </a:pPr>
-            <a:endParaRPr lang="en-US" dirty="0"/>
-          </a:p>
-          <a:p>
-            <a:endParaRPr lang="en-US" dirty="0"/>
-          </a:p>
-        </p:txBody>
-      </p:sp>
-    </p:spTree>
-    <p:extLst>
-      <p:ext uri="{BB962C8B-B14F-4D97-AF65-F5344CB8AC3E}">
-        <p14:creationId xmlns:p14="http://schemas.microsoft.com/office/powerpoint/2010/main" val="726634461"/>
       </p:ext>
     </p:extLst>
   </p:cSld>

</xml_diff>

<commit_message>
Slide changes for 'unlink' and final section of HTTP Server
</commit_message>
<xml_diff>
--- a/modules/unlink/Unlink.pptx
+++ b/modules/unlink/Unlink.pptx
@@ -5,7 +5,7 @@
     <p:sldMasterId id="2147483660" r:id="rId1"/>
   </p:sldMasterIdLst>
   <p:notesMasterIdLst>
-    <p:notesMasterId r:id="rId103"/>
+    <p:notesMasterId r:id="rId104"/>
   </p:notesMasterIdLst>
   <p:sldIdLst>
     <p:sldId id="440" r:id="rId2"/>
@@ -80,35 +80,36 @@
     <p:sldId id="491" r:id="rId71"/>
     <p:sldId id="492" r:id="rId72"/>
     <p:sldId id="451" r:id="rId73"/>
-    <p:sldId id="452" r:id="rId74"/>
+    <p:sldId id="528" r:id="rId74"/>
     <p:sldId id="453" r:id="rId75"/>
     <p:sldId id="454" r:id="rId76"/>
     <p:sldId id="427" r:id="rId77"/>
     <p:sldId id="471" r:id="rId78"/>
     <p:sldId id="428" r:id="rId79"/>
-    <p:sldId id="457" r:id="rId80"/>
-    <p:sldId id="513" r:id="rId81"/>
-    <p:sldId id="459" r:id="rId82"/>
-    <p:sldId id="460" r:id="rId83"/>
-    <p:sldId id="515" r:id="rId84"/>
-    <p:sldId id="461" r:id="rId85"/>
-    <p:sldId id="517" r:id="rId86"/>
-    <p:sldId id="519" r:id="rId87"/>
-    <p:sldId id="518" r:id="rId88"/>
-    <p:sldId id="520" r:id="rId89"/>
-    <p:sldId id="521" r:id="rId90"/>
-    <p:sldId id="467" r:id="rId91"/>
-    <p:sldId id="468" r:id="rId92"/>
-    <p:sldId id="466" r:id="rId93"/>
-    <p:sldId id="522" r:id="rId94"/>
-    <p:sldId id="523" r:id="rId95"/>
-    <p:sldId id="524" r:id="rId96"/>
-    <p:sldId id="525" r:id="rId97"/>
-    <p:sldId id="526" r:id="rId98"/>
-    <p:sldId id="458" r:id="rId99"/>
-    <p:sldId id="470" r:id="rId100"/>
-    <p:sldId id="442" r:id="rId101"/>
-    <p:sldId id="429" r:id="rId102"/>
+    <p:sldId id="527" r:id="rId80"/>
+    <p:sldId id="457" r:id="rId81"/>
+    <p:sldId id="513" r:id="rId82"/>
+    <p:sldId id="459" r:id="rId83"/>
+    <p:sldId id="460" r:id="rId84"/>
+    <p:sldId id="515" r:id="rId85"/>
+    <p:sldId id="461" r:id="rId86"/>
+    <p:sldId id="517" r:id="rId87"/>
+    <p:sldId id="519" r:id="rId88"/>
+    <p:sldId id="518" r:id="rId89"/>
+    <p:sldId id="520" r:id="rId90"/>
+    <p:sldId id="521" r:id="rId91"/>
+    <p:sldId id="467" r:id="rId92"/>
+    <p:sldId id="468" r:id="rId93"/>
+    <p:sldId id="466" r:id="rId94"/>
+    <p:sldId id="522" r:id="rId95"/>
+    <p:sldId id="523" r:id="rId96"/>
+    <p:sldId id="524" r:id="rId97"/>
+    <p:sldId id="525" r:id="rId98"/>
+    <p:sldId id="526" r:id="rId99"/>
+    <p:sldId id="458" r:id="rId100"/>
+    <p:sldId id="470" r:id="rId101"/>
+    <p:sldId id="442" r:id="rId102"/>
+    <p:sldId id="429" r:id="rId103"/>
   </p:sldIdLst>
   <p:sldSz cx="9144000" cy="5143500" type="screen16x9"/>
   <p:notesSz cx="6858000" cy="9144000"/>
@@ -24633,7 +24634,7 @@
           <a:p>
             <a:fld id="{2DA23E8D-1792-1541-9147-970A8DD8A355}" type="datetimeFigureOut">
               <a:rPr lang="en-US" smtClean="0"/>
-              <a:t>12/18/21</a:t>
+              <a:t>4/17/22</a:t>
             </a:fld>
             <a:endParaRPr lang="en-US" dirty="0"/>
           </a:p>
@@ -25052,7 +25053,7 @@
           <a:p>
             <a:fld id="{AC55928C-CD14-454C-B617-1AFCF9A58596}" type="slidenum">
               <a:rPr lang="en-US" smtClean="0"/>
-              <a:t>90</a:t>
+              <a:t>91</a:t>
             </a:fld>
             <a:endParaRPr lang="en-US" dirty="0"/>
           </a:p>
@@ -25139,7 +25140,7 @@
           <a:p>
             <a:fld id="{AC55928C-CD14-454C-B617-1AFCF9A58596}" type="slidenum">
               <a:rPr lang="en-US" smtClean="0"/>
-              <a:t>91</a:t>
+              <a:t>92</a:t>
             </a:fld>
             <a:endParaRPr lang="en-US" dirty="0"/>
           </a:p>
@@ -25313,7 +25314,7 @@
           <a:p>
             <a:fld id="{AC55928C-CD14-454C-B617-1AFCF9A58596}" type="slidenum">
               <a:rPr lang="en-US" smtClean="0"/>
-              <a:t>79</a:t>
+              <a:t>80</a:t>
             </a:fld>
             <a:endParaRPr lang="en-US" dirty="0"/>
           </a:p>
@@ -25400,7 +25401,7 @@
           <a:p>
             <a:fld id="{AC55928C-CD14-454C-B617-1AFCF9A58596}" type="slidenum">
               <a:rPr lang="en-US" smtClean="0"/>
-              <a:t>81</a:t>
+              <a:t>82</a:t>
             </a:fld>
             <a:endParaRPr lang="en-US" dirty="0"/>
           </a:p>
@@ -25484,7 +25485,7 @@
           <a:p>
             <a:fld id="{AC55928C-CD14-454C-B617-1AFCF9A58596}" type="slidenum">
               <a:rPr lang="en-US" smtClean="0"/>
-              <a:t>83</a:t>
+              <a:t>84</a:t>
             </a:fld>
             <a:endParaRPr lang="en-US" dirty="0"/>
           </a:p>
@@ -25571,7 +25572,7 @@
           <a:p>
             <a:fld id="{AC55928C-CD14-454C-B617-1AFCF9A58596}" type="slidenum">
               <a:rPr lang="en-US" smtClean="0"/>
-              <a:t>86</a:t>
+              <a:t>87</a:t>
             </a:fld>
             <a:endParaRPr lang="en-US" dirty="0"/>
           </a:p>
@@ -25658,7 +25659,7 @@
           <a:p>
             <a:fld id="{AC55928C-CD14-454C-B617-1AFCF9A58596}" type="slidenum">
               <a:rPr lang="en-US" smtClean="0"/>
-              <a:t>87</a:t>
+              <a:t>88</a:t>
             </a:fld>
             <a:endParaRPr lang="en-US" dirty="0"/>
           </a:p>
@@ -25745,7 +25746,7 @@
           <a:p>
             <a:fld id="{AC55928C-CD14-454C-B617-1AFCF9A58596}" type="slidenum">
               <a:rPr lang="en-US" smtClean="0"/>
-              <a:t>88</a:t>
+              <a:t>89</a:t>
             </a:fld>
             <a:endParaRPr lang="en-US" dirty="0"/>
           </a:p>
@@ -25832,7 +25833,7 @@
           <a:p>
             <a:fld id="{AC55928C-CD14-454C-B617-1AFCF9A58596}" type="slidenum">
               <a:rPr lang="en-US" smtClean="0"/>
-              <a:t>89</a:t>
+              <a:t>90</a:t>
             </a:fld>
             <a:endParaRPr lang="en-US" dirty="0"/>
           </a:p>
@@ -26054,7 +26055,7 @@
                 <a:latin typeface="Calibri"/>
               </a:rPr>
               <a:pPr/>
-              <a:t>12/18/21</a:t>
+              <a:t>4/17/22</a:t>
             </a:fld>
             <a:endParaRPr lang="en-US" dirty="0">
               <a:solidFill>
@@ -26307,7 +26308,7 @@
                 <a:latin typeface="Calibri"/>
               </a:rPr>
               <a:pPr/>
-              <a:t>12/18/21</a:t>
+              <a:t>4/17/22</a:t>
             </a:fld>
             <a:endParaRPr lang="en-US" dirty="0">
               <a:solidFill>
@@ -26522,7 +26523,7 @@
                 <a:latin typeface="Calibri"/>
               </a:rPr>
               <a:pPr/>
-              <a:t>12/18/21</a:t>
+              <a:t>4/17/22</a:t>
             </a:fld>
             <a:endParaRPr lang="en-US" dirty="0">
               <a:solidFill>
@@ -26920,7 +26921,7 @@
                 <a:latin typeface="Calibri"/>
               </a:rPr>
               <a:pPr/>
-              <a:t>12/18/21</a:t>
+              <a:t>4/17/22</a:t>
             </a:fld>
             <a:endParaRPr lang="en-US" dirty="0">
               <a:solidFill>
@@ -27262,7 +27263,7 @@
                 <a:latin typeface="Calibri"/>
               </a:rPr>
               <a:pPr/>
-              <a:t>12/18/21</a:t>
+              <a:t>4/17/22</a:t>
             </a:fld>
             <a:endParaRPr lang="en-US" dirty="0">
               <a:solidFill>
@@ -27590,7 +27591,7 @@
                 <a:latin typeface="Calibri"/>
               </a:rPr>
               <a:pPr/>
-              <a:t>12/18/21</a:t>
+              <a:t>4/17/22</a:t>
             </a:fld>
             <a:endParaRPr lang="en-US" dirty="0">
               <a:solidFill>
@@ -28079,7 +28080,7 @@
                 <a:latin typeface="Calibri"/>
               </a:rPr>
               <a:pPr/>
-              <a:t>12/18/21</a:t>
+              <a:t>4/17/22</a:t>
             </a:fld>
             <a:endParaRPr lang="en-US" dirty="0">
               <a:solidFill>
@@ -28262,7 +28263,7 @@
                 <a:latin typeface="Calibri"/>
               </a:rPr>
               <a:pPr/>
-              <a:t>12/18/21</a:t>
+              <a:t>4/17/22</a:t>
             </a:fld>
             <a:endParaRPr lang="en-US" dirty="0">
               <a:solidFill>
@@ -28508,7 +28509,7 @@
                 <a:latin typeface="Calibri"/>
               </a:rPr>
               <a:pPr/>
-              <a:t>12/18/21</a:t>
+              <a:t>4/17/22</a:t>
             </a:fld>
             <a:endParaRPr lang="en-US" dirty="0">
               <a:solidFill>
@@ -28850,7 +28851,7 @@
                 <a:latin typeface="Calibri"/>
               </a:rPr>
               <a:pPr/>
-              <a:t>12/18/21</a:t>
+              <a:t>4/17/22</a:t>
             </a:fld>
             <a:endParaRPr lang="en-US" dirty="0">
               <a:solidFill>
@@ -29142,7 +29143,7 @@
                 <a:latin typeface="Calibri"/>
               </a:rPr>
               <a:pPr/>
-              <a:t>12/18/21</a:t>
+              <a:t>4/17/22</a:t>
             </a:fld>
             <a:endParaRPr lang="en-US" dirty="0">
               <a:solidFill>
@@ -29392,7 +29393,7 @@
                 <a:latin typeface="Calibri"/>
               </a:rPr>
               <a:pPr defTabSz="914400"/>
-              <a:t>12/18/21</a:t>
+              <a:t>4/17/22</a:t>
             </a:fld>
             <a:endParaRPr lang="en-US" dirty="0">
               <a:solidFill>
@@ -30045,6 +30046,112 @@
           <p:cNvPr id="2" name="Title 1">
             <a:extLst>
               <a:ext uri="{FF2B5EF4-FFF2-40B4-BE49-F238E27FC236}">
+                <a16:creationId xmlns:a16="http://schemas.microsoft.com/office/drawing/2014/main" id="{A90A02E4-3663-3C40-BA39-AFC8E4C6C9EC}"/>
+              </a:ext>
+            </a:extLst>
+          </p:cNvPr>
+          <p:cNvSpPr>
+            <a:spLocks noGrp="1"/>
+          </p:cNvSpPr>
+          <p:nvPr>
+            <p:ph type="title"/>
+          </p:nvPr>
+        </p:nvSpPr>
+        <p:spPr>
+          <a:xfrm>
+            <a:off x="628650" y="273847"/>
+            <a:ext cx="7886700" cy="994172"/>
+          </a:xfrm>
+        </p:spPr>
+        <p:txBody>
+          <a:bodyPr anchor="ctr">
+            <a:normAutofit/>
+          </a:bodyPr>
+          <a:lstStyle/>
+          <a:p>
+            <a:r>
+              <a:rPr lang="en-US" dirty="0"/>
+              <a:t>Unsafe Unlink DEMO</a:t>
+            </a:r>
+          </a:p>
+        </p:txBody>
+      </p:sp>
+      <p:pic>
+        <p:nvPicPr>
+          <p:cNvPr id="1026" name="Picture 2" descr="Demo - Better support, happy customers - TOPdesk">
+            <a:extLst>
+              <a:ext uri="{FF2B5EF4-FFF2-40B4-BE49-F238E27FC236}">
+                <a16:creationId xmlns:a16="http://schemas.microsoft.com/office/drawing/2014/main" id="{2C8C0D5D-E3BF-EE49-B634-8F339CA9B268}"/>
+              </a:ext>
+            </a:extLst>
+          </p:cNvPr>
+          <p:cNvPicPr>
+            <a:picLocks noGrp="1" noChangeAspect="1" noChangeArrowheads="1"/>
+          </p:cNvPicPr>
+          <p:nvPr>
+            <p:ph idx="1"/>
+          </p:nvPr>
+        </p:nvPicPr>
+        <p:blipFill>
+          <a:blip r:embed="rId2">
+            <a:extLst>
+              <a:ext uri="{28A0092B-C50C-407E-A947-70E740481C1C}">
+                <a14:useLocalDpi xmlns:a14="http://schemas.microsoft.com/office/drawing/2010/main" val="0"/>
+              </a:ext>
+            </a:extLst>
+          </a:blip>
+          <a:stretch>
+            <a:fillRect/>
+          </a:stretch>
+        </p:blipFill>
+        <p:spPr bwMode="auto">
+          <a:xfrm>
+            <a:off x="1886602" y="1236541"/>
+            <a:ext cx="5370795" cy="3263504"/>
+          </a:xfrm>
+          <a:prstGeom prst="rect">
+            <a:avLst/>
+          </a:prstGeom>
+          <a:solidFill>
+            <a:srgbClr val="FFFFFF"/>
+          </a:solidFill>
+        </p:spPr>
+      </p:pic>
+    </p:spTree>
+    <p:extLst>
+      <p:ext uri="{BB962C8B-B14F-4D97-AF65-F5344CB8AC3E}">
+        <p14:creationId xmlns:p14="http://schemas.microsoft.com/office/powerpoint/2010/main" val="2337429973"/>
+      </p:ext>
+    </p:extLst>
+  </p:cSld>
+  <p:clrMapOvr>
+    <a:masterClrMapping/>
+  </p:clrMapOvr>
+</p:sld>
+</file>
+
+<file path=ppt/slides/slide101.xml><?xml version="1.0" encoding="utf-8"?>
+<p:sld xmlns:a="http://schemas.openxmlformats.org/drawingml/2006/main" xmlns:r="http://schemas.openxmlformats.org/officeDocument/2006/relationships" xmlns:p="http://schemas.openxmlformats.org/presentationml/2006/main">
+  <p:cSld>
+    <p:spTree>
+      <p:nvGrpSpPr>
+        <p:cNvPr id="1" name=""/>
+        <p:cNvGrpSpPr/>
+        <p:nvPr/>
+      </p:nvGrpSpPr>
+      <p:grpSpPr>
+        <a:xfrm>
+          <a:off x="0" y="0"/>
+          <a:ext cx="0" cy="0"/>
+          <a:chOff x="0" y="0"/>
+          <a:chExt cx="0" cy="0"/>
+        </a:xfrm>
+      </p:grpSpPr>
+      <p:sp>
+        <p:nvSpPr>
+          <p:cNvPr id="2" name="Title 1">
+            <a:extLst>
+              <a:ext uri="{FF2B5EF4-FFF2-40B4-BE49-F238E27FC236}">
                 <a16:creationId xmlns:a16="http://schemas.microsoft.com/office/drawing/2014/main" id="{C96CF04D-2F9B-2D4B-BB6E-1DBC2C66150E}"/>
               </a:ext>
             </a:extLst>
@@ -30129,7 +30236,7 @@
 </p:sld>
 </file>
 
-<file path=ppt/slides/slide101.xml><?xml version="1.0" encoding="utf-8"?>
+<file path=ppt/slides/slide102.xml><?xml version="1.0" encoding="utf-8"?>
 <p:sld xmlns:a="http://schemas.openxmlformats.org/drawingml/2006/main" xmlns:r="http://schemas.openxmlformats.org/officeDocument/2006/relationships" xmlns:p="http://schemas.openxmlformats.org/presentationml/2006/main">
   <p:cSld>
     <p:spTree>
@@ -39523,7 +39630,7 @@
 </file>
 
 <file path=ppt/slides/slide47.xml><?xml version="1.0" encoding="utf-8"?>
-<p:sld xmlns:a="http://schemas.openxmlformats.org/drawingml/2006/main" xmlns:r="http://schemas.openxmlformats.org/officeDocument/2006/relationships" xmlns:p="http://schemas.openxmlformats.org/presentationml/2006/main">
+<p:sld xmlns:a="http://schemas.openxmlformats.org/drawingml/2006/main" xmlns:r="http://schemas.openxmlformats.org/officeDocument/2006/relationships" xmlns:p="http://schemas.openxmlformats.org/presentationml/2006/main" show="0">
   <p:cSld>
     <p:spTree>
       <p:nvGrpSpPr>
@@ -39842,7 +39949,7 @@
         </p:blipFill>
         <p:spPr>
           <a:xfrm>
-            <a:off x="3224244" y="1190562"/>
+            <a:off x="302287" y="1152413"/>
             <a:ext cx="5774253" cy="2062233"/>
           </a:xfrm>
           <a:prstGeom prst="rect">
@@ -39850,12 +39957,73 @@
           </a:prstGeom>
         </p:spPr>
       </p:pic>
+      <p:sp>
+        <p:nvSpPr>
+          <p:cNvPr id="4" name="Rectangle 3">
+            <a:extLst>
+              <a:ext uri="{FF2B5EF4-FFF2-40B4-BE49-F238E27FC236}">
+                <a16:creationId xmlns:a16="http://schemas.microsoft.com/office/drawing/2014/main" id="{DB6295F9-9CF9-50E6-C0D4-B72710AFB71B}"/>
+              </a:ext>
+            </a:extLst>
+          </p:cNvPr>
+          <p:cNvSpPr/>
+          <p:nvPr/>
+        </p:nvSpPr>
+        <p:spPr>
+          <a:xfrm>
+            <a:off x="2801958" y="1164603"/>
+            <a:ext cx="597358" cy="244982"/>
+          </a:xfrm>
+          <a:prstGeom prst="rect">
+            <a:avLst/>
+          </a:prstGeom>
+          <a:solidFill>
+            <a:schemeClr val="bg1"/>
+          </a:solidFill>
+          <a:ln>
+            <a:solidFill>
+              <a:schemeClr val="bg1"/>
+            </a:solidFill>
+          </a:ln>
+        </p:spPr>
+        <p:style>
+          <a:lnRef idx="2">
+            <a:schemeClr val="accent1">
+              <a:shade val="50000"/>
+            </a:schemeClr>
+          </a:lnRef>
+          <a:fillRef idx="1">
+            <a:schemeClr val="accent1"/>
+          </a:fillRef>
+          <a:effectRef idx="0">
+            <a:schemeClr val="accent1"/>
+          </a:effectRef>
+          <a:fontRef idx="minor">
+            <a:schemeClr val="lt1"/>
+          </a:fontRef>
+        </p:style>
+        <p:txBody>
+          <a:bodyPr rtlCol="0" anchor="ctr"/>
+          <a:lstStyle/>
+          <a:p>
+            <a:pPr algn="ctr"/>
+            <a:r>
+              <a:rPr lang="en-US" sz="2200" b="1" dirty="0">
+                <a:solidFill>
+                  <a:schemeClr val="tx1"/>
+                </a:solidFill>
+              </a:rPr>
+              <a:t>Cur</a:t>
+            </a:r>
+          </a:p>
+        </p:txBody>
+      </p:sp>
       <p:pic>
         <p:nvPicPr>
-          <p:cNvPr id="13" name="Picture 12" descr="Unlink WHAT and WHERE sub">
+          <p:cNvPr id="9" name="Picture 8" descr="Unlink source code with the 'where' and 'what' added">
             <a:extLst>
               <a:ext uri="{FF2B5EF4-FFF2-40B4-BE49-F238E27FC236}">
-                <a16:creationId xmlns:a16="http://schemas.microsoft.com/office/drawing/2014/main" id="{8FB49F87-06FB-DA4C-9B60-C126F7F2F096}"/>
+                <a16:creationId xmlns:a16="http://schemas.microsoft.com/office/drawing/2014/main" id="{ECDB9D3F-5A8D-B70A-75F9-24F923C201C8}"/>
               </a:ext>
             </a:extLst>
           </p:cNvPr>
@@ -39866,13 +40034,13 @@
         </p:nvPicPr>
         <p:blipFill rotWithShape="1">
           <a:blip r:embed="rId3"/>
-          <a:srcRect r="44354"/>
+          <a:srcRect l="-1" r="3"/>
           <a:stretch/>
         </p:blipFill>
         <p:spPr>
           <a:xfrm>
-            <a:off x="145504" y="967376"/>
-            <a:ext cx="2625688" cy="2066116"/>
+            <a:off x="4083042" y="2768872"/>
+            <a:ext cx="4758752" cy="1847516"/>
           </a:xfrm>
           <a:prstGeom prst="rect">
             <a:avLst/>
@@ -40045,6 +40213,67 @@
           </a:prstGeom>
         </p:spPr>
       </p:pic>
+      <p:sp>
+        <p:nvSpPr>
+          <p:cNvPr id="6" name="Rectangle 5">
+            <a:extLst>
+              <a:ext uri="{FF2B5EF4-FFF2-40B4-BE49-F238E27FC236}">
+                <a16:creationId xmlns:a16="http://schemas.microsoft.com/office/drawing/2014/main" id="{BF7701B1-5BD1-E6E8-1211-4320EB6B2DED}"/>
+              </a:ext>
+            </a:extLst>
+          </p:cNvPr>
+          <p:cNvSpPr/>
+          <p:nvPr/>
+        </p:nvSpPr>
+        <p:spPr>
+          <a:xfrm>
+            <a:off x="5750177" y="1190562"/>
+            <a:ext cx="597358" cy="244982"/>
+          </a:xfrm>
+          <a:prstGeom prst="rect">
+            <a:avLst/>
+          </a:prstGeom>
+          <a:solidFill>
+            <a:schemeClr val="bg1"/>
+          </a:solidFill>
+          <a:ln>
+            <a:solidFill>
+              <a:schemeClr val="bg1"/>
+            </a:solidFill>
+          </a:ln>
+        </p:spPr>
+        <p:style>
+          <a:lnRef idx="2">
+            <a:schemeClr val="accent1">
+              <a:shade val="50000"/>
+            </a:schemeClr>
+          </a:lnRef>
+          <a:fillRef idx="1">
+            <a:schemeClr val="accent1"/>
+          </a:fillRef>
+          <a:effectRef idx="0">
+            <a:schemeClr val="accent1"/>
+          </a:effectRef>
+          <a:fontRef idx="minor">
+            <a:schemeClr val="lt1"/>
+          </a:fontRef>
+        </p:style>
+        <p:txBody>
+          <a:bodyPr rtlCol="0" anchor="ctr"/>
+          <a:lstStyle/>
+          <a:p>
+            <a:pPr algn="ctr"/>
+            <a:r>
+              <a:rPr lang="en-US" sz="2200" b="1" dirty="0">
+                <a:solidFill>
+                  <a:schemeClr val="tx1"/>
+                </a:solidFill>
+              </a:rPr>
+              <a:t>Cur</a:t>
+            </a:r>
+          </a:p>
+        </p:txBody>
+      </p:sp>
     </p:spTree>
     <p:extLst>
       <p:ext uri="{BB962C8B-B14F-4D97-AF65-F5344CB8AC3E}">
@@ -40734,6 +40963,67 @@
           </a:fontRef>
         </p:style>
       </p:cxnSp>
+      <p:sp>
+        <p:nvSpPr>
+          <p:cNvPr id="9" name="Rectangle 8">
+            <a:extLst>
+              <a:ext uri="{FF2B5EF4-FFF2-40B4-BE49-F238E27FC236}">
+                <a16:creationId xmlns:a16="http://schemas.microsoft.com/office/drawing/2014/main" id="{12AA0716-892C-3998-9690-04660A000C4B}"/>
+              </a:ext>
+            </a:extLst>
+          </p:cNvPr>
+          <p:cNvSpPr/>
+          <p:nvPr/>
+        </p:nvSpPr>
+        <p:spPr>
+          <a:xfrm>
+            <a:off x="5492725" y="1134595"/>
+            <a:ext cx="597358" cy="244982"/>
+          </a:xfrm>
+          <a:prstGeom prst="rect">
+            <a:avLst/>
+          </a:prstGeom>
+          <a:solidFill>
+            <a:schemeClr val="bg1"/>
+          </a:solidFill>
+          <a:ln>
+            <a:solidFill>
+              <a:schemeClr val="bg1"/>
+            </a:solidFill>
+          </a:ln>
+        </p:spPr>
+        <p:style>
+          <a:lnRef idx="2">
+            <a:schemeClr val="accent1">
+              <a:shade val="50000"/>
+            </a:schemeClr>
+          </a:lnRef>
+          <a:fillRef idx="1">
+            <a:schemeClr val="accent1"/>
+          </a:fillRef>
+          <a:effectRef idx="0">
+            <a:schemeClr val="accent1"/>
+          </a:effectRef>
+          <a:fontRef idx="minor">
+            <a:schemeClr val="lt1"/>
+          </a:fontRef>
+        </p:style>
+        <p:txBody>
+          <a:bodyPr rtlCol="0" anchor="ctr"/>
+          <a:lstStyle/>
+          <a:p>
+            <a:pPr algn="ctr"/>
+            <a:r>
+              <a:rPr lang="en-US" sz="2200" b="1" dirty="0">
+                <a:solidFill>
+                  <a:schemeClr val="tx1"/>
+                </a:solidFill>
+              </a:rPr>
+              <a:t>Cur</a:t>
+            </a:r>
+          </a:p>
+        </p:txBody>
+      </p:sp>
     </p:spTree>
     <p:extLst>
       <p:ext uri="{BB962C8B-B14F-4D97-AF65-F5344CB8AC3E}">
@@ -40983,6 +41273,67 @@
           </a:p>
         </p:txBody>
       </p:sp>
+      <p:sp>
+        <p:nvSpPr>
+          <p:cNvPr id="7" name="Rectangle 6">
+            <a:extLst>
+              <a:ext uri="{FF2B5EF4-FFF2-40B4-BE49-F238E27FC236}">
+                <a16:creationId xmlns:a16="http://schemas.microsoft.com/office/drawing/2014/main" id="{C2C073F7-14F9-6BFC-D4FB-DB6DD798D825}"/>
+              </a:ext>
+            </a:extLst>
+          </p:cNvPr>
+          <p:cNvSpPr/>
+          <p:nvPr/>
+        </p:nvSpPr>
+        <p:spPr>
+          <a:xfrm>
+            <a:off x="5563746" y="1145528"/>
+            <a:ext cx="597358" cy="244982"/>
+          </a:xfrm>
+          <a:prstGeom prst="rect">
+            <a:avLst/>
+          </a:prstGeom>
+          <a:solidFill>
+            <a:schemeClr val="bg1"/>
+          </a:solidFill>
+          <a:ln>
+            <a:solidFill>
+              <a:schemeClr val="bg1"/>
+            </a:solidFill>
+          </a:ln>
+        </p:spPr>
+        <p:style>
+          <a:lnRef idx="2">
+            <a:schemeClr val="accent1">
+              <a:shade val="50000"/>
+            </a:schemeClr>
+          </a:lnRef>
+          <a:fillRef idx="1">
+            <a:schemeClr val="accent1"/>
+          </a:fillRef>
+          <a:effectRef idx="0">
+            <a:schemeClr val="accent1"/>
+          </a:effectRef>
+          <a:fontRef idx="minor">
+            <a:schemeClr val="lt1"/>
+          </a:fontRef>
+        </p:style>
+        <p:txBody>
+          <a:bodyPr rtlCol="0" anchor="ctr"/>
+          <a:lstStyle/>
+          <a:p>
+            <a:pPr algn="ctr"/>
+            <a:r>
+              <a:rPr lang="en-US" sz="2200" b="1" dirty="0">
+                <a:solidFill>
+                  <a:schemeClr val="tx1"/>
+                </a:solidFill>
+              </a:rPr>
+              <a:t>Cur</a:t>
+            </a:r>
+          </a:p>
+        </p:txBody>
+      </p:sp>
     </p:spTree>
     <p:extLst>
       <p:ext uri="{BB962C8B-B14F-4D97-AF65-F5344CB8AC3E}">
@@ -41134,6 +41485,189 @@
           <a:noFill/>
         </p:spPr>
       </p:pic>
+      <p:sp>
+        <p:nvSpPr>
+          <p:cNvPr id="6" name="Rectangle 5">
+            <a:extLst>
+              <a:ext uri="{FF2B5EF4-FFF2-40B4-BE49-F238E27FC236}">
+                <a16:creationId xmlns:a16="http://schemas.microsoft.com/office/drawing/2014/main" id="{31793801-AA0B-7B81-F856-5E1F58CB108E}"/>
+              </a:ext>
+            </a:extLst>
+          </p:cNvPr>
+          <p:cNvSpPr/>
+          <p:nvPr/>
+        </p:nvSpPr>
+        <p:spPr>
+          <a:xfrm>
+            <a:off x="4907521" y="1023037"/>
+            <a:ext cx="3268812" cy="244982"/>
+          </a:xfrm>
+          <a:prstGeom prst="rect">
+            <a:avLst/>
+          </a:prstGeom>
+          <a:solidFill>
+            <a:schemeClr val="bg1"/>
+          </a:solidFill>
+          <a:ln>
+            <a:solidFill>
+              <a:schemeClr val="bg1"/>
+            </a:solidFill>
+          </a:ln>
+        </p:spPr>
+        <p:style>
+          <a:lnRef idx="2">
+            <a:schemeClr val="accent1">
+              <a:shade val="50000"/>
+            </a:schemeClr>
+          </a:lnRef>
+          <a:fillRef idx="1">
+            <a:schemeClr val="accent1"/>
+          </a:fillRef>
+          <a:effectRef idx="0">
+            <a:schemeClr val="accent1"/>
+          </a:effectRef>
+          <a:fontRef idx="minor">
+            <a:schemeClr val="lt1"/>
+          </a:fontRef>
+        </p:style>
+        <p:txBody>
+          <a:bodyPr rtlCol="0" anchor="ctr"/>
+          <a:lstStyle/>
+          <a:p>
+            <a:pPr algn="ctr"/>
+            <a:r>
+              <a:rPr lang="en-US" sz="2000" b="1" dirty="0">
+                <a:solidFill>
+                  <a:schemeClr val="tx1"/>
+                </a:solidFill>
+              </a:rPr>
+              <a:t>Next-&gt;bk = Prev</a:t>
+            </a:r>
+          </a:p>
+        </p:txBody>
+      </p:sp>
+      <p:sp>
+        <p:nvSpPr>
+          <p:cNvPr id="8" name="Rectangle 7">
+            <a:extLst>
+              <a:ext uri="{FF2B5EF4-FFF2-40B4-BE49-F238E27FC236}">
+                <a16:creationId xmlns:a16="http://schemas.microsoft.com/office/drawing/2014/main" id="{C26A0940-8219-6AC1-B25A-FA0AC0A439FF}"/>
+              </a:ext>
+            </a:extLst>
+          </p:cNvPr>
+          <p:cNvSpPr/>
+          <p:nvPr/>
+        </p:nvSpPr>
+        <p:spPr>
+          <a:xfrm>
+            <a:off x="5058661" y="1246728"/>
+            <a:ext cx="3268812" cy="244982"/>
+          </a:xfrm>
+          <a:prstGeom prst="rect">
+            <a:avLst/>
+          </a:prstGeom>
+          <a:solidFill>
+            <a:schemeClr val="bg1"/>
+          </a:solidFill>
+          <a:ln>
+            <a:solidFill>
+              <a:schemeClr val="bg1"/>
+            </a:solidFill>
+          </a:ln>
+        </p:spPr>
+        <p:style>
+          <a:lnRef idx="2">
+            <a:schemeClr val="accent1">
+              <a:shade val="50000"/>
+            </a:schemeClr>
+          </a:lnRef>
+          <a:fillRef idx="1">
+            <a:schemeClr val="accent1"/>
+          </a:fillRef>
+          <a:effectRef idx="0">
+            <a:schemeClr val="accent1"/>
+          </a:effectRef>
+          <a:fontRef idx="minor">
+            <a:schemeClr val="lt1"/>
+          </a:fontRef>
+        </p:style>
+        <p:txBody>
+          <a:bodyPr rtlCol="0" anchor="ctr"/>
+          <a:lstStyle/>
+          <a:p>
+            <a:pPr algn="ctr"/>
+            <a:r>
+              <a:rPr lang="en-US" sz="2000" b="1" dirty="0">
+                <a:solidFill>
+                  <a:schemeClr val="tx1"/>
+                </a:solidFill>
+              </a:rPr>
+              <a:t>Next + 0x18 = Prev</a:t>
+            </a:r>
+          </a:p>
+        </p:txBody>
+      </p:sp>
+      <p:sp>
+        <p:nvSpPr>
+          <p:cNvPr id="10" name="Rectangle 9">
+            <a:extLst>
+              <a:ext uri="{FF2B5EF4-FFF2-40B4-BE49-F238E27FC236}">
+                <a16:creationId xmlns:a16="http://schemas.microsoft.com/office/drawing/2014/main" id="{1411E08F-8A55-89E2-C05F-05CA1BCC790F}"/>
+              </a:ext>
+            </a:extLst>
+          </p:cNvPr>
+          <p:cNvSpPr/>
+          <p:nvPr/>
+        </p:nvSpPr>
+        <p:spPr>
+          <a:xfrm>
+            <a:off x="5058661" y="1470419"/>
+            <a:ext cx="3268812" cy="244982"/>
+          </a:xfrm>
+          <a:prstGeom prst="rect">
+            <a:avLst/>
+          </a:prstGeom>
+          <a:solidFill>
+            <a:schemeClr val="bg1"/>
+          </a:solidFill>
+          <a:ln>
+            <a:solidFill>
+              <a:schemeClr val="bg1"/>
+            </a:solidFill>
+          </a:ln>
+        </p:spPr>
+        <p:style>
+          <a:lnRef idx="2">
+            <a:schemeClr val="accent1">
+              <a:shade val="50000"/>
+            </a:schemeClr>
+          </a:lnRef>
+          <a:fillRef idx="1">
+            <a:schemeClr val="accent1"/>
+          </a:fillRef>
+          <a:effectRef idx="0">
+            <a:schemeClr val="accent1"/>
+          </a:effectRef>
+          <a:fontRef idx="minor">
+            <a:schemeClr val="lt1"/>
+          </a:fontRef>
+        </p:style>
+        <p:txBody>
+          <a:bodyPr rtlCol="0" anchor="ctr"/>
+          <a:lstStyle/>
+          <a:p>
+            <a:pPr algn="ctr"/>
+            <a:r>
+              <a:rPr lang="en-US" sz="2000" b="1" dirty="0">
+                <a:solidFill>
+                  <a:srgbClr val="FF0000"/>
+                </a:solidFill>
+              </a:rPr>
+              <a:t>GOT + 0x18 = Prev</a:t>
+            </a:r>
+          </a:p>
+        </p:txBody>
+      </p:sp>
     </p:spTree>
     <p:extLst>
       <p:ext uri="{BB962C8B-B14F-4D97-AF65-F5344CB8AC3E}">
@@ -41284,8 +41818,8 @@
         </p:blipFill>
         <p:spPr>
           <a:xfrm>
-            <a:off x="5388883" y="1369219"/>
-            <a:ext cx="2366733" cy="3263504"/>
+            <a:off x="5336689" y="1109709"/>
+            <a:ext cx="2554932" cy="3523014"/>
           </a:xfrm>
           <a:prstGeom prst="rect">
             <a:avLst/>
@@ -41293,6 +41827,189 @@
           <a:noFill/>
         </p:spPr>
       </p:pic>
+      <p:sp>
+        <p:nvSpPr>
+          <p:cNvPr id="9" name="Rectangle 8">
+            <a:extLst>
+              <a:ext uri="{FF2B5EF4-FFF2-40B4-BE49-F238E27FC236}">
+                <a16:creationId xmlns:a16="http://schemas.microsoft.com/office/drawing/2014/main" id="{9FD57D7E-0FF2-3226-794F-5858EC8535FF}"/>
+              </a:ext>
+            </a:extLst>
+          </p:cNvPr>
+          <p:cNvSpPr/>
+          <p:nvPr/>
+        </p:nvSpPr>
+        <p:spPr>
+          <a:xfrm>
+            <a:off x="4907521" y="1023037"/>
+            <a:ext cx="3268812" cy="244982"/>
+          </a:xfrm>
+          <a:prstGeom prst="rect">
+            <a:avLst/>
+          </a:prstGeom>
+          <a:solidFill>
+            <a:schemeClr val="bg1"/>
+          </a:solidFill>
+          <a:ln>
+            <a:solidFill>
+              <a:schemeClr val="bg1"/>
+            </a:solidFill>
+          </a:ln>
+        </p:spPr>
+        <p:style>
+          <a:lnRef idx="2">
+            <a:schemeClr val="accent1">
+              <a:shade val="50000"/>
+            </a:schemeClr>
+          </a:lnRef>
+          <a:fillRef idx="1">
+            <a:schemeClr val="accent1"/>
+          </a:fillRef>
+          <a:effectRef idx="0">
+            <a:schemeClr val="accent1"/>
+          </a:effectRef>
+          <a:fontRef idx="minor">
+            <a:schemeClr val="lt1"/>
+          </a:fontRef>
+        </p:style>
+        <p:txBody>
+          <a:bodyPr rtlCol="0" anchor="ctr"/>
+          <a:lstStyle/>
+          <a:p>
+            <a:pPr algn="ctr"/>
+            <a:r>
+              <a:rPr lang="en-US" sz="2000" b="1" dirty="0">
+                <a:solidFill>
+                  <a:schemeClr val="tx1"/>
+                </a:solidFill>
+              </a:rPr>
+              <a:t>Next-&gt;bk = Prev</a:t>
+            </a:r>
+          </a:p>
+        </p:txBody>
+      </p:sp>
+      <p:sp>
+        <p:nvSpPr>
+          <p:cNvPr id="10" name="Rectangle 9">
+            <a:extLst>
+              <a:ext uri="{FF2B5EF4-FFF2-40B4-BE49-F238E27FC236}">
+                <a16:creationId xmlns:a16="http://schemas.microsoft.com/office/drawing/2014/main" id="{5C3487A0-A668-F00F-17E3-1D76703C828A}"/>
+              </a:ext>
+            </a:extLst>
+          </p:cNvPr>
+          <p:cNvSpPr/>
+          <p:nvPr/>
+        </p:nvSpPr>
+        <p:spPr>
+          <a:xfrm>
+            <a:off x="5058661" y="1246728"/>
+            <a:ext cx="3268812" cy="244982"/>
+          </a:xfrm>
+          <a:prstGeom prst="rect">
+            <a:avLst/>
+          </a:prstGeom>
+          <a:solidFill>
+            <a:schemeClr val="bg1"/>
+          </a:solidFill>
+          <a:ln>
+            <a:solidFill>
+              <a:schemeClr val="bg1"/>
+            </a:solidFill>
+          </a:ln>
+        </p:spPr>
+        <p:style>
+          <a:lnRef idx="2">
+            <a:schemeClr val="accent1">
+              <a:shade val="50000"/>
+            </a:schemeClr>
+          </a:lnRef>
+          <a:fillRef idx="1">
+            <a:schemeClr val="accent1"/>
+          </a:fillRef>
+          <a:effectRef idx="0">
+            <a:schemeClr val="accent1"/>
+          </a:effectRef>
+          <a:fontRef idx="minor">
+            <a:schemeClr val="lt1"/>
+          </a:fontRef>
+        </p:style>
+        <p:txBody>
+          <a:bodyPr rtlCol="0" anchor="ctr"/>
+          <a:lstStyle/>
+          <a:p>
+            <a:pPr algn="ctr"/>
+            <a:r>
+              <a:rPr lang="en-US" sz="2000" b="1" dirty="0">
+                <a:solidFill>
+                  <a:schemeClr val="tx1"/>
+                </a:solidFill>
+              </a:rPr>
+              <a:t>Next + 0x18 = Prev</a:t>
+            </a:r>
+          </a:p>
+        </p:txBody>
+      </p:sp>
+      <p:sp>
+        <p:nvSpPr>
+          <p:cNvPr id="11" name="Rectangle 10">
+            <a:extLst>
+              <a:ext uri="{FF2B5EF4-FFF2-40B4-BE49-F238E27FC236}">
+                <a16:creationId xmlns:a16="http://schemas.microsoft.com/office/drawing/2014/main" id="{4A636FCA-8A4A-60D4-62BA-F22F5CE16A70}"/>
+              </a:ext>
+            </a:extLst>
+          </p:cNvPr>
+          <p:cNvSpPr/>
+          <p:nvPr/>
+        </p:nvSpPr>
+        <p:spPr>
+          <a:xfrm>
+            <a:off x="5058661" y="1470419"/>
+            <a:ext cx="3268812" cy="244982"/>
+          </a:xfrm>
+          <a:prstGeom prst="rect">
+            <a:avLst/>
+          </a:prstGeom>
+          <a:solidFill>
+            <a:schemeClr val="bg1"/>
+          </a:solidFill>
+          <a:ln>
+            <a:solidFill>
+              <a:schemeClr val="bg1"/>
+            </a:solidFill>
+          </a:ln>
+        </p:spPr>
+        <p:style>
+          <a:lnRef idx="2">
+            <a:schemeClr val="accent1">
+              <a:shade val="50000"/>
+            </a:schemeClr>
+          </a:lnRef>
+          <a:fillRef idx="1">
+            <a:schemeClr val="accent1"/>
+          </a:fillRef>
+          <a:effectRef idx="0">
+            <a:schemeClr val="accent1"/>
+          </a:effectRef>
+          <a:fontRef idx="minor">
+            <a:schemeClr val="lt1"/>
+          </a:fontRef>
+        </p:style>
+        <p:txBody>
+          <a:bodyPr rtlCol="0" anchor="ctr"/>
+          <a:lstStyle/>
+          <a:p>
+            <a:pPr algn="ctr"/>
+            <a:r>
+              <a:rPr lang="en-US" sz="2000" b="1" dirty="0">
+                <a:solidFill>
+                  <a:srgbClr val="FF0000"/>
+                </a:solidFill>
+              </a:rPr>
+              <a:t>GOT + 0x18 = Prev</a:t>
+            </a:r>
+          </a:p>
+        </p:txBody>
+      </p:sp>
     </p:spTree>
     <p:extLst>
       <p:ext uri="{BB962C8B-B14F-4D97-AF65-F5344CB8AC3E}">
@@ -42883,7 +43600,7 @@
           <a:p>
             <a:r>
               <a:rPr lang="en-US" dirty="0"/>
-              <a:t>Exercise2</a:t>
+              <a:t>Exercise 2</a:t>
             </a:r>
           </a:p>
         </p:txBody>
@@ -43790,7 +44507,7 @@
         </p:blipFill>
         <p:spPr>
           <a:xfrm>
-            <a:off x="5455403" y="158834"/>
+            <a:off x="5455403" y="173464"/>
             <a:ext cx="2491132" cy="4284423"/>
           </a:xfrm>
           <a:noFill/>
@@ -44282,7 +44999,7 @@
 </file>
 
 <file path=ppt/slides/slide67.xml><?xml version="1.0" encoding="utf-8"?>
-<p:sld xmlns:a="http://schemas.openxmlformats.org/drawingml/2006/main" xmlns:r="http://schemas.openxmlformats.org/officeDocument/2006/relationships" xmlns:p="http://schemas.openxmlformats.org/presentationml/2006/main">
+<p:sld xmlns:a="http://schemas.openxmlformats.org/drawingml/2006/main" xmlns:r="http://schemas.openxmlformats.org/officeDocument/2006/relationships" xmlns:p="http://schemas.openxmlformats.org/presentationml/2006/main" show="0">
   <p:cSld>
     <p:spTree>
       <p:nvGrpSpPr>
@@ -44602,7 +45319,7 @@
         </p:blipFill>
         <p:spPr>
           <a:xfrm>
-            <a:off x="3224244" y="1190562"/>
+            <a:off x="232470" y="1190562"/>
             <a:ext cx="5774253" cy="2062233"/>
           </a:xfrm>
           <a:prstGeom prst="rect">
@@ -44612,10 +45329,10 @@
       </p:pic>
       <p:pic>
         <p:nvPicPr>
-          <p:cNvPr id="12" name="Picture 11" descr="Unlink WHAT and WHERE sub">
+          <p:cNvPr id="6" name="Picture 5" descr="Unlink source code with the 'where' and 'what' added">
             <a:extLst>
               <a:ext uri="{FF2B5EF4-FFF2-40B4-BE49-F238E27FC236}">
-                <a16:creationId xmlns:a16="http://schemas.microsoft.com/office/drawing/2014/main" id="{AE3B6AA3-2CD6-5044-898C-427CF70D7760}"/>
+                <a16:creationId xmlns:a16="http://schemas.microsoft.com/office/drawing/2014/main" id="{AD528BB5-D7DE-A226-E449-A10DC0445678}"/>
               </a:ext>
             </a:extLst>
           </p:cNvPr>
@@ -44624,22 +45341,82 @@
           </p:cNvPicPr>
           <p:nvPr/>
         </p:nvPicPr>
-        <p:blipFill>
+        <p:blipFill rotWithShape="1">
           <a:blip r:embed="rId3"/>
-          <a:stretch>
-            <a:fillRect/>
-          </a:stretch>
+          <a:srcRect l="-1" r="3"/>
+          <a:stretch/>
         </p:blipFill>
         <p:spPr>
           <a:xfrm>
-            <a:off x="145503" y="967376"/>
-            <a:ext cx="3078741" cy="1348088"/>
+            <a:off x="4100798" y="2795506"/>
+            <a:ext cx="4758752" cy="1847516"/>
           </a:xfrm>
           <a:prstGeom prst="rect">
             <a:avLst/>
           </a:prstGeom>
         </p:spPr>
       </p:pic>
+      <p:sp>
+        <p:nvSpPr>
+          <p:cNvPr id="9" name="Rectangle 8">
+            <a:extLst>
+              <a:ext uri="{FF2B5EF4-FFF2-40B4-BE49-F238E27FC236}">
+                <a16:creationId xmlns:a16="http://schemas.microsoft.com/office/drawing/2014/main" id="{2609CAA9-49B6-CECA-137B-16AE2ADCB607}"/>
+              </a:ext>
+            </a:extLst>
+          </p:cNvPr>
+          <p:cNvSpPr/>
+          <p:nvPr/>
+        </p:nvSpPr>
+        <p:spPr>
+          <a:xfrm>
+            <a:off x="2735497" y="1190562"/>
+            <a:ext cx="597358" cy="244982"/>
+          </a:xfrm>
+          <a:prstGeom prst="rect">
+            <a:avLst/>
+          </a:prstGeom>
+          <a:solidFill>
+            <a:schemeClr val="bg1"/>
+          </a:solidFill>
+          <a:ln>
+            <a:solidFill>
+              <a:schemeClr val="bg1"/>
+            </a:solidFill>
+          </a:ln>
+        </p:spPr>
+        <p:style>
+          <a:lnRef idx="2">
+            <a:schemeClr val="accent1">
+              <a:shade val="50000"/>
+            </a:schemeClr>
+          </a:lnRef>
+          <a:fillRef idx="1">
+            <a:schemeClr val="accent1"/>
+          </a:fillRef>
+          <a:effectRef idx="0">
+            <a:schemeClr val="accent1"/>
+          </a:effectRef>
+          <a:fontRef idx="minor">
+            <a:schemeClr val="lt1"/>
+          </a:fontRef>
+        </p:style>
+        <p:txBody>
+          <a:bodyPr rtlCol="0" anchor="ctr"/>
+          <a:lstStyle/>
+          <a:p>
+            <a:pPr algn="ctr"/>
+            <a:r>
+              <a:rPr lang="en-US" sz="2200" b="1" dirty="0">
+                <a:solidFill>
+                  <a:schemeClr val="tx1"/>
+                </a:solidFill>
+              </a:rPr>
+              <a:t>Cur</a:t>
+            </a:r>
+          </a:p>
+        </p:txBody>
+      </p:sp>
     </p:spTree>
     <p:extLst>
       <p:ext uri="{BB962C8B-B14F-4D97-AF65-F5344CB8AC3E}">
@@ -44806,6 +45583,67 @@
           </a:prstGeom>
         </p:spPr>
       </p:pic>
+      <p:sp>
+        <p:nvSpPr>
+          <p:cNvPr id="6" name="Rectangle 5">
+            <a:extLst>
+              <a:ext uri="{FF2B5EF4-FFF2-40B4-BE49-F238E27FC236}">
+                <a16:creationId xmlns:a16="http://schemas.microsoft.com/office/drawing/2014/main" id="{8CFB8274-D609-790F-DE8D-6D34A15427D1}"/>
+              </a:ext>
+            </a:extLst>
+          </p:cNvPr>
+          <p:cNvSpPr/>
+          <p:nvPr/>
+        </p:nvSpPr>
+        <p:spPr>
+          <a:xfrm>
+            <a:off x="5681710" y="1201669"/>
+            <a:ext cx="648070" cy="244982"/>
+          </a:xfrm>
+          <a:prstGeom prst="rect">
+            <a:avLst/>
+          </a:prstGeom>
+          <a:solidFill>
+            <a:schemeClr val="bg1"/>
+          </a:solidFill>
+          <a:ln>
+            <a:solidFill>
+              <a:schemeClr val="bg1"/>
+            </a:solidFill>
+          </a:ln>
+        </p:spPr>
+        <p:style>
+          <a:lnRef idx="2">
+            <a:schemeClr val="accent1">
+              <a:shade val="50000"/>
+            </a:schemeClr>
+          </a:lnRef>
+          <a:fillRef idx="1">
+            <a:schemeClr val="accent1"/>
+          </a:fillRef>
+          <a:effectRef idx="0">
+            <a:schemeClr val="accent1"/>
+          </a:effectRef>
+          <a:fontRef idx="minor">
+            <a:schemeClr val="lt1"/>
+          </a:fontRef>
+        </p:style>
+        <p:txBody>
+          <a:bodyPr rtlCol="0" anchor="ctr"/>
+          <a:lstStyle/>
+          <a:p>
+            <a:pPr algn="ctr"/>
+            <a:r>
+              <a:rPr lang="en-US" sz="2200" b="1" dirty="0">
+                <a:solidFill>
+                  <a:schemeClr val="tx1"/>
+                </a:solidFill>
+              </a:rPr>
+              <a:t>Cur</a:t>
+            </a:r>
+          </a:p>
+        </p:txBody>
+      </p:sp>
     </p:spTree>
     <p:extLst>
       <p:ext uri="{BB962C8B-B14F-4D97-AF65-F5344CB8AC3E}">
@@ -45208,6 +46046,67 @@
           </a:fontRef>
         </p:style>
       </p:cxnSp>
+      <p:sp>
+        <p:nvSpPr>
+          <p:cNvPr id="9" name="Rectangle 8">
+            <a:extLst>
+              <a:ext uri="{FF2B5EF4-FFF2-40B4-BE49-F238E27FC236}">
+                <a16:creationId xmlns:a16="http://schemas.microsoft.com/office/drawing/2014/main" id="{E062E0F1-5E92-0ED2-16BE-10F91FE41F9B}"/>
+              </a:ext>
+            </a:extLst>
+          </p:cNvPr>
+          <p:cNvSpPr/>
+          <p:nvPr/>
+        </p:nvSpPr>
+        <p:spPr>
+          <a:xfrm>
+            <a:off x="5492725" y="1134595"/>
+            <a:ext cx="597358" cy="244982"/>
+          </a:xfrm>
+          <a:prstGeom prst="rect">
+            <a:avLst/>
+          </a:prstGeom>
+          <a:solidFill>
+            <a:schemeClr val="bg1"/>
+          </a:solidFill>
+          <a:ln>
+            <a:solidFill>
+              <a:schemeClr val="bg1"/>
+            </a:solidFill>
+          </a:ln>
+        </p:spPr>
+        <p:style>
+          <a:lnRef idx="2">
+            <a:schemeClr val="accent1">
+              <a:shade val="50000"/>
+            </a:schemeClr>
+          </a:lnRef>
+          <a:fillRef idx="1">
+            <a:schemeClr val="accent1"/>
+          </a:fillRef>
+          <a:effectRef idx="0">
+            <a:schemeClr val="accent1"/>
+          </a:effectRef>
+          <a:fontRef idx="minor">
+            <a:schemeClr val="lt1"/>
+          </a:fontRef>
+        </p:style>
+        <p:txBody>
+          <a:bodyPr rtlCol="0" anchor="ctr"/>
+          <a:lstStyle/>
+          <a:p>
+            <a:pPr algn="ctr"/>
+            <a:r>
+              <a:rPr lang="en-US" sz="2200" b="1" dirty="0">
+                <a:solidFill>
+                  <a:schemeClr val="tx1"/>
+                </a:solidFill>
+              </a:rPr>
+              <a:t>Cur</a:t>
+            </a:r>
+          </a:p>
+        </p:txBody>
+      </p:sp>
     </p:spTree>
     <p:extLst>
       <p:ext uri="{BB962C8B-B14F-4D97-AF65-F5344CB8AC3E}">
@@ -45457,6 +46356,67 @@
           </a:p>
         </p:txBody>
       </p:sp>
+      <p:sp>
+        <p:nvSpPr>
+          <p:cNvPr id="7" name="Rectangle 6">
+            <a:extLst>
+              <a:ext uri="{FF2B5EF4-FFF2-40B4-BE49-F238E27FC236}">
+                <a16:creationId xmlns:a16="http://schemas.microsoft.com/office/drawing/2014/main" id="{91D649EE-B0E0-4C58-C562-E4112EE9F5F2}"/>
+              </a:ext>
+            </a:extLst>
+          </p:cNvPr>
+          <p:cNvSpPr/>
+          <p:nvPr/>
+        </p:nvSpPr>
+        <p:spPr>
+          <a:xfrm>
+            <a:off x="5545991" y="1145528"/>
+            <a:ext cx="597358" cy="244982"/>
+          </a:xfrm>
+          <a:prstGeom prst="rect">
+            <a:avLst/>
+          </a:prstGeom>
+          <a:solidFill>
+            <a:schemeClr val="bg1"/>
+          </a:solidFill>
+          <a:ln>
+            <a:solidFill>
+              <a:schemeClr val="bg1"/>
+            </a:solidFill>
+          </a:ln>
+        </p:spPr>
+        <p:style>
+          <a:lnRef idx="2">
+            <a:schemeClr val="accent1">
+              <a:shade val="50000"/>
+            </a:schemeClr>
+          </a:lnRef>
+          <a:fillRef idx="1">
+            <a:schemeClr val="accent1"/>
+          </a:fillRef>
+          <a:effectRef idx="0">
+            <a:schemeClr val="accent1"/>
+          </a:effectRef>
+          <a:fontRef idx="minor">
+            <a:schemeClr val="lt1"/>
+          </a:fontRef>
+        </p:style>
+        <p:txBody>
+          <a:bodyPr rtlCol="0" anchor="ctr"/>
+          <a:lstStyle/>
+          <a:p>
+            <a:pPr algn="ctr"/>
+            <a:r>
+              <a:rPr lang="en-US" sz="2200" b="1" dirty="0">
+                <a:solidFill>
+                  <a:schemeClr val="tx1"/>
+                </a:solidFill>
+              </a:rPr>
+              <a:t>Cur</a:t>
+            </a:r>
+          </a:p>
+        </p:txBody>
+      </p:sp>
     </p:spTree>
     <p:extLst>
       <p:ext uri="{BB962C8B-B14F-4D97-AF65-F5344CB8AC3E}">
@@ -45608,6 +46568,189 @@
           <a:noFill/>
         </p:spPr>
       </p:pic>
+      <p:sp>
+        <p:nvSpPr>
+          <p:cNvPr id="6" name="Rectangle 5">
+            <a:extLst>
+              <a:ext uri="{FF2B5EF4-FFF2-40B4-BE49-F238E27FC236}">
+                <a16:creationId xmlns:a16="http://schemas.microsoft.com/office/drawing/2014/main" id="{0E576B54-7F12-7F08-5ED6-C45A2AC75BB8}"/>
+              </a:ext>
+            </a:extLst>
+          </p:cNvPr>
+          <p:cNvSpPr/>
+          <p:nvPr/>
+        </p:nvSpPr>
+        <p:spPr>
+          <a:xfrm>
+            <a:off x="4907521" y="1023037"/>
+            <a:ext cx="3268812" cy="244982"/>
+          </a:xfrm>
+          <a:prstGeom prst="rect">
+            <a:avLst/>
+          </a:prstGeom>
+          <a:solidFill>
+            <a:schemeClr val="bg1"/>
+          </a:solidFill>
+          <a:ln>
+            <a:solidFill>
+              <a:schemeClr val="bg1"/>
+            </a:solidFill>
+          </a:ln>
+        </p:spPr>
+        <p:style>
+          <a:lnRef idx="2">
+            <a:schemeClr val="accent1">
+              <a:shade val="50000"/>
+            </a:schemeClr>
+          </a:lnRef>
+          <a:fillRef idx="1">
+            <a:schemeClr val="accent1"/>
+          </a:fillRef>
+          <a:effectRef idx="0">
+            <a:schemeClr val="accent1"/>
+          </a:effectRef>
+          <a:fontRef idx="minor">
+            <a:schemeClr val="lt1"/>
+          </a:fontRef>
+        </p:style>
+        <p:txBody>
+          <a:bodyPr rtlCol="0" anchor="ctr"/>
+          <a:lstStyle/>
+          <a:p>
+            <a:pPr algn="ctr"/>
+            <a:r>
+              <a:rPr lang="en-US" sz="2000" b="1" dirty="0">
+                <a:solidFill>
+                  <a:schemeClr val="tx1"/>
+                </a:solidFill>
+              </a:rPr>
+              <a:t>Next-&gt;bk = Prev</a:t>
+            </a:r>
+          </a:p>
+        </p:txBody>
+      </p:sp>
+      <p:sp>
+        <p:nvSpPr>
+          <p:cNvPr id="7" name="Rectangle 6">
+            <a:extLst>
+              <a:ext uri="{FF2B5EF4-FFF2-40B4-BE49-F238E27FC236}">
+                <a16:creationId xmlns:a16="http://schemas.microsoft.com/office/drawing/2014/main" id="{329CB856-4CBB-2C33-1BFD-872B3BD68834}"/>
+              </a:ext>
+            </a:extLst>
+          </p:cNvPr>
+          <p:cNvSpPr/>
+          <p:nvPr/>
+        </p:nvSpPr>
+        <p:spPr>
+          <a:xfrm>
+            <a:off x="5058661" y="1246728"/>
+            <a:ext cx="3268812" cy="244982"/>
+          </a:xfrm>
+          <a:prstGeom prst="rect">
+            <a:avLst/>
+          </a:prstGeom>
+          <a:solidFill>
+            <a:schemeClr val="bg1"/>
+          </a:solidFill>
+          <a:ln>
+            <a:solidFill>
+              <a:schemeClr val="bg1"/>
+            </a:solidFill>
+          </a:ln>
+        </p:spPr>
+        <p:style>
+          <a:lnRef idx="2">
+            <a:schemeClr val="accent1">
+              <a:shade val="50000"/>
+            </a:schemeClr>
+          </a:lnRef>
+          <a:fillRef idx="1">
+            <a:schemeClr val="accent1"/>
+          </a:fillRef>
+          <a:effectRef idx="0">
+            <a:schemeClr val="accent1"/>
+          </a:effectRef>
+          <a:fontRef idx="minor">
+            <a:schemeClr val="lt1"/>
+          </a:fontRef>
+        </p:style>
+        <p:txBody>
+          <a:bodyPr rtlCol="0" anchor="ctr"/>
+          <a:lstStyle/>
+          <a:p>
+            <a:pPr algn="ctr"/>
+            <a:r>
+              <a:rPr lang="en-US" sz="2000" b="1" dirty="0">
+                <a:solidFill>
+                  <a:schemeClr val="tx1"/>
+                </a:solidFill>
+              </a:rPr>
+              <a:t>Next + 0x18 = Prev</a:t>
+            </a:r>
+          </a:p>
+        </p:txBody>
+      </p:sp>
+      <p:sp>
+        <p:nvSpPr>
+          <p:cNvPr id="8" name="Rectangle 7">
+            <a:extLst>
+              <a:ext uri="{FF2B5EF4-FFF2-40B4-BE49-F238E27FC236}">
+                <a16:creationId xmlns:a16="http://schemas.microsoft.com/office/drawing/2014/main" id="{168D1D8A-089D-6CAA-A4C5-35EE55089930}"/>
+              </a:ext>
+            </a:extLst>
+          </p:cNvPr>
+          <p:cNvSpPr/>
+          <p:nvPr/>
+        </p:nvSpPr>
+        <p:spPr>
+          <a:xfrm>
+            <a:off x="5058661" y="1470419"/>
+            <a:ext cx="3268812" cy="244982"/>
+          </a:xfrm>
+          <a:prstGeom prst="rect">
+            <a:avLst/>
+          </a:prstGeom>
+          <a:solidFill>
+            <a:schemeClr val="bg1"/>
+          </a:solidFill>
+          <a:ln>
+            <a:solidFill>
+              <a:schemeClr val="bg1"/>
+            </a:solidFill>
+          </a:ln>
+        </p:spPr>
+        <p:style>
+          <a:lnRef idx="2">
+            <a:schemeClr val="accent1">
+              <a:shade val="50000"/>
+            </a:schemeClr>
+          </a:lnRef>
+          <a:fillRef idx="1">
+            <a:schemeClr val="accent1"/>
+          </a:fillRef>
+          <a:effectRef idx="0">
+            <a:schemeClr val="accent1"/>
+          </a:effectRef>
+          <a:fontRef idx="minor">
+            <a:schemeClr val="lt1"/>
+          </a:fontRef>
+        </p:style>
+        <p:txBody>
+          <a:bodyPr rtlCol="0" anchor="ctr"/>
+          <a:lstStyle/>
+          <a:p>
+            <a:pPr algn="ctr"/>
+            <a:r>
+              <a:rPr lang="en-US" sz="2000" b="1" dirty="0">
+                <a:solidFill>
+                  <a:srgbClr val="FF0000"/>
+                </a:solidFill>
+              </a:rPr>
+              <a:t>GOT + 0x18 = Prev</a:t>
+            </a:r>
+          </a:p>
+        </p:txBody>
+      </p:sp>
     </p:spTree>
     <p:extLst>
       <p:ext uri="{BB962C8B-B14F-4D97-AF65-F5344CB8AC3E}">
@@ -45758,8 +46901,8 @@
         </p:blipFill>
         <p:spPr>
           <a:xfrm>
-            <a:off x="5388883" y="1369219"/>
-            <a:ext cx="2366733" cy="3263504"/>
+            <a:off x="5336689" y="1109709"/>
+            <a:ext cx="2554932" cy="3523014"/>
           </a:xfrm>
           <a:prstGeom prst="rect">
             <a:avLst/>
@@ -45767,10 +46910,193 @@
           <a:noFill/>
         </p:spPr>
       </p:pic>
+      <p:sp>
+        <p:nvSpPr>
+          <p:cNvPr id="9" name="Rectangle 8">
+            <a:extLst>
+              <a:ext uri="{FF2B5EF4-FFF2-40B4-BE49-F238E27FC236}">
+                <a16:creationId xmlns:a16="http://schemas.microsoft.com/office/drawing/2014/main" id="{9FD57D7E-0FF2-3226-794F-5858EC8535FF}"/>
+              </a:ext>
+            </a:extLst>
+          </p:cNvPr>
+          <p:cNvSpPr/>
+          <p:nvPr/>
+        </p:nvSpPr>
+        <p:spPr>
+          <a:xfrm>
+            <a:off x="4907521" y="1023037"/>
+            <a:ext cx="3268812" cy="244982"/>
+          </a:xfrm>
+          <a:prstGeom prst="rect">
+            <a:avLst/>
+          </a:prstGeom>
+          <a:solidFill>
+            <a:schemeClr val="bg1"/>
+          </a:solidFill>
+          <a:ln>
+            <a:solidFill>
+              <a:schemeClr val="bg1"/>
+            </a:solidFill>
+          </a:ln>
+        </p:spPr>
+        <p:style>
+          <a:lnRef idx="2">
+            <a:schemeClr val="accent1">
+              <a:shade val="50000"/>
+            </a:schemeClr>
+          </a:lnRef>
+          <a:fillRef idx="1">
+            <a:schemeClr val="accent1"/>
+          </a:fillRef>
+          <a:effectRef idx="0">
+            <a:schemeClr val="accent1"/>
+          </a:effectRef>
+          <a:fontRef idx="minor">
+            <a:schemeClr val="lt1"/>
+          </a:fontRef>
+        </p:style>
+        <p:txBody>
+          <a:bodyPr rtlCol="0" anchor="ctr"/>
+          <a:lstStyle/>
+          <a:p>
+            <a:pPr algn="ctr"/>
+            <a:r>
+              <a:rPr lang="en-US" sz="2000" b="1" dirty="0">
+                <a:solidFill>
+                  <a:schemeClr val="tx1"/>
+                </a:solidFill>
+              </a:rPr>
+              <a:t>Next-&gt;bk = Prev</a:t>
+            </a:r>
+          </a:p>
+        </p:txBody>
+      </p:sp>
+      <p:sp>
+        <p:nvSpPr>
+          <p:cNvPr id="10" name="Rectangle 9">
+            <a:extLst>
+              <a:ext uri="{FF2B5EF4-FFF2-40B4-BE49-F238E27FC236}">
+                <a16:creationId xmlns:a16="http://schemas.microsoft.com/office/drawing/2014/main" id="{5C3487A0-A668-F00F-17E3-1D76703C828A}"/>
+              </a:ext>
+            </a:extLst>
+          </p:cNvPr>
+          <p:cNvSpPr/>
+          <p:nvPr/>
+        </p:nvSpPr>
+        <p:spPr>
+          <a:xfrm>
+            <a:off x="5058661" y="1246728"/>
+            <a:ext cx="3268812" cy="244982"/>
+          </a:xfrm>
+          <a:prstGeom prst="rect">
+            <a:avLst/>
+          </a:prstGeom>
+          <a:solidFill>
+            <a:schemeClr val="bg1"/>
+          </a:solidFill>
+          <a:ln>
+            <a:solidFill>
+              <a:schemeClr val="bg1"/>
+            </a:solidFill>
+          </a:ln>
+        </p:spPr>
+        <p:style>
+          <a:lnRef idx="2">
+            <a:schemeClr val="accent1">
+              <a:shade val="50000"/>
+            </a:schemeClr>
+          </a:lnRef>
+          <a:fillRef idx="1">
+            <a:schemeClr val="accent1"/>
+          </a:fillRef>
+          <a:effectRef idx="0">
+            <a:schemeClr val="accent1"/>
+          </a:effectRef>
+          <a:fontRef idx="minor">
+            <a:schemeClr val="lt1"/>
+          </a:fontRef>
+        </p:style>
+        <p:txBody>
+          <a:bodyPr rtlCol="0" anchor="ctr"/>
+          <a:lstStyle/>
+          <a:p>
+            <a:pPr algn="ctr"/>
+            <a:r>
+              <a:rPr lang="en-US" sz="2000" b="1" dirty="0">
+                <a:solidFill>
+                  <a:schemeClr val="tx1"/>
+                </a:solidFill>
+              </a:rPr>
+              <a:t>Next + 0x18 = Prev</a:t>
+            </a:r>
+          </a:p>
+        </p:txBody>
+      </p:sp>
+      <p:sp>
+        <p:nvSpPr>
+          <p:cNvPr id="11" name="Rectangle 10">
+            <a:extLst>
+              <a:ext uri="{FF2B5EF4-FFF2-40B4-BE49-F238E27FC236}">
+                <a16:creationId xmlns:a16="http://schemas.microsoft.com/office/drawing/2014/main" id="{4A636FCA-8A4A-60D4-62BA-F22F5CE16A70}"/>
+              </a:ext>
+            </a:extLst>
+          </p:cNvPr>
+          <p:cNvSpPr/>
+          <p:nvPr/>
+        </p:nvSpPr>
+        <p:spPr>
+          <a:xfrm>
+            <a:off x="5058661" y="1470419"/>
+            <a:ext cx="3268812" cy="244982"/>
+          </a:xfrm>
+          <a:prstGeom prst="rect">
+            <a:avLst/>
+          </a:prstGeom>
+          <a:solidFill>
+            <a:schemeClr val="bg1"/>
+          </a:solidFill>
+          <a:ln>
+            <a:solidFill>
+              <a:schemeClr val="bg1"/>
+            </a:solidFill>
+          </a:ln>
+        </p:spPr>
+        <p:style>
+          <a:lnRef idx="2">
+            <a:schemeClr val="accent1">
+              <a:shade val="50000"/>
+            </a:schemeClr>
+          </a:lnRef>
+          <a:fillRef idx="1">
+            <a:schemeClr val="accent1"/>
+          </a:fillRef>
+          <a:effectRef idx="0">
+            <a:schemeClr val="accent1"/>
+          </a:effectRef>
+          <a:fontRef idx="minor">
+            <a:schemeClr val="lt1"/>
+          </a:fontRef>
+        </p:style>
+        <p:txBody>
+          <a:bodyPr rtlCol="0" anchor="ctr"/>
+          <a:lstStyle/>
+          <a:p>
+            <a:pPr algn="ctr"/>
+            <a:r>
+              <a:rPr lang="en-US" sz="2000" b="1" dirty="0">
+                <a:solidFill>
+                  <a:srgbClr val="FF0000"/>
+                </a:solidFill>
+              </a:rPr>
+              <a:t>GOT + 0x18 = Prev</a:t>
+            </a:r>
+          </a:p>
+        </p:txBody>
+      </p:sp>
     </p:spTree>
     <p:extLst>
       <p:ext uri="{BB962C8B-B14F-4D97-AF65-F5344CB8AC3E}">
-        <p14:creationId xmlns:p14="http://schemas.microsoft.com/office/powerpoint/2010/main" val="3283990237"/>
+        <p14:creationId xmlns:p14="http://schemas.microsoft.com/office/powerpoint/2010/main" val="442752185"/>
       </p:ext>
     </p:extLst>
   </p:cSld>
@@ -46688,13 +48014,8 @@
             <a:pPr lvl="1"/>
             <a:r>
               <a:rPr lang="en-US" dirty="0"/>
-              <a:t>Not the same attack, but still a </a:t>
-            </a:r>
-            <a:r>
-              <a:rPr lang="en-US"/>
-              <a:t>powerful primitive</a:t>
-            </a:r>
-            <a:endParaRPr lang="en-US" dirty="0"/>
+              <a:t>Not the same attack, but still a powerful primitive</a:t>
+            </a:r>
           </a:p>
           <a:p>
             <a:r>
@@ -46761,7 +48082,7 @@
         </p:blipFill>
         <p:spPr>
           <a:xfrm>
-            <a:off x="176164" y="3358715"/>
+            <a:off x="571185" y="3753189"/>
             <a:ext cx="7886700" cy="1281587"/>
           </a:xfrm>
           <a:prstGeom prst="rect">
@@ -46786,7 +48107,7 @@
         </p:nvCxnSpPr>
         <p:spPr>
           <a:xfrm>
-            <a:off x="2771054" y="4393983"/>
+            <a:off x="3082351" y="4752428"/>
             <a:ext cx="2979297" cy="0"/>
           </a:xfrm>
           <a:prstGeom prst="line">
@@ -46848,7 +48169,7 @@
           <p:cNvPr id="2" name="Title 1">
             <a:extLst>
               <a:ext uri="{FF2B5EF4-FFF2-40B4-BE49-F238E27FC236}">
-                <a16:creationId xmlns:a16="http://schemas.microsoft.com/office/drawing/2014/main" id="{493DDB27-1B87-CB4F-9100-F10B92D42884}"/>
+                <a16:creationId xmlns:a16="http://schemas.microsoft.com/office/drawing/2014/main" id="{E9E670F8-AACA-D046-8E4F-17454C7527D7}"/>
               </a:ext>
             </a:extLst>
           </p:cNvPr>
@@ -46859,24 +48180,31 @@
             <p:ph type="title"/>
           </p:nvPr>
         </p:nvSpPr>
-        <p:spPr/>
+        <p:spPr>
+          <a:xfrm>
+            <a:off x="592585" y="0"/>
+            <a:ext cx="8418249" cy="994172"/>
+          </a:xfrm>
+        </p:spPr>
         <p:txBody>
-          <a:bodyPr/>
+          <a:bodyPr anchor="ctr">
+            <a:normAutofit/>
+          </a:bodyPr>
           <a:lstStyle/>
           <a:p>
             <a:r>
               <a:rPr lang="en-US" dirty="0"/>
-              <a:t>What about the Security Check?</a:t>
+              <a:t>Unsafe Unlink – Aftermath</a:t>
             </a:r>
           </a:p>
         </p:txBody>
       </p:sp>
       <p:sp>
         <p:nvSpPr>
-          <p:cNvPr id="3" name="Content Placeholder 2">
+          <p:cNvPr id="8" name="Content Placeholder 7">
             <a:extLst>
               <a:ext uri="{FF2B5EF4-FFF2-40B4-BE49-F238E27FC236}">
-                <a16:creationId xmlns:a16="http://schemas.microsoft.com/office/drawing/2014/main" id="{66773FD0-646F-3943-A87A-54D13598B121}"/>
+                <a16:creationId xmlns:a16="http://schemas.microsoft.com/office/drawing/2014/main" id="{3D35A732-1F45-D147-B0BB-44CB04EA56CF}"/>
               </a:ext>
             </a:extLst>
           </p:cNvPr>
@@ -46884,13 +48212,13 @@
             <a:spLocks noGrp="1"/>
           </p:cNvSpPr>
           <p:nvPr>
-            <p:ph idx="1"/>
+            <p:ph sz="half" idx="2"/>
           </p:nvPr>
         </p:nvSpPr>
         <p:spPr>
           <a:xfrm>
-            <a:off x="195017" y="1268019"/>
-            <a:ext cx="7886700" cy="3263504"/>
+            <a:off x="5395501" y="809926"/>
+            <a:ext cx="3615334" cy="3263504"/>
           </a:xfrm>
         </p:spPr>
         <p:txBody>
@@ -46899,67 +48227,67 @@
           <a:p>
             <a:r>
               <a:rPr lang="en-US" dirty="0"/>
-              <a:t>FD-&gt;bk = P</a:t>
+              <a:t>Corrupt the 3 previous values to our pointer.</a:t>
             </a:r>
           </a:p>
           <a:p>
             <a:r>
               <a:rPr lang="en-US" dirty="0"/>
-              <a:t>BK-&gt;fd = P</a:t>
+              <a:t>If list of pointers, this could be VERY useful!</a:t>
+            </a:r>
+          </a:p>
+          <a:p>
+            <a:r>
+              <a:rPr lang="en-US" dirty="0"/>
+              <a:t>If control </a:t>
+            </a:r>
+            <a:r>
+              <a:rPr lang="en-US" i="1" dirty="0"/>
+              <a:t>pointer to chunk,</a:t>
+            </a:r>
+            <a:r>
+              <a:rPr lang="en-US" dirty="0"/>
+              <a:t> we can edit this forever with our own values. </a:t>
             </a:r>
           </a:p>
           <a:p>
             <a:endParaRPr lang="en-US" dirty="0"/>
-          </a:p>
-          <a:p>
-            <a:endParaRPr lang="en-US" dirty="0"/>
-          </a:p>
-          <a:p>
-            <a:endParaRPr lang="en-US" dirty="0"/>
-          </a:p>
-          <a:p>
-            <a:r>
-              <a:rPr lang="en-US" dirty="0"/>
-              <a:t>Seems indestructible, right?</a:t>
-            </a:r>
           </a:p>
         </p:txBody>
       </p:sp>
       <p:pic>
         <p:nvPicPr>
-          <p:cNvPr id="4" name="Content Placeholder 4" descr="Unsorted bin linked list diagram">
+          <p:cNvPr id="12" name="Content Placeholder 11" descr="Overwriting the data around the pointers">
             <a:extLst>
               <a:ext uri="{FF2B5EF4-FFF2-40B4-BE49-F238E27FC236}">
-                <a16:creationId xmlns:a16="http://schemas.microsoft.com/office/drawing/2014/main" id="{6860FAAE-19C7-DB41-ABA6-565577905DD2}"/>
+                <a16:creationId xmlns:a16="http://schemas.microsoft.com/office/drawing/2014/main" id="{E1519185-0BB1-D04B-8DC0-36FD123B0481}"/>
               </a:ext>
             </a:extLst>
           </p:cNvPr>
           <p:cNvPicPr>
-            <a:picLocks noChangeAspect="1"/>
+            <a:picLocks noGrp="1" noChangeAspect="1"/>
           </p:cNvPicPr>
-          <p:nvPr/>
+          <p:nvPr>
+            <p:ph sz="half" idx="1"/>
+          </p:nvPr>
         </p:nvPicPr>
         <p:blipFill>
-          <a:blip r:embed="rId3"/>
+          <a:blip r:embed="rId2"/>
           <a:stretch>
             <a:fillRect/>
           </a:stretch>
         </p:blipFill>
         <p:spPr>
           <a:xfrm>
-            <a:off x="2506280" y="1131232"/>
-            <a:ext cx="6009070" cy="2261917"/>
+            <a:off x="210843" y="1008802"/>
+            <a:ext cx="4777767" cy="2725572"/>
           </a:xfrm>
-          <a:prstGeom prst="rect">
-            <a:avLst/>
-          </a:prstGeom>
-          <a:noFill/>
         </p:spPr>
       </p:pic>
     </p:spTree>
     <p:extLst>
       <p:ext uri="{BB962C8B-B14F-4D97-AF65-F5344CB8AC3E}">
-        <p14:creationId xmlns:p14="http://schemas.microsoft.com/office/powerpoint/2010/main" val="532587959"/>
+        <p14:creationId xmlns:p14="http://schemas.microsoft.com/office/powerpoint/2010/main" val="563784693"/>
       </p:ext>
     </p:extLst>
   </p:cSld>
@@ -47285,6 +48613,149 @@
 </file>
 
 <file path=ppt/slides/slide80.xml><?xml version="1.0" encoding="utf-8"?>
+<p:sld xmlns:a="http://schemas.openxmlformats.org/drawingml/2006/main" xmlns:r="http://schemas.openxmlformats.org/officeDocument/2006/relationships" xmlns:p="http://schemas.openxmlformats.org/presentationml/2006/main">
+  <p:cSld>
+    <p:spTree>
+      <p:nvGrpSpPr>
+        <p:cNvPr id="1" name=""/>
+        <p:cNvGrpSpPr/>
+        <p:nvPr/>
+      </p:nvGrpSpPr>
+      <p:grpSpPr>
+        <a:xfrm>
+          <a:off x="0" y="0"/>
+          <a:ext cx="0" cy="0"/>
+          <a:chOff x="0" y="0"/>
+          <a:chExt cx="0" cy="0"/>
+        </a:xfrm>
+      </p:grpSpPr>
+      <p:sp>
+        <p:nvSpPr>
+          <p:cNvPr id="2" name="Title 1">
+            <a:extLst>
+              <a:ext uri="{FF2B5EF4-FFF2-40B4-BE49-F238E27FC236}">
+                <a16:creationId xmlns:a16="http://schemas.microsoft.com/office/drawing/2014/main" id="{493DDB27-1B87-CB4F-9100-F10B92D42884}"/>
+              </a:ext>
+            </a:extLst>
+          </p:cNvPr>
+          <p:cNvSpPr>
+            <a:spLocks noGrp="1"/>
+          </p:cNvSpPr>
+          <p:nvPr>
+            <p:ph type="title"/>
+          </p:nvPr>
+        </p:nvSpPr>
+        <p:spPr/>
+        <p:txBody>
+          <a:bodyPr/>
+          <a:lstStyle/>
+          <a:p>
+            <a:r>
+              <a:rPr lang="en-US" dirty="0"/>
+              <a:t>What about the Security Check?</a:t>
+            </a:r>
+          </a:p>
+        </p:txBody>
+      </p:sp>
+      <p:sp>
+        <p:nvSpPr>
+          <p:cNvPr id="3" name="Content Placeholder 2">
+            <a:extLst>
+              <a:ext uri="{FF2B5EF4-FFF2-40B4-BE49-F238E27FC236}">
+                <a16:creationId xmlns:a16="http://schemas.microsoft.com/office/drawing/2014/main" id="{66773FD0-646F-3943-A87A-54D13598B121}"/>
+              </a:ext>
+            </a:extLst>
+          </p:cNvPr>
+          <p:cNvSpPr>
+            <a:spLocks noGrp="1"/>
+          </p:cNvSpPr>
+          <p:nvPr>
+            <p:ph idx="1"/>
+          </p:nvPr>
+        </p:nvSpPr>
+        <p:spPr>
+          <a:xfrm>
+            <a:off x="195017" y="1268019"/>
+            <a:ext cx="7886700" cy="3263504"/>
+          </a:xfrm>
+        </p:spPr>
+        <p:txBody>
+          <a:bodyPr/>
+          <a:lstStyle/>
+          <a:p>
+            <a:r>
+              <a:rPr lang="en-US" dirty="0"/>
+              <a:t>Next-&gt;bk = Prev</a:t>
+            </a:r>
+          </a:p>
+          <a:p>
+            <a:r>
+              <a:rPr lang="en-US" dirty="0"/>
+              <a:t>Prev-&gt;fd = Next</a:t>
+            </a:r>
+          </a:p>
+          <a:p>
+            <a:endParaRPr lang="en-US" dirty="0"/>
+          </a:p>
+          <a:p>
+            <a:endParaRPr lang="en-US" dirty="0"/>
+          </a:p>
+          <a:p>
+            <a:endParaRPr lang="en-US" dirty="0"/>
+          </a:p>
+          <a:p>
+            <a:r>
+              <a:rPr lang="en-US" dirty="0"/>
+              <a:t>Seems indestructible, right?</a:t>
+            </a:r>
+          </a:p>
+        </p:txBody>
+      </p:sp>
+      <p:pic>
+        <p:nvPicPr>
+          <p:cNvPr id="4" name="Content Placeholder 4" descr="Unsorted bin linked list diagram">
+            <a:extLst>
+              <a:ext uri="{FF2B5EF4-FFF2-40B4-BE49-F238E27FC236}">
+                <a16:creationId xmlns:a16="http://schemas.microsoft.com/office/drawing/2014/main" id="{6860FAAE-19C7-DB41-ABA6-565577905DD2}"/>
+              </a:ext>
+            </a:extLst>
+          </p:cNvPr>
+          <p:cNvPicPr>
+            <a:picLocks noChangeAspect="1"/>
+          </p:cNvPicPr>
+          <p:nvPr/>
+        </p:nvPicPr>
+        <p:blipFill>
+          <a:blip r:embed="rId3"/>
+          <a:stretch>
+            <a:fillRect/>
+          </a:stretch>
+        </p:blipFill>
+        <p:spPr>
+          <a:xfrm>
+            <a:off x="2737099" y="1131232"/>
+            <a:ext cx="6009070" cy="2261917"/>
+          </a:xfrm>
+          <a:prstGeom prst="rect">
+            <a:avLst/>
+          </a:prstGeom>
+          <a:noFill/>
+        </p:spPr>
+      </p:pic>
+    </p:spTree>
+    <p:extLst>
+      <p:ext uri="{BB962C8B-B14F-4D97-AF65-F5344CB8AC3E}">
+        <p14:creationId xmlns:p14="http://schemas.microsoft.com/office/powerpoint/2010/main" val="532587959"/>
+      </p:ext>
+    </p:extLst>
+  </p:cSld>
+  <p:clrMapOvr>
+    <a:masterClrMapping/>
+  </p:clrMapOvr>
+</p:sld>
+</file>
+
+<file path=ppt/slides/slide81.xml><?xml version="1.0" encoding="utf-8"?>
 <p:sld xmlns:a="http://schemas.openxmlformats.org/drawingml/2006/main" xmlns:r="http://schemas.openxmlformats.org/officeDocument/2006/relationships" xmlns:p="http://schemas.openxmlformats.org/presentationml/2006/main">
   <p:cSld>
     <p:spTree>
@@ -47541,7 +49012,7 @@
 </p:sld>
 </file>
 
-<file path=ppt/slides/slide81.xml><?xml version="1.0" encoding="utf-8"?>
+<file path=ppt/slides/slide82.xml><?xml version="1.0" encoding="utf-8"?>
 <p:sld xmlns:a="http://schemas.openxmlformats.org/drawingml/2006/main" xmlns:r="http://schemas.openxmlformats.org/officeDocument/2006/relationships" xmlns:p="http://schemas.openxmlformats.org/presentationml/2006/main">
   <p:cSld>
     <p:spTree>
@@ -47719,7 +49190,7 @@
 </p:sld>
 </file>
 
-<file path=ppt/slides/slide82.xml><?xml version="1.0" encoding="utf-8"?>
+<file path=ppt/slides/slide83.xml><?xml version="1.0" encoding="utf-8"?>
 <p:sld xmlns:a="http://schemas.openxmlformats.org/drawingml/2006/main" xmlns:r="http://schemas.openxmlformats.org/officeDocument/2006/relationships" xmlns:p="http://schemas.openxmlformats.org/presentationml/2006/main">
   <p:cSld>
     <p:spTree>
@@ -47861,7 +49332,7 @@
 </p:sld>
 </file>
 
-<file path=ppt/slides/slide83.xml><?xml version="1.0" encoding="utf-8"?>
+<file path=ppt/slides/slide84.xml><?xml version="1.0" encoding="utf-8"?>
 <p:sld xmlns:a="http://schemas.openxmlformats.org/drawingml/2006/main" xmlns:r="http://schemas.openxmlformats.org/officeDocument/2006/relationships" xmlns:p="http://schemas.openxmlformats.org/presentationml/2006/main">
   <p:cSld>
     <p:spTree>
@@ -47999,7 +49470,7 @@
 </p:sld>
 </file>
 
-<file path=ppt/slides/slide84.xml><?xml version="1.0" encoding="utf-8"?>
+<file path=ppt/slides/slide85.xml><?xml version="1.0" encoding="utf-8"?>
 <p:sld xmlns:a="http://schemas.openxmlformats.org/drawingml/2006/main" xmlns:r="http://schemas.openxmlformats.org/officeDocument/2006/relationships" xmlns:p="http://schemas.openxmlformats.org/presentationml/2006/main">
   <p:cSld>
     <p:spTree>
@@ -48156,8 +49627,8 @@
 </p:sld>
 </file>
 
-<file path=ppt/slides/slide85.xml><?xml version="1.0" encoding="utf-8"?>
-<p:sld xmlns:a="http://schemas.openxmlformats.org/drawingml/2006/main" xmlns:r="http://schemas.openxmlformats.org/officeDocument/2006/relationships" xmlns:p="http://schemas.openxmlformats.org/presentationml/2006/main">
+<file path=ppt/slides/slide86.xml><?xml version="1.0" encoding="utf-8"?>
+<p:sld xmlns:a="http://schemas.openxmlformats.org/drawingml/2006/main" xmlns:r="http://schemas.openxmlformats.org/officeDocument/2006/relationships" xmlns:p="http://schemas.openxmlformats.org/presentationml/2006/main" show="0">
   <p:cSld>
     <p:spTree>
       <p:nvGrpSpPr>
@@ -48413,7 +49884,7 @@
 </p:sld>
 </file>
 
-<file path=ppt/slides/slide86.xml><?xml version="1.0" encoding="utf-8"?>
+<file path=ppt/slides/slide87.xml><?xml version="1.0" encoding="utf-8"?>
 <p:sld xmlns:a="http://schemas.openxmlformats.org/drawingml/2006/main" xmlns:r="http://schemas.openxmlformats.org/officeDocument/2006/relationships" xmlns:p="http://schemas.openxmlformats.org/presentationml/2006/main">
   <p:cSld>
     <p:spTree>
@@ -48493,13 +49964,13 @@
           <a:p>
             <a:r>
               <a:rPr lang="en-US" dirty="0"/>
-              <a:t>Next&gt;bk = P</a:t>
+              <a:t>Next&gt;bk = Cur</a:t>
             </a:r>
           </a:p>
           <a:p>
             <a:r>
               <a:rPr lang="en-US" dirty="0"/>
-              <a:t>Prev&gt;fd = P</a:t>
+              <a:t>Prev&gt;fd = Cur</a:t>
             </a:r>
           </a:p>
           <a:p>
@@ -48567,7 +50038,7 @@
 </p:sld>
 </file>
 
-<file path=ppt/slides/slide87.xml><?xml version="1.0" encoding="utf-8"?>
+<file path=ppt/slides/slide88.xml><?xml version="1.0" encoding="utf-8"?>
 <p:sld xmlns:a="http://schemas.openxmlformats.org/drawingml/2006/main" xmlns:r="http://schemas.openxmlformats.org/officeDocument/2006/relationships" xmlns:p="http://schemas.openxmlformats.org/presentationml/2006/main">
   <p:cSld>
     <p:spTree>
@@ -48799,7 +50270,7 @@
 </p:sld>
 </file>
 
-<file path=ppt/slides/slide88.xml><?xml version="1.0" encoding="utf-8"?>
+<file path=ppt/slides/slide89.xml><?xml version="1.0" encoding="utf-8"?>
 <p:sld xmlns:a="http://schemas.openxmlformats.org/drawingml/2006/main" xmlns:r="http://schemas.openxmlformats.org/officeDocument/2006/relationships" xmlns:p="http://schemas.openxmlformats.org/presentationml/2006/main">
   <p:cSld>
     <p:spTree>
@@ -49031,7 +50502,318 @@
 </p:sld>
 </file>
 
-<file path=ppt/slides/slide89.xml><?xml version="1.0" encoding="utf-8"?>
+<file path=ppt/slides/slide9.xml><?xml version="1.0" encoding="utf-8"?>
+<p:sld xmlns:a="http://schemas.openxmlformats.org/drawingml/2006/main" xmlns:r="http://schemas.openxmlformats.org/officeDocument/2006/relationships" xmlns:p="http://schemas.openxmlformats.org/presentationml/2006/main">
+  <p:cSld>
+    <p:spTree>
+      <p:nvGrpSpPr>
+        <p:cNvPr id="1" name=""/>
+        <p:cNvGrpSpPr/>
+        <p:nvPr/>
+      </p:nvGrpSpPr>
+      <p:grpSpPr>
+        <a:xfrm>
+          <a:off x="0" y="0"/>
+          <a:ext cx="0" cy="0"/>
+          <a:chOff x="0" y="0"/>
+          <a:chExt cx="0" cy="0"/>
+        </a:xfrm>
+      </p:grpSpPr>
+      <p:sp>
+        <p:nvSpPr>
+          <p:cNvPr id="2" name="Title 1">
+            <a:extLst>
+              <a:ext uri="{FF2B5EF4-FFF2-40B4-BE49-F238E27FC236}">
+                <a16:creationId xmlns:a16="http://schemas.microsoft.com/office/drawing/2014/main" id="{6BEB7CF1-743A-D74C-AC52-B586D7683293}"/>
+              </a:ext>
+            </a:extLst>
+          </p:cNvPr>
+          <p:cNvSpPr>
+            <a:spLocks noGrp="1"/>
+          </p:cNvSpPr>
+          <p:nvPr>
+            <p:ph type="title"/>
+          </p:nvPr>
+        </p:nvSpPr>
+        <p:spPr>
+          <a:xfrm>
+            <a:off x="628650" y="273847"/>
+            <a:ext cx="7886700" cy="994172"/>
+          </a:xfrm>
+        </p:spPr>
+        <p:txBody>
+          <a:bodyPr anchor="ctr">
+            <a:normAutofit/>
+          </a:bodyPr>
+          <a:lstStyle/>
+          <a:p>
+            <a:r>
+              <a:rPr lang="en-US" dirty="0"/>
+              <a:t>Code Review! (answers)</a:t>
+            </a:r>
+          </a:p>
+        </p:txBody>
+      </p:sp>
+      <p:pic>
+        <p:nvPicPr>
+          <p:cNvPr id="5" name="Content Placeholder 4" descr="A screen shot of a social media post&#10;&#10;Description automatically generated">
+            <a:extLst>
+              <a:ext uri="{FF2B5EF4-FFF2-40B4-BE49-F238E27FC236}">
+                <a16:creationId xmlns:a16="http://schemas.microsoft.com/office/drawing/2014/main" id="{2079519E-7C78-EC4D-84CF-60D0BE06D9AF}"/>
+              </a:ext>
+            </a:extLst>
+          </p:cNvPr>
+          <p:cNvPicPr>
+            <a:picLocks noGrp="1" noChangeAspect="1"/>
+          </p:cNvPicPr>
+          <p:nvPr>
+            <p:ph sz="half" idx="1"/>
+          </p:nvPr>
+        </p:nvPicPr>
+        <p:blipFill>
+          <a:blip r:embed="rId2"/>
+          <a:stretch>
+            <a:fillRect/>
+          </a:stretch>
+        </p:blipFill>
+        <p:spPr>
+          <a:xfrm>
+            <a:off x="79963" y="1318619"/>
+            <a:ext cx="4492037" cy="1669701"/>
+          </a:xfrm>
+          <a:noFill/>
+        </p:spPr>
+      </p:pic>
+      <p:sp>
+        <p:nvSpPr>
+          <p:cNvPr id="10" name="Content Placeholder 3">
+            <a:extLst>
+              <a:ext uri="{FF2B5EF4-FFF2-40B4-BE49-F238E27FC236}">
+                <a16:creationId xmlns:a16="http://schemas.microsoft.com/office/drawing/2014/main" id="{79B45F60-0363-424B-9E27-65854133F913}"/>
+              </a:ext>
+            </a:extLst>
+          </p:cNvPr>
+          <p:cNvSpPr>
+            <a:spLocks noGrp="1"/>
+          </p:cNvSpPr>
+          <p:nvPr>
+            <p:ph sz="half" idx="2"/>
+          </p:nvPr>
+        </p:nvSpPr>
+        <p:spPr>
+          <a:xfrm>
+            <a:off x="4572001" y="1369219"/>
+            <a:ext cx="4492036" cy="3263504"/>
+          </a:xfrm>
+        </p:spPr>
+        <p:txBody>
+          <a:bodyPr>
+            <a:normAutofit/>
+          </a:bodyPr>
+          <a:lstStyle/>
+          <a:p>
+            <a:r>
+              <a:rPr lang="en-US" dirty="0"/>
+              <a:t>Inside of </a:t>
+            </a:r>
+            <a:r>
+              <a:rPr lang="en-US" i="1" dirty="0"/>
+              <a:t>free</a:t>
+            </a:r>
+            <a:r>
+              <a:rPr lang="en-US" dirty="0"/>
+              <a:t> (_</a:t>
+            </a:r>
+            <a:r>
+              <a:rPr lang="en-US" dirty="0" err="1"/>
+              <a:t>int_free</a:t>
+            </a:r>
+            <a:r>
+              <a:rPr lang="en-US" dirty="0"/>
+              <a:t>)</a:t>
+            </a:r>
+          </a:p>
+          <a:p>
+            <a:r>
+              <a:rPr lang="en-US" dirty="0"/>
+              <a:t>p: current chunk being freed</a:t>
+            </a:r>
+          </a:p>
+          <a:p>
+            <a:r>
+              <a:rPr lang="en-US" dirty="0"/>
+              <a:t>size: size of p</a:t>
+            </a:r>
+          </a:p>
+          <a:p>
+            <a:r>
+              <a:rPr lang="en-US" dirty="0"/>
+              <a:t>Answers: </a:t>
+            </a:r>
+          </a:p>
+          <a:p>
+            <a:pPr marL="457200" lvl="1" indent="0">
+              <a:buNone/>
+            </a:pPr>
+            <a:r>
+              <a:rPr lang="en-US" dirty="0"/>
+              <a:t>1. Is the </a:t>
+            </a:r>
+            <a:r>
+              <a:rPr lang="en-US" i="1" dirty="0"/>
+              <a:t>previous</a:t>
+            </a:r>
+            <a:r>
+              <a:rPr lang="en-US" dirty="0"/>
+              <a:t> chunk free (checks via the </a:t>
+            </a:r>
+            <a:r>
+              <a:rPr lang="en-US" i="1" dirty="0" err="1"/>
+              <a:t>prev_inuse</a:t>
+            </a:r>
+            <a:r>
+              <a:rPr lang="en-US" dirty="0"/>
+              <a:t> bit)</a:t>
+            </a:r>
+          </a:p>
+          <a:p>
+            <a:pPr marL="457200" lvl="1" indent="0">
+              <a:buNone/>
+            </a:pPr>
+            <a:r>
+              <a:rPr lang="en-US" dirty="0"/>
+              <a:t>2. Current chunk – </a:t>
+            </a:r>
+            <a:r>
+              <a:rPr lang="en-US" i="1" dirty="0"/>
+              <a:t>prev_size</a:t>
+            </a:r>
+            <a:endParaRPr lang="en-US" dirty="0"/>
+          </a:p>
+        </p:txBody>
+      </p:sp>
+      <p:sp>
+        <p:nvSpPr>
+          <p:cNvPr id="6" name="TextBox 5">
+            <a:extLst>
+              <a:ext uri="{FF2B5EF4-FFF2-40B4-BE49-F238E27FC236}">
+                <a16:creationId xmlns:a16="http://schemas.microsoft.com/office/drawing/2014/main" id="{6ED31DE9-D4DA-BB47-8961-1227E69BE052}"/>
+              </a:ext>
+            </a:extLst>
+          </p:cNvPr>
+          <p:cNvSpPr txBox="1"/>
+          <p:nvPr/>
+        </p:nvSpPr>
+        <p:spPr>
+          <a:xfrm>
+            <a:off x="2107770" y="1329919"/>
+            <a:ext cx="604434" cy="584775"/>
+          </a:xfrm>
+          <a:prstGeom prst="rect">
+            <a:avLst/>
+          </a:prstGeom>
+          <a:noFill/>
+        </p:spPr>
+        <p:txBody>
+          <a:bodyPr wrap="square" rtlCol="0">
+            <a:spAutoFit/>
+          </a:bodyPr>
+          <a:lstStyle/>
+          <a:p>
+            <a:r>
+              <a:rPr lang="en-US" sz="3200" dirty="0">
+                <a:solidFill>
+                  <a:srgbClr val="FF0000"/>
+                </a:solidFill>
+              </a:rPr>
+              <a:t>1)</a:t>
+            </a:r>
+          </a:p>
+        </p:txBody>
+      </p:sp>
+      <p:sp>
+        <p:nvSpPr>
+          <p:cNvPr id="8" name="TextBox 7">
+            <a:extLst>
+              <a:ext uri="{FF2B5EF4-FFF2-40B4-BE49-F238E27FC236}">
+                <a16:creationId xmlns:a16="http://schemas.microsoft.com/office/drawing/2014/main" id="{A3757472-D2AA-4E4C-9568-9C2638FD134D}"/>
+              </a:ext>
+            </a:extLst>
+          </p:cNvPr>
+          <p:cNvSpPr txBox="1"/>
+          <p:nvPr/>
+        </p:nvSpPr>
+        <p:spPr>
+          <a:xfrm>
+            <a:off x="4192868" y="2052290"/>
+            <a:ext cx="604434" cy="584775"/>
+          </a:xfrm>
+          <a:prstGeom prst="rect">
+            <a:avLst/>
+          </a:prstGeom>
+          <a:noFill/>
+        </p:spPr>
+        <p:txBody>
+          <a:bodyPr wrap="square" rtlCol="0">
+            <a:spAutoFit/>
+          </a:bodyPr>
+          <a:lstStyle/>
+          <a:p>
+            <a:r>
+              <a:rPr lang="en-US" sz="3200" dirty="0">
+                <a:solidFill>
+                  <a:srgbClr val="FF0000"/>
+                </a:solidFill>
+              </a:rPr>
+              <a:t>2)</a:t>
+            </a:r>
+          </a:p>
+        </p:txBody>
+      </p:sp>
+      <p:pic>
+        <p:nvPicPr>
+          <p:cNvPr id="7" name="Picture 6" descr="A screenshot of a cell phone&#10;&#10;Description automatically generated">
+            <a:extLst>
+              <a:ext uri="{FF2B5EF4-FFF2-40B4-BE49-F238E27FC236}">
+                <a16:creationId xmlns:a16="http://schemas.microsoft.com/office/drawing/2014/main" id="{5A43FD0D-659D-AA4B-A33F-4ABB12D11E05}"/>
+              </a:ext>
+            </a:extLst>
+          </p:cNvPr>
+          <p:cNvPicPr>
+            <a:picLocks noChangeAspect="1"/>
+          </p:cNvPicPr>
+          <p:nvPr/>
+        </p:nvPicPr>
+        <p:blipFill>
+          <a:blip r:embed="rId3"/>
+          <a:stretch>
+            <a:fillRect/>
+          </a:stretch>
+        </p:blipFill>
+        <p:spPr>
+          <a:xfrm>
+            <a:off x="130381" y="3038920"/>
+            <a:ext cx="1783479" cy="1983229"/>
+          </a:xfrm>
+          <a:prstGeom prst="rect">
+            <a:avLst/>
+          </a:prstGeom>
+        </p:spPr>
+      </p:pic>
+    </p:spTree>
+    <p:extLst>
+      <p:ext uri="{BB962C8B-B14F-4D97-AF65-F5344CB8AC3E}">
+        <p14:creationId xmlns:p14="http://schemas.microsoft.com/office/powerpoint/2010/main" val="1384499838"/>
+      </p:ext>
+    </p:extLst>
+  </p:cSld>
+  <p:clrMapOvr>
+    <a:masterClrMapping/>
+  </p:clrMapOvr>
+</p:sld>
+</file>
+
+<file path=ppt/slides/slide90.xml><?xml version="1.0" encoding="utf-8"?>
 <p:sld xmlns:a="http://schemas.openxmlformats.org/drawingml/2006/main" xmlns:r="http://schemas.openxmlformats.org/officeDocument/2006/relationships" xmlns:p="http://schemas.openxmlformats.org/presentationml/2006/main">
   <p:cSld>
     <p:spTree>
@@ -49190,7 +50972,7 @@
             </a:pPr>
             <a:r>
               <a:rPr lang="en-US" sz="2500" dirty="0"/>
-              <a:t>FD-&gt;bk = Pointer!</a:t>
+              <a:t>Next-&gt;bk = Pointer!</a:t>
             </a:r>
           </a:p>
           <a:p>
@@ -49200,7 +50982,7 @@
             </a:pPr>
             <a:r>
               <a:rPr lang="en-US" sz="2500" dirty="0"/>
-              <a:t>BK-&gt;fd = Pointer!</a:t>
+              <a:t>Prev-&gt;fd = Pointer!</a:t>
             </a:r>
           </a:p>
           <a:p>
@@ -49268,318 +51050,7 @@
 </p:sld>
 </file>
 
-<file path=ppt/slides/slide9.xml><?xml version="1.0" encoding="utf-8"?>
-<p:sld xmlns:a="http://schemas.openxmlformats.org/drawingml/2006/main" xmlns:r="http://schemas.openxmlformats.org/officeDocument/2006/relationships" xmlns:p="http://schemas.openxmlformats.org/presentationml/2006/main">
-  <p:cSld>
-    <p:spTree>
-      <p:nvGrpSpPr>
-        <p:cNvPr id="1" name=""/>
-        <p:cNvGrpSpPr/>
-        <p:nvPr/>
-      </p:nvGrpSpPr>
-      <p:grpSpPr>
-        <a:xfrm>
-          <a:off x="0" y="0"/>
-          <a:ext cx="0" cy="0"/>
-          <a:chOff x="0" y="0"/>
-          <a:chExt cx="0" cy="0"/>
-        </a:xfrm>
-      </p:grpSpPr>
-      <p:sp>
-        <p:nvSpPr>
-          <p:cNvPr id="2" name="Title 1">
-            <a:extLst>
-              <a:ext uri="{FF2B5EF4-FFF2-40B4-BE49-F238E27FC236}">
-                <a16:creationId xmlns:a16="http://schemas.microsoft.com/office/drawing/2014/main" id="{6BEB7CF1-743A-D74C-AC52-B586D7683293}"/>
-              </a:ext>
-            </a:extLst>
-          </p:cNvPr>
-          <p:cNvSpPr>
-            <a:spLocks noGrp="1"/>
-          </p:cNvSpPr>
-          <p:nvPr>
-            <p:ph type="title"/>
-          </p:nvPr>
-        </p:nvSpPr>
-        <p:spPr>
-          <a:xfrm>
-            <a:off x="628650" y="273847"/>
-            <a:ext cx="7886700" cy="994172"/>
-          </a:xfrm>
-        </p:spPr>
-        <p:txBody>
-          <a:bodyPr anchor="ctr">
-            <a:normAutofit/>
-          </a:bodyPr>
-          <a:lstStyle/>
-          <a:p>
-            <a:r>
-              <a:rPr lang="en-US" dirty="0"/>
-              <a:t>Code Review! (answers)</a:t>
-            </a:r>
-          </a:p>
-        </p:txBody>
-      </p:sp>
-      <p:pic>
-        <p:nvPicPr>
-          <p:cNvPr id="5" name="Content Placeholder 4" descr="A screen shot of a social media post&#10;&#10;Description automatically generated">
-            <a:extLst>
-              <a:ext uri="{FF2B5EF4-FFF2-40B4-BE49-F238E27FC236}">
-                <a16:creationId xmlns:a16="http://schemas.microsoft.com/office/drawing/2014/main" id="{2079519E-7C78-EC4D-84CF-60D0BE06D9AF}"/>
-              </a:ext>
-            </a:extLst>
-          </p:cNvPr>
-          <p:cNvPicPr>
-            <a:picLocks noGrp="1" noChangeAspect="1"/>
-          </p:cNvPicPr>
-          <p:nvPr>
-            <p:ph sz="half" idx="1"/>
-          </p:nvPr>
-        </p:nvPicPr>
-        <p:blipFill>
-          <a:blip r:embed="rId2"/>
-          <a:stretch>
-            <a:fillRect/>
-          </a:stretch>
-        </p:blipFill>
-        <p:spPr>
-          <a:xfrm>
-            <a:off x="79963" y="1318619"/>
-            <a:ext cx="4492037" cy="1669701"/>
-          </a:xfrm>
-          <a:noFill/>
-        </p:spPr>
-      </p:pic>
-      <p:sp>
-        <p:nvSpPr>
-          <p:cNvPr id="10" name="Content Placeholder 3">
-            <a:extLst>
-              <a:ext uri="{FF2B5EF4-FFF2-40B4-BE49-F238E27FC236}">
-                <a16:creationId xmlns:a16="http://schemas.microsoft.com/office/drawing/2014/main" id="{79B45F60-0363-424B-9E27-65854133F913}"/>
-              </a:ext>
-            </a:extLst>
-          </p:cNvPr>
-          <p:cNvSpPr>
-            <a:spLocks noGrp="1"/>
-          </p:cNvSpPr>
-          <p:nvPr>
-            <p:ph sz="half" idx="2"/>
-          </p:nvPr>
-        </p:nvSpPr>
-        <p:spPr>
-          <a:xfrm>
-            <a:off x="4572001" y="1369219"/>
-            <a:ext cx="4492036" cy="3263504"/>
-          </a:xfrm>
-        </p:spPr>
-        <p:txBody>
-          <a:bodyPr>
-            <a:normAutofit/>
-          </a:bodyPr>
-          <a:lstStyle/>
-          <a:p>
-            <a:r>
-              <a:rPr lang="en-US" dirty="0"/>
-              <a:t>Inside of </a:t>
-            </a:r>
-            <a:r>
-              <a:rPr lang="en-US" i="1" dirty="0"/>
-              <a:t>free</a:t>
-            </a:r>
-            <a:r>
-              <a:rPr lang="en-US" dirty="0"/>
-              <a:t> (_</a:t>
-            </a:r>
-            <a:r>
-              <a:rPr lang="en-US" dirty="0" err="1"/>
-              <a:t>int_free</a:t>
-            </a:r>
-            <a:r>
-              <a:rPr lang="en-US" dirty="0"/>
-              <a:t>)</a:t>
-            </a:r>
-          </a:p>
-          <a:p>
-            <a:r>
-              <a:rPr lang="en-US" dirty="0"/>
-              <a:t>p: current chunk being freed</a:t>
-            </a:r>
-          </a:p>
-          <a:p>
-            <a:r>
-              <a:rPr lang="en-US" dirty="0"/>
-              <a:t>size: size of p</a:t>
-            </a:r>
-          </a:p>
-          <a:p>
-            <a:r>
-              <a:rPr lang="en-US" dirty="0"/>
-              <a:t>Answers: </a:t>
-            </a:r>
-          </a:p>
-          <a:p>
-            <a:pPr marL="457200" lvl="1" indent="0">
-              <a:buNone/>
-            </a:pPr>
-            <a:r>
-              <a:rPr lang="en-US" dirty="0"/>
-              <a:t>1. Is the </a:t>
-            </a:r>
-            <a:r>
-              <a:rPr lang="en-US" i="1" dirty="0"/>
-              <a:t>previous</a:t>
-            </a:r>
-            <a:r>
-              <a:rPr lang="en-US" dirty="0"/>
-              <a:t> chunk free (checks via the </a:t>
-            </a:r>
-            <a:r>
-              <a:rPr lang="en-US" i="1" dirty="0" err="1"/>
-              <a:t>prev_inuse</a:t>
-            </a:r>
-            <a:r>
-              <a:rPr lang="en-US" dirty="0"/>
-              <a:t> bit)</a:t>
-            </a:r>
-          </a:p>
-          <a:p>
-            <a:pPr marL="457200" lvl="1" indent="0">
-              <a:buNone/>
-            </a:pPr>
-            <a:r>
-              <a:rPr lang="en-US" dirty="0"/>
-              <a:t>2. Current chunk – </a:t>
-            </a:r>
-            <a:r>
-              <a:rPr lang="en-US" i="1" dirty="0"/>
-              <a:t>prev_size</a:t>
-            </a:r>
-            <a:endParaRPr lang="en-US" dirty="0"/>
-          </a:p>
-        </p:txBody>
-      </p:sp>
-      <p:sp>
-        <p:nvSpPr>
-          <p:cNvPr id="6" name="TextBox 5">
-            <a:extLst>
-              <a:ext uri="{FF2B5EF4-FFF2-40B4-BE49-F238E27FC236}">
-                <a16:creationId xmlns:a16="http://schemas.microsoft.com/office/drawing/2014/main" id="{6ED31DE9-D4DA-BB47-8961-1227E69BE052}"/>
-              </a:ext>
-            </a:extLst>
-          </p:cNvPr>
-          <p:cNvSpPr txBox="1"/>
-          <p:nvPr/>
-        </p:nvSpPr>
-        <p:spPr>
-          <a:xfrm>
-            <a:off x="2107770" y="1329919"/>
-            <a:ext cx="604434" cy="584775"/>
-          </a:xfrm>
-          <a:prstGeom prst="rect">
-            <a:avLst/>
-          </a:prstGeom>
-          <a:noFill/>
-        </p:spPr>
-        <p:txBody>
-          <a:bodyPr wrap="square" rtlCol="0">
-            <a:spAutoFit/>
-          </a:bodyPr>
-          <a:lstStyle/>
-          <a:p>
-            <a:r>
-              <a:rPr lang="en-US" sz="3200" dirty="0">
-                <a:solidFill>
-                  <a:srgbClr val="FF0000"/>
-                </a:solidFill>
-              </a:rPr>
-              <a:t>1)</a:t>
-            </a:r>
-          </a:p>
-        </p:txBody>
-      </p:sp>
-      <p:sp>
-        <p:nvSpPr>
-          <p:cNvPr id="8" name="TextBox 7">
-            <a:extLst>
-              <a:ext uri="{FF2B5EF4-FFF2-40B4-BE49-F238E27FC236}">
-                <a16:creationId xmlns:a16="http://schemas.microsoft.com/office/drawing/2014/main" id="{A3757472-D2AA-4E4C-9568-9C2638FD134D}"/>
-              </a:ext>
-            </a:extLst>
-          </p:cNvPr>
-          <p:cNvSpPr txBox="1"/>
-          <p:nvPr/>
-        </p:nvSpPr>
-        <p:spPr>
-          <a:xfrm>
-            <a:off x="4192868" y="2052290"/>
-            <a:ext cx="604434" cy="584775"/>
-          </a:xfrm>
-          <a:prstGeom prst="rect">
-            <a:avLst/>
-          </a:prstGeom>
-          <a:noFill/>
-        </p:spPr>
-        <p:txBody>
-          <a:bodyPr wrap="square" rtlCol="0">
-            <a:spAutoFit/>
-          </a:bodyPr>
-          <a:lstStyle/>
-          <a:p>
-            <a:r>
-              <a:rPr lang="en-US" sz="3200" dirty="0">
-                <a:solidFill>
-                  <a:srgbClr val="FF0000"/>
-                </a:solidFill>
-              </a:rPr>
-              <a:t>2)</a:t>
-            </a:r>
-          </a:p>
-        </p:txBody>
-      </p:sp>
-      <p:pic>
-        <p:nvPicPr>
-          <p:cNvPr id="7" name="Picture 6" descr="A screenshot of a cell phone&#10;&#10;Description automatically generated">
-            <a:extLst>
-              <a:ext uri="{FF2B5EF4-FFF2-40B4-BE49-F238E27FC236}">
-                <a16:creationId xmlns:a16="http://schemas.microsoft.com/office/drawing/2014/main" id="{5A43FD0D-659D-AA4B-A33F-4ABB12D11E05}"/>
-              </a:ext>
-            </a:extLst>
-          </p:cNvPr>
-          <p:cNvPicPr>
-            <a:picLocks noChangeAspect="1"/>
-          </p:cNvPicPr>
-          <p:nvPr/>
-        </p:nvPicPr>
-        <p:blipFill>
-          <a:blip r:embed="rId3"/>
-          <a:stretch>
-            <a:fillRect/>
-          </a:stretch>
-        </p:blipFill>
-        <p:spPr>
-          <a:xfrm>
-            <a:off x="130381" y="3038920"/>
-            <a:ext cx="1783479" cy="1983229"/>
-          </a:xfrm>
-          <a:prstGeom prst="rect">
-            <a:avLst/>
-          </a:prstGeom>
-        </p:spPr>
-      </p:pic>
-    </p:spTree>
-    <p:extLst>
-      <p:ext uri="{BB962C8B-B14F-4D97-AF65-F5344CB8AC3E}">
-        <p14:creationId xmlns:p14="http://schemas.microsoft.com/office/powerpoint/2010/main" val="1384499838"/>
-      </p:ext>
-    </p:extLst>
-  </p:cSld>
-  <p:clrMapOvr>
-    <a:masterClrMapping/>
-  </p:clrMapOvr>
-</p:sld>
-</file>
-
-<file path=ppt/slides/slide90.xml><?xml version="1.0" encoding="utf-8"?>
+<file path=ppt/slides/slide91.xml><?xml version="1.0" encoding="utf-8"?>
 <p:sld xmlns:a="http://schemas.openxmlformats.org/drawingml/2006/main" xmlns:r="http://schemas.openxmlformats.org/officeDocument/2006/relationships" xmlns:p="http://schemas.openxmlformats.org/presentationml/2006/main">
   <p:cSld>
     <p:spTree>
@@ -49786,6 +51257,36 @@
           </a:extLst>
         </p:spPr>
       </p:pic>
+      <p:pic>
+        <p:nvPicPr>
+          <p:cNvPr id="7" name="Picture 6" descr="Unlink Macro with name update">
+            <a:extLst>
+              <a:ext uri="{FF2B5EF4-FFF2-40B4-BE49-F238E27FC236}">
+                <a16:creationId xmlns:a16="http://schemas.microsoft.com/office/drawing/2014/main" id="{381B70C8-F9A1-19EA-EAAE-83D30AEEF302}"/>
+              </a:ext>
+            </a:extLst>
+          </p:cNvPr>
+          <p:cNvPicPr>
+            <a:picLocks noChangeAspect="1"/>
+          </p:cNvPicPr>
+          <p:nvPr/>
+        </p:nvPicPr>
+        <p:blipFill>
+          <a:blip r:embed="rId5"/>
+          <a:stretch>
+            <a:fillRect/>
+          </a:stretch>
+        </p:blipFill>
+        <p:spPr>
+          <a:xfrm>
+            <a:off x="709412" y="3422019"/>
+            <a:ext cx="4178300" cy="1638300"/>
+          </a:xfrm>
+          <a:prstGeom prst="rect">
+            <a:avLst/>
+          </a:prstGeom>
+        </p:spPr>
+      </p:pic>
     </p:spTree>
     <p:extLst>
       <p:ext uri="{BB962C8B-B14F-4D97-AF65-F5344CB8AC3E}">
@@ -49799,7 +51300,7 @@
 </p:sld>
 </file>
 
-<file path=ppt/slides/slide91.xml><?xml version="1.0" encoding="utf-8"?>
+<file path=ppt/slides/slide92.xml><?xml version="1.0" encoding="utf-8"?>
 <p:sld xmlns:a="http://schemas.openxmlformats.org/drawingml/2006/main" xmlns:r="http://schemas.openxmlformats.org/officeDocument/2006/relationships" xmlns:p="http://schemas.openxmlformats.org/presentationml/2006/main">
   <p:cSld>
     <p:spTree>
@@ -50008,7 +51509,7 @@
 </p:sld>
 </file>
 
-<file path=ppt/slides/slide92.xml><?xml version="1.0" encoding="utf-8"?>
+<file path=ppt/slides/slide93.xml><?xml version="1.0" encoding="utf-8"?>
 <p:sld xmlns:a="http://schemas.openxmlformats.org/drawingml/2006/main" xmlns:r="http://schemas.openxmlformats.org/officeDocument/2006/relationships" xmlns:p="http://schemas.openxmlformats.org/presentationml/2006/main">
   <p:cSld>
     <p:spTree>
@@ -50245,7 +51746,7 @@
 </p:sld>
 </file>
 
-<file path=ppt/slides/slide93.xml><?xml version="1.0" encoding="utf-8"?>
+<file path=ppt/slides/slide94.xml><?xml version="1.0" encoding="utf-8"?>
 <p:sld xmlns:a="http://schemas.openxmlformats.org/drawingml/2006/main" xmlns:r="http://schemas.openxmlformats.org/officeDocument/2006/relationships" xmlns:p="http://schemas.openxmlformats.org/presentationml/2006/main">
   <p:cSld>
     <p:spTree>
@@ -50482,7 +51983,7 @@
 </p:sld>
 </file>
 
-<file path=ppt/slides/slide94.xml><?xml version="1.0" encoding="utf-8"?>
+<file path=ppt/slides/slide95.xml><?xml version="1.0" encoding="utf-8"?>
 <p:sld xmlns:a="http://schemas.openxmlformats.org/drawingml/2006/main" xmlns:r="http://schemas.openxmlformats.org/officeDocument/2006/relationships" xmlns:p="http://schemas.openxmlformats.org/presentationml/2006/main">
   <p:cSld>
     <p:spTree>
@@ -50570,15 +52071,6 @@
           <a:solidFill>
             <a:srgbClr val="FFFFFF"/>
           </a:solidFill>
-          <a:extLst>
-            <a:ext uri="{909E8E84-426E-40DD-AFC4-6F175D3DCCD1}">
-              <a14:hiddenFill xmlns:a14="http://schemas.microsoft.com/office/drawing/2010/main">
-                <a:solidFill>
-                  <a:srgbClr val="FFFFFF"/>
-                </a:solidFill>
-              </a14:hiddenFill>
-            </a:ext>
-          </a:extLst>
         </p:spPr>
       </p:pic>
       <p:sp>
@@ -50642,8 +52134,8 @@
 </p:sld>
 </file>
 
-<file path=ppt/slides/slide95.xml><?xml version="1.0" encoding="utf-8"?>
-<p:sld xmlns:a="http://schemas.openxmlformats.org/drawingml/2006/main" xmlns:r="http://schemas.openxmlformats.org/officeDocument/2006/relationships" xmlns:p="http://schemas.openxmlformats.org/presentationml/2006/main">
+<file path=ppt/slides/slide96.xml><?xml version="1.0" encoding="utf-8"?>
+<p:sld xmlns:a="http://schemas.openxmlformats.org/drawingml/2006/main" xmlns:r="http://schemas.openxmlformats.org/officeDocument/2006/relationships" xmlns:p="http://schemas.openxmlformats.org/presentationml/2006/main" show="0">
   <p:cSld>
     <p:spTree>
       <p:nvGrpSpPr>
@@ -50767,156 +52259,6 @@
     <p:extLst>
       <p:ext uri="{BB962C8B-B14F-4D97-AF65-F5344CB8AC3E}">
         <p14:creationId xmlns:p14="http://schemas.microsoft.com/office/powerpoint/2010/main" val="1713783111"/>
-      </p:ext>
-    </p:extLst>
-  </p:cSld>
-  <p:clrMapOvr>
-    <a:masterClrMapping/>
-  </p:clrMapOvr>
-</p:sld>
-</file>
-
-<file path=ppt/slides/slide96.xml><?xml version="1.0" encoding="utf-8"?>
-<p:sld xmlns:a="http://schemas.openxmlformats.org/drawingml/2006/main" xmlns:r="http://schemas.openxmlformats.org/officeDocument/2006/relationships" xmlns:p="http://schemas.openxmlformats.org/presentationml/2006/main">
-  <p:cSld>
-    <p:spTree>
-      <p:nvGrpSpPr>
-        <p:cNvPr id="1" name=""/>
-        <p:cNvGrpSpPr/>
-        <p:nvPr/>
-      </p:nvGrpSpPr>
-      <p:grpSpPr>
-        <a:xfrm>
-          <a:off x="0" y="0"/>
-          <a:ext cx="0" cy="0"/>
-          <a:chOff x="0" y="0"/>
-          <a:chExt cx="0" cy="0"/>
-        </a:xfrm>
-      </p:grpSpPr>
-      <p:sp>
-        <p:nvSpPr>
-          <p:cNvPr id="2" name="Title 1">
-            <a:extLst>
-              <a:ext uri="{FF2B5EF4-FFF2-40B4-BE49-F238E27FC236}">
-                <a16:creationId xmlns:a16="http://schemas.microsoft.com/office/drawing/2014/main" id="{E9E670F8-AACA-D046-8E4F-17454C7527D7}"/>
-              </a:ext>
-            </a:extLst>
-          </p:cNvPr>
-          <p:cNvSpPr>
-            <a:spLocks noGrp="1"/>
-          </p:cNvSpPr>
-          <p:nvPr>
-            <p:ph type="title"/>
-          </p:nvPr>
-        </p:nvSpPr>
-        <p:spPr>
-          <a:xfrm>
-            <a:off x="592585" y="0"/>
-            <a:ext cx="8418249" cy="994172"/>
-          </a:xfrm>
-        </p:spPr>
-        <p:txBody>
-          <a:bodyPr anchor="ctr">
-            <a:normAutofit/>
-          </a:bodyPr>
-          <a:lstStyle/>
-          <a:p>
-            <a:r>
-              <a:rPr lang="en-US" dirty="0"/>
-              <a:t>Unsafe Unlink – Aftermath</a:t>
-            </a:r>
-          </a:p>
-        </p:txBody>
-      </p:sp>
-      <p:sp>
-        <p:nvSpPr>
-          <p:cNvPr id="8" name="Content Placeholder 7">
-            <a:extLst>
-              <a:ext uri="{FF2B5EF4-FFF2-40B4-BE49-F238E27FC236}">
-                <a16:creationId xmlns:a16="http://schemas.microsoft.com/office/drawing/2014/main" id="{3D35A732-1F45-D147-B0BB-44CB04EA56CF}"/>
-              </a:ext>
-            </a:extLst>
-          </p:cNvPr>
-          <p:cNvSpPr>
-            <a:spLocks noGrp="1"/>
-          </p:cNvSpPr>
-          <p:nvPr>
-            <p:ph sz="half" idx="2"/>
-          </p:nvPr>
-        </p:nvSpPr>
-        <p:spPr>
-          <a:xfrm>
-            <a:off x="5395501" y="809926"/>
-            <a:ext cx="3615334" cy="3263504"/>
-          </a:xfrm>
-        </p:spPr>
-        <p:txBody>
-          <a:bodyPr/>
-          <a:lstStyle/>
-          <a:p>
-            <a:r>
-              <a:rPr lang="en-US" dirty="0"/>
-              <a:t>Corrupt the 3 previous values to our pointer.</a:t>
-            </a:r>
-          </a:p>
-          <a:p>
-            <a:r>
-              <a:rPr lang="en-US" dirty="0"/>
-              <a:t>If list of pointers, this could be VERY useful!</a:t>
-            </a:r>
-          </a:p>
-          <a:p>
-            <a:r>
-              <a:rPr lang="en-US" dirty="0"/>
-              <a:t>If control </a:t>
-            </a:r>
-            <a:r>
-              <a:rPr lang="en-US" i="1" dirty="0"/>
-              <a:t>pointer to chunk,</a:t>
-            </a:r>
-            <a:r>
-              <a:rPr lang="en-US" dirty="0"/>
-              <a:t> we can edit this forever with our own values. </a:t>
-            </a:r>
-          </a:p>
-          <a:p>
-            <a:endParaRPr lang="en-US" dirty="0"/>
-          </a:p>
-        </p:txBody>
-      </p:sp>
-      <p:pic>
-        <p:nvPicPr>
-          <p:cNvPr id="12" name="Content Placeholder 11" descr="Overwriting the data around the pointers">
-            <a:extLst>
-              <a:ext uri="{FF2B5EF4-FFF2-40B4-BE49-F238E27FC236}">
-                <a16:creationId xmlns:a16="http://schemas.microsoft.com/office/drawing/2014/main" id="{E1519185-0BB1-D04B-8DC0-36FD123B0481}"/>
-              </a:ext>
-            </a:extLst>
-          </p:cNvPr>
-          <p:cNvPicPr>
-            <a:picLocks noGrp="1" noChangeAspect="1"/>
-          </p:cNvPicPr>
-          <p:nvPr>
-            <p:ph sz="half" idx="1"/>
-          </p:nvPr>
-        </p:nvPicPr>
-        <p:blipFill>
-          <a:blip r:embed="rId2"/>
-          <a:stretch>
-            <a:fillRect/>
-          </a:stretch>
-        </p:blipFill>
-        <p:spPr>
-          <a:xfrm>
-            <a:off x="210843" y="994172"/>
-            <a:ext cx="4777767" cy="2725572"/>
-          </a:xfrm>
-        </p:spPr>
-      </p:pic>
-    </p:spTree>
-    <p:extLst>
-      <p:ext uri="{BB962C8B-B14F-4D97-AF65-F5344CB8AC3E}">
-        <p14:creationId xmlns:p14="http://schemas.microsoft.com/office/powerpoint/2010/main" val="953586807"/>
       </p:ext>
     </p:extLst>
   </p:cSld>
@@ -51036,6 +52378,156 @@
       </p:sp>
       <p:pic>
         <p:nvPicPr>
+          <p:cNvPr id="12" name="Content Placeholder 11" descr="Overwriting the data around the pointers">
+            <a:extLst>
+              <a:ext uri="{FF2B5EF4-FFF2-40B4-BE49-F238E27FC236}">
+                <a16:creationId xmlns:a16="http://schemas.microsoft.com/office/drawing/2014/main" id="{E1519185-0BB1-D04B-8DC0-36FD123B0481}"/>
+              </a:ext>
+            </a:extLst>
+          </p:cNvPr>
+          <p:cNvPicPr>
+            <a:picLocks noGrp="1" noChangeAspect="1"/>
+          </p:cNvPicPr>
+          <p:nvPr>
+            <p:ph sz="half" idx="1"/>
+          </p:nvPr>
+        </p:nvPicPr>
+        <p:blipFill>
+          <a:blip r:embed="rId2"/>
+          <a:stretch>
+            <a:fillRect/>
+          </a:stretch>
+        </p:blipFill>
+        <p:spPr>
+          <a:xfrm>
+            <a:off x="210843" y="1008802"/>
+            <a:ext cx="4777767" cy="2725572"/>
+          </a:xfrm>
+        </p:spPr>
+      </p:pic>
+    </p:spTree>
+    <p:extLst>
+      <p:ext uri="{BB962C8B-B14F-4D97-AF65-F5344CB8AC3E}">
+        <p14:creationId xmlns:p14="http://schemas.microsoft.com/office/powerpoint/2010/main" val="953586807"/>
+      </p:ext>
+    </p:extLst>
+  </p:cSld>
+  <p:clrMapOvr>
+    <a:masterClrMapping/>
+  </p:clrMapOvr>
+</p:sld>
+</file>
+
+<file path=ppt/slides/slide98.xml><?xml version="1.0" encoding="utf-8"?>
+<p:sld xmlns:a="http://schemas.openxmlformats.org/drawingml/2006/main" xmlns:r="http://schemas.openxmlformats.org/officeDocument/2006/relationships" xmlns:p="http://schemas.openxmlformats.org/presentationml/2006/main">
+  <p:cSld>
+    <p:spTree>
+      <p:nvGrpSpPr>
+        <p:cNvPr id="1" name=""/>
+        <p:cNvGrpSpPr/>
+        <p:nvPr/>
+      </p:nvGrpSpPr>
+      <p:grpSpPr>
+        <a:xfrm>
+          <a:off x="0" y="0"/>
+          <a:ext cx="0" cy="0"/>
+          <a:chOff x="0" y="0"/>
+          <a:chExt cx="0" cy="0"/>
+        </a:xfrm>
+      </p:grpSpPr>
+      <p:sp>
+        <p:nvSpPr>
+          <p:cNvPr id="2" name="Title 1">
+            <a:extLst>
+              <a:ext uri="{FF2B5EF4-FFF2-40B4-BE49-F238E27FC236}">
+                <a16:creationId xmlns:a16="http://schemas.microsoft.com/office/drawing/2014/main" id="{E9E670F8-AACA-D046-8E4F-17454C7527D7}"/>
+              </a:ext>
+            </a:extLst>
+          </p:cNvPr>
+          <p:cNvSpPr>
+            <a:spLocks noGrp="1"/>
+          </p:cNvSpPr>
+          <p:nvPr>
+            <p:ph type="title"/>
+          </p:nvPr>
+        </p:nvSpPr>
+        <p:spPr>
+          <a:xfrm>
+            <a:off x="592585" y="0"/>
+            <a:ext cx="8418249" cy="994172"/>
+          </a:xfrm>
+        </p:spPr>
+        <p:txBody>
+          <a:bodyPr anchor="ctr">
+            <a:normAutofit/>
+          </a:bodyPr>
+          <a:lstStyle/>
+          <a:p>
+            <a:r>
+              <a:rPr lang="en-US" dirty="0"/>
+              <a:t>Unsafe Unlink – Aftermath</a:t>
+            </a:r>
+          </a:p>
+        </p:txBody>
+      </p:sp>
+      <p:sp>
+        <p:nvSpPr>
+          <p:cNvPr id="8" name="Content Placeholder 7">
+            <a:extLst>
+              <a:ext uri="{FF2B5EF4-FFF2-40B4-BE49-F238E27FC236}">
+                <a16:creationId xmlns:a16="http://schemas.microsoft.com/office/drawing/2014/main" id="{3D35A732-1F45-D147-B0BB-44CB04EA56CF}"/>
+              </a:ext>
+            </a:extLst>
+          </p:cNvPr>
+          <p:cNvSpPr>
+            <a:spLocks noGrp="1"/>
+          </p:cNvSpPr>
+          <p:nvPr>
+            <p:ph sz="half" idx="2"/>
+          </p:nvPr>
+        </p:nvSpPr>
+        <p:spPr>
+          <a:xfrm>
+            <a:off x="5395501" y="809926"/>
+            <a:ext cx="3615334" cy="3263504"/>
+          </a:xfrm>
+        </p:spPr>
+        <p:txBody>
+          <a:bodyPr/>
+          <a:lstStyle/>
+          <a:p>
+            <a:r>
+              <a:rPr lang="en-US" dirty="0"/>
+              <a:t>Corrupt the 3 previous values to our pointer.</a:t>
+            </a:r>
+          </a:p>
+          <a:p>
+            <a:r>
+              <a:rPr lang="en-US" dirty="0"/>
+              <a:t>If list of pointers, this could be VERY useful!</a:t>
+            </a:r>
+          </a:p>
+          <a:p>
+            <a:r>
+              <a:rPr lang="en-US" dirty="0"/>
+              <a:t>If control </a:t>
+            </a:r>
+            <a:r>
+              <a:rPr lang="en-US" i="1" dirty="0"/>
+              <a:t>pointer to chunk,</a:t>
+            </a:r>
+            <a:r>
+              <a:rPr lang="en-US" dirty="0"/>
+              <a:t> we can edit this forever with our own values. </a:t>
+            </a:r>
+          </a:p>
+          <a:p>
+            <a:endParaRPr lang="en-US" dirty="0"/>
+          </a:p>
+        </p:txBody>
+      </p:sp>
+      <p:pic>
+        <p:nvPicPr>
           <p:cNvPr id="6" name="Content Placeholder 5" descr="Overwriting a pointer to the chunk itself!">
             <a:extLst>
               <a:ext uri="{FF2B5EF4-FFF2-40B4-BE49-F238E27FC236}">
@@ -51076,7 +52568,7 @@
 </p:sld>
 </file>
 
-<file path=ppt/slides/slide98.xml><?xml version="1.0" encoding="utf-8"?>
+<file path=ppt/slides/slide99.xml><?xml version="1.0" encoding="utf-8"?>
 <p:sld xmlns:a="http://schemas.openxmlformats.org/drawingml/2006/main" xmlns:r="http://schemas.openxmlformats.org/officeDocument/2006/relationships" xmlns:p="http://schemas.openxmlformats.org/presentationml/2006/main">
   <p:cSld>
     <p:spTree>
@@ -51163,112 +52655,6 @@
     <p:extLst>
       <p:ext uri="{BB962C8B-B14F-4D97-AF65-F5344CB8AC3E}">
         <p14:creationId xmlns:p14="http://schemas.microsoft.com/office/powerpoint/2010/main" val="3184685061"/>
-      </p:ext>
-    </p:extLst>
-  </p:cSld>
-  <p:clrMapOvr>
-    <a:masterClrMapping/>
-  </p:clrMapOvr>
-</p:sld>
-</file>
-
-<file path=ppt/slides/slide99.xml><?xml version="1.0" encoding="utf-8"?>
-<p:sld xmlns:a="http://schemas.openxmlformats.org/drawingml/2006/main" xmlns:r="http://schemas.openxmlformats.org/officeDocument/2006/relationships" xmlns:p="http://schemas.openxmlformats.org/presentationml/2006/main">
-  <p:cSld>
-    <p:spTree>
-      <p:nvGrpSpPr>
-        <p:cNvPr id="1" name=""/>
-        <p:cNvGrpSpPr/>
-        <p:nvPr/>
-      </p:nvGrpSpPr>
-      <p:grpSpPr>
-        <a:xfrm>
-          <a:off x="0" y="0"/>
-          <a:ext cx="0" cy="0"/>
-          <a:chOff x="0" y="0"/>
-          <a:chExt cx="0" cy="0"/>
-        </a:xfrm>
-      </p:grpSpPr>
-      <p:sp>
-        <p:nvSpPr>
-          <p:cNvPr id="2" name="Title 1">
-            <a:extLst>
-              <a:ext uri="{FF2B5EF4-FFF2-40B4-BE49-F238E27FC236}">
-                <a16:creationId xmlns:a16="http://schemas.microsoft.com/office/drawing/2014/main" id="{A90A02E4-3663-3C40-BA39-AFC8E4C6C9EC}"/>
-              </a:ext>
-            </a:extLst>
-          </p:cNvPr>
-          <p:cNvSpPr>
-            <a:spLocks noGrp="1"/>
-          </p:cNvSpPr>
-          <p:nvPr>
-            <p:ph type="title"/>
-          </p:nvPr>
-        </p:nvSpPr>
-        <p:spPr>
-          <a:xfrm>
-            <a:off x="628650" y="273847"/>
-            <a:ext cx="7886700" cy="994172"/>
-          </a:xfrm>
-        </p:spPr>
-        <p:txBody>
-          <a:bodyPr anchor="ctr">
-            <a:normAutofit/>
-          </a:bodyPr>
-          <a:lstStyle/>
-          <a:p>
-            <a:r>
-              <a:rPr lang="en-US" dirty="0"/>
-              <a:t>Unsafe Unlink DEMO</a:t>
-            </a:r>
-          </a:p>
-        </p:txBody>
-      </p:sp>
-      <p:pic>
-        <p:nvPicPr>
-          <p:cNvPr id="1026" name="Picture 2" descr="Demo - Better support, happy customers - TOPdesk">
-            <a:extLst>
-              <a:ext uri="{FF2B5EF4-FFF2-40B4-BE49-F238E27FC236}">
-                <a16:creationId xmlns:a16="http://schemas.microsoft.com/office/drawing/2014/main" id="{2C8C0D5D-E3BF-EE49-B634-8F339CA9B268}"/>
-              </a:ext>
-            </a:extLst>
-          </p:cNvPr>
-          <p:cNvPicPr>
-            <a:picLocks noGrp="1" noChangeAspect="1" noChangeArrowheads="1"/>
-          </p:cNvPicPr>
-          <p:nvPr>
-            <p:ph idx="1"/>
-          </p:nvPr>
-        </p:nvPicPr>
-        <p:blipFill>
-          <a:blip r:embed="rId2">
-            <a:extLst>
-              <a:ext uri="{28A0092B-C50C-407E-A947-70E740481C1C}">
-                <a14:useLocalDpi xmlns:a14="http://schemas.microsoft.com/office/drawing/2010/main" val="0"/>
-              </a:ext>
-            </a:extLst>
-          </a:blip>
-          <a:stretch>
-            <a:fillRect/>
-          </a:stretch>
-        </p:blipFill>
-        <p:spPr bwMode="auto">
-          <a:xfrm>
-            <a:off x="1886602" y="1236541"/>
-            <a:ext cx="5370795" cy="3263504"/>
-          </a:xfrm>
-          <a:prstGeom prst="rect">
-            <a:avLst/>
-          </a:prstGeom>
-          <a:solidFill>
-            <a:srgbClr val="FFFFFF"/>
-          </a:solidFill>
-        </p:spPr>
-      </p:pic>
-    </p:spTree>
-    <p:extLst>
-      <p:ext uri="{BB962C8B-B14F-4D97-AF65-F5344CB8AC3E}">
-        <p14:creationId xmlns:p14="http://schemas.microsoft.com/office/powerpoint/2010/main" val="2337429973"/>
       </p:ext>
     </p:extLst>
   </p:cSld>

</xml_diff>